<commit_message>
Split preliminary restuls into teacher and exam grades
</commit_message>
<xml_diff>
--- a/Teaching/NERA_2022/Tony.pptx
+++ b/Teaching/NERA_2022/Tony.pptx
@@ -5,18 +5,19 @@
     <p:sldMasterId id="2147483648" r:id="rId1"/>
   </p:sldMasterIdLst>
   <p:notesMasterIdLst>
-    <p:notesMasterId r:id="rId8"/>
+    <p:notesMasterId r:id="rId9"/>
   </p:notesMasterIdLst>
   <p:handoutMasterIdLst>
-    <p:handoutMasterId r:id="rId9"/>
+    <p:handoutMasterId r:id="rId10"/>
   </p:handoutMasterIdLst>
   <p:sldIdLst>
     <p:sldId id="256" r:id="rId2"/>
-    <p:sldId id="281" r:id="rId3"/>
-    <p:sldId id="283" r:id="rId4"/>
-    <p:sldId id="284" r:id="rId5"/>
+    <p:sldId id="292" r:id="rId3"/>
+    <p:sldId id="291" r:id="rId4"/>
+    <p:sldId id="290" r:id="rId5"/>
     <p:sldId id="285" r:id="rId6"/>
-    <p:sldId id="287" r:id="rId7"/>
+    <p:sldId id="289" r:id="rId7"/>
+    <p:sldId id="293" r:id="rId8"/>
   </p:sldIdLst>
   <p:sldSz cx="9144000" cy="5715000" type="screen16x10"/>
   <p:notesSz cx="6858000" cy="9144000"/>
@@ -293,7 +294,7 @@
               <a:pPr>
                 <a:defRPr/>
               </a:pPr>
-              <a:t>26.05.2022</a:t>
+              <a:t>27.05.2022</a:t>
             </a:fld>
             <a:endParaRPr lang="nb-NO" altLang="nb-NO"/>
           </a:p>
@@ -990,6 +991,465 @@
       </p:grpSpPr>
       <p:sp>
         <p:nvSpPr>
+          <p:cNvPr id="2" name="Slide Image Placeholder 1"/>
+          <p:cNvSpPr>
+            <a:spLocks noGrp="1" noRot="1" noChangeAspect="1"/>
+          </p:cNvSpPr>
+          <p:nvPr>
+            <p:ph type="sldImg"/>
+          </p:nvPr>
+        </p:nvSpPr>
+        <p:spPr/>
+      </p:sp>
+      <p:sp>
+        <p:nvSpPr>
+          <p:cNvPr id="3" name="Notes Placeholder 2"/>
+          <p:cNvSpPr>
+            <a:spLocks noGrp="1"/>
+          </p:cNvSpPr>
+          <p:nvPr>
+            <p:ph type="body" idx="1"/>
+          </p:nvPr>
+        </p:nvSpPr>
+        <p:spPr/>
+        <p:txBody>
+          <a:bodyPr/>
+          <a:lstStyle/>
+          <a:p>
+            <a:pPr eaLnBrk="1" hangingPunct="1"/>
+            <a:r>
+              <a:rPr lang="en-AU" altLang="nb-NO" sz="1000" noProof="0" dirty="0">
+                <a:latin typeface="FiraCode Nerd Font" panose="020B0809050000020004" pitchFamily="49" charset="0"/>
+                <a:ea typeface="FiraCode Nerd Font" panose="020B0809050000020004" pitchFamily="49" charset="0"/>
+              </a:rPr>
+              <a:t>This question is important because assessment practices have significant impact on students’ lives, particularly when learners approach the end of their </a:t>
+            </a:r>
+            <a:r>
+              <a:rPr lang="en-AU" altLang="nb-NO" sz="1000" noProof="0" dirty="0" err="1">
+                <a:latin typeface="FiraCode Nerd Font" panose="020B0809050000020004" pitchFamily="49" charset="0"/>
+                <a:ea typeface="FiraCode Nerd Font" panose="020B0809050000020004" pitchFamily="49" charset="0"/>
+              </a:rPr>
+              <a:t>grunnskole</a:t>
+            </a:r>
+            <a:r>
+              <a:rPr lang="en-AU" altLang="nb-NO" sz="1000" noProof="0" dirty="0">
+                <a:latin typeface="FiraCode Nerd Font" panose="020B0809050000020004" pitchFamily="49" charset="0"/>
+                <a:ea typeface="FiraCode Nerd Font" panose="020B0809050000020004" pitchFamily="49" charset="0"/>
+              </a:rPr>
+              <a:t> (Year 10), where decisions must be made over vocational or academic trajectories.</a:t>
+            </a:r>
+          </a:p>
+          <a:p>
+            <a:pPr eaLnBrk="1" hangingPunct="1"/>
+            <a:endParaRPr lang="en-AU" altLang="nb-NO" sz="1000" noProof="0" dirty="0">
+              <a:latin typeface="FiraCode Nerd Font" panose="020B0809050000020004" pitchFamily="49" charset="0"/>
+              <a:ea typeface="FiraCode Nerd Font" panose="020B0809050000020004" pitchFamily="49" charset="0"/>
+            </a:endParaRPr>
+          </a:p>
+          <a:p>
+            <a:pPr eaLnBrk="1" hangingPunct="1"/>
+            <a:r>
+              <a:rPr lang="en-AU" altLang="nb-NO" sz="1000" noProof="0" dirty="0">
+                <a:latin typeface="FiraCode Nerd Font" panose="020B0809050000020004" pitchFamily="49" charset="0"/>
+                <a:ea typeface="FiraCode Nerd Font" panose="020B0809050000020004" pitchFamily="49" charset="0"/>
+              </a:rPr>
+              <a:t>In Norway and most Nordic countries, such high-stake decisions are made almost exclusively based on a single criterion: </a:t>
+            </a:r>
+            <a:r>
+              <a:rPr lang="en-AU" altLang="nb-NO" sz="1000" noProof="0" dirty="0" err="1">
+                <a:latin typeface="FiraCode Nerd Font" panose="020B0809050000020004" pitchFamily="49" charset="0"/>
+                <a:ea typeface="FiraCode Nerd Font" panose="020B0809050000020004" pitchFamily="49" charset="0"/>
+              </a:rPr>
+              <a:t>grunnskolepoeng</a:t>
+            </a:r>
+            <a:r>
+              <a:rPr lang="en-AU" altLang="nb-NO" sz="1000" noProof="0" dirty="0">
+                <a:latin typeface="FiraCode Nerd Font" panose="020B0809050000020004" pitchFamily="49" charset="0"/>
+                <a:ea typeface="FiraCode Nerd Font" panose="020B0809050000020004" pitchFamily="49" charset="0"/>
+              </a:rPr>
+              <a:t>, a Norwegian term equivalent to grade point averages (GPA) in English.</a:t>
+            </a:r>
+          </a:p>
+          <a:p>
+            <a:pPr eaLnBrk="1" hangingPunct="1"/>
+            <a:endParaRPr lang="en-AU" altLang="nb-NO" sz="1000" noProof="0" dirty="0">
+              <a:latin typeface="FiraCode Nerd Font" panose="020B0809050000020004" pitchFamily="49" charset="0"/>
+              <a:ea typeface="FiraCode Nerd Font" panose="020B0809050000020004" pitchFamily="49" charset="0"/>
+            </a:endParaRPr>
+          </a:p>
+          <a:p>
+            <a:pPr eaLnBrk="1" hangingPunct="1"/>
+            <a:r>
+              <a:rPr lang="en-AU" altLang="nb-NO" sz="1000" noProof="0" dirty="0">
+                <a:latin typeface="FiraCode Nerd Font" panose="020B0809050000020004" pitchFamily="49" charset="0"/>
+                <a:ea typeface="FiraCode Nerd Font" panose="020B0809050000020004" pitchFamily="49" charset="0"/>
+              </a:rPr>
+              <a:t>Although details vary across jurisdictions, GPA is largely a sum-score measure.</a:t>
+            </a:r>
+          </a:p>
+          <a:p>
+            <a:pPr eaLnBrk="1" hangingPunct="1"/>
+            <a:r>
+              <a:rPr lang="en-AU" altLang="nb-NO" sz="1000" noProof="0" dirty="0">
+                <a:latin typeface="FiraCode Nerd Font" panose="020B0809050000020004" pitchFamily="49" charset="0"/>
+                <a:ea typeface="FiraCode Nerd Font" panose="020B0809050000020004" pitchFamily="49" charset="0"/>
+              </a:rPr>
+              <a:t>Ensuring each component entering GPA computation is comparable in difficulties is, therefore, important not only for upholding assessment fairness, but also for enhancing measurement validity.</a:t>
+            </a:r>
+          </a:p>
+          <a:p>
+            <a:pPr eaLnBrk="1" hangingPunct="1"/>
+            <a:endParaRPr lang="en-AU" altLang="nb-NO" sz="1000" noProof="0" dirty="0">
+              <a:latin typeface="FiraCode Nerd Font" panose="020B0809050000020004" pitchFamily="49" charset="0"/>
+              <a:ea typeface="FiraCode Nerd Font" panose="020B0809050000020004" pitchFamily="49" charset="0"/>
+            </a:endParaRPr>
+          </a:p>
+          <a:p>
+            <a:pPr eaLnBrk="1" hangingPunct="1"/>
+            <a:r>
+              <a:rPr lang="en-AU" altLang="nb-NO" sz="1000" noProof="0" dirty="0">
+                <a:latin typeface="FiraCode Nerd Font" panose="020B0809050000020004" pitchFamily="49" charset="0"/>
+                <a:ea typeface="FiraCode Nerd Font" panose="020B0809050000020004" pitchFamily="49" charset="0"/>
+              </a:rPr>
+              <a:t>Surprisingly scarce studies, however, have been devoted into answering this fundamental question in the Nordic context, leaving both fairness and validity as untested assumptions.</a:t>
+            </a:r>
+          </a:p>
+          <a:p>
+            <a:pPr eaLnBrk="1" hangingPunct="1"/>
+            <a:r>
+              <a:rPr lang="en-AU" altLang="nb-NO" sz="1000" noProof="0" dirty="0">
+                <a:latin typeface="FiraCode Nerd Font" panose="020B0809050000020004" pitchFamily="49" charset="0"/>
+                <a:ea typeface="FiraCode Nerd Font" panose="020B0809050000020004" pitchFamily="49" charset="0"/>
+              </a:rPr>
+              <a:t>Such concern is only exacerbated by reports from neighbouring countries, such as the UK and the Netherlands, with evidence challenging the </a:t>
+            </a:r>
+            <a:r>
+              <a:rPr lang="en-AU" altLang="nb-NO" sz="1000" noProof="0" dirty="0" err="1">
+                <a:latin typeface="FiraCode Nerd Font" panose="020B0809050000020004" pitchFamily="49" charset="0"/>
+                <a:ea typeface="FiraCode Nerd Font" panose="020B0809050000020004" pitchFamily="49" charset="0"/>
+              </a:rPr>
+              <a:t>equi</a:t>
+            </a:r>
+            <a:r>
+              <a:rPr lang="en-AU" altLang="nb-NO" sz="1000" noProof="0" dirty="0">
+                <a:latin typeface="FiraCode Nerd Font" panose="020B0809050000020004" pitchFamily="49" charset="0"/>
+                <a:ea typeface="FiraCode Nerd Font" panose="020B0809050000020004" pitchFamily="49" charset="0"/>
+              </a:rPr>
+              <a:t>-difficulty assumption.</a:t>
+            </a:r>
+          </a:p>
+          <a:p>
+            <a:pPr eaLnBrk="1" hangingPunct="1"/>
+            <a:endParaRPr lang="en-AU" altLang="nb-NO" sz="1000" noProof="0" dirty="0">
+              <a:latin typeface="FiraCode Nerd Font" panose="020B0809050000020004" pitchFamily="49" charset="0"/>
+              <a:ea typeface="FiraCode Nerd Font" panose="020B0809050000020004" pitchFamily="49" charset="0"/>
+            </a:endParaRPr>
+          </a:p>
+          <a:p>
+            <a:pPr eaLnBrk="1" hangingPunct="1"/>
+            <a:r>
+              <a:rPr lang="en-AU" altLang="nb-NO" sz="1000" noProof="0" dirty="0">
+                <a:latin typeface="FiraCode Nerd Font" panose="020B0809050000020004" pitchFamily="49" charset="0"/>
+                <a:ea typeface="FiraCode Nerd Font" panose="020B0809050000020004" pitchFamily="49" charset="0"/>
+              </a:rPr>
+              <a:t>This study therefore wishes to contribute to the academic and policy debates by examining the inter-subject difficulties in Norway’s GPA computation.</a:t>
+            </a:r>
+          </a:p>
+          <a:p>
+            <a:endParaRPr lang="en-AU" dirty="0"/>
+          </a:p>
+        </p:txBody>
+      </p:sp>
+      <p:sp>
+        <p:nvSpPr>
+          <p:cNvPr id="4" name="Slide Number Placeholder 3"/>
+          <p:cNvSpPr>
+            <a:spLocks noGrp="1"/>
+          </p:cNvSpPr>
+          <p:nvPr>
+            <p:ph type="sldNum" sz="quarter" idx="5"/>
+          </p:nvPr>
+        </p:nvSpPr>
+        <p:spPr/>
+        <p:txBody>
+          <a:bodyPr/>
+          <a:lstStyle/>
+          <a:p>
+            <a:pPr>
+              <a:defRPr/>
+            </a:pPr>
+            <a:fld id="{FC054C7B-6FC2-4923-AF6D-51288AE7A1B4}" type="slidenum">
+              <a:rPr lang="en-US" altLang="nb-NO" smtClean="0"/>
+              <a:pPr>
+                <a:defRPr/>
+              </a:pPr>
+              <a:t>3</a:t>
+            </a:fld>
+            <a:endParaRPr lang="en-US" altLang="nb-NO"/>
+          </a:p>
+        </p:txBody>
+      </p:sp>
+    </p:spTree>
+    <p:extLst>
+      <p:ext uri="{BB962C8B-B14F-4D97-AF65-F5344CB8AC3E}">
+        <p14:creationId xmlns:p14="http://schemas.microsoft.com/office/powerpoint/2010/main" val="1926189758"/>
+      </p:ext>
+    </p:extLst>
+  </p:cSld>
+  <p:clrMapOvr>
+    <a:masterClrMapping/>
+  </p:clrMapOvr>
+</p:notes>
+</file>
+
+<file path=ppt/notesSlides/notesSlide3.xml><?xml version="1.0" encoding="utf-8"?>
+<p:notes xmlns:a="http://schemas.openxmlformats.org/drawingml/2006/main" xmlns:r="http://schemas.openxmlformats.org/officeDocument/2006/relationships" xmlns:p="http://schemas.openxmlformats.org/presentationml/2006/main">
+  <p:cSld>
+    <p:spTree>
+      <p:nvGrpSpPr>
+        <p:cNvPr id="1" name=""/>
+        <p:cNvGrpSpPr/>
+        <p:nvPr/>
+      </p:nvGrpSpPr>
+      <p:grpSpPr>
+        <a:xfrm>
+          <a:off x="0" y="0"/>
+          <a:ext cx="0" cy="0"/>
+          <a:chOff x="0" y="0"/>
+          <a:chExt cx="0" cy="0"/>
+        </a:xfrm>
+      </p:grpSpPr>
+      <p:sp>
+        <p:nvSpPr>
+          <p:cNvPr id="2" name="Slide Image Placeholder 1"/>
+          <p:cNvSpPr>
+            <a:spLocks noGrp="1" noRot="1" noChangeAspect="1"/>
+          </p:cNvSpPr>
+          <p:nvPr>
+            <p:ph type="sldImg"/>
+          </p:nvPr>
+        </p:nvSpPr>
+        <p:spPr/>
+      </p:sp>
+      <p:sp>
+        <p:nvSpPr>
+          <p:cNvPr id="3" name="Notes Placeholder 2"/>
+          <p:cNvSpPr>
+            <a:spLocks noGrp="1"/>
+          </p:cNvSpPr>
+          <p:nvPr>
+            <p:ph type="body" idx="1"/>
+          </p:nvPr>
+        </p:nvSpPr>
+        <p:spPr/>
+        <p:txBody>
+          <a:bodyPr/>
+          <a:lstStyle/>
+          <a:p>
+            <a:pPr eaLnBrk="1" hangingPunct="1"/>
+            <a:r>
+              <a:rPr lang="en-AU" altLang="nb-NO" sz="1000" noProof="0" dirty="0">
+                <a:latin typeface="FiraCode Nerd Font" panose="020B0809050000020004" pitchFamily="49" charset="0"/>
+                <a:ea typeface="FiraCode Nerd Font" panose="020B0809050000020004" pitchFamily="49" charset="0"/>
+              </a:rPr>
+              <a:t>Under the Norwegian system, both teacher-assigned grades (</a:t>
+            </a:r>
+            <a:r>
+              <a:rPr lang="en-AU" altLang="nb-NO" sz="1000" noProof="0" dirty="0" err="1">
+                <a:latin typeface="FiraCode Nerd Font" panose="020B0809050000020004" pitchFamily="49" charset="0"/>
+                <a:ea typeface="FiraCode Nerd Font" panose="020B0809050000020004" pitchFamily="49" charset="0"/>
+              </a:rPr>
+              <a:t>standpunkt</a:t>
+            </a:r>
+            <a:r>
+              <a:rPr lang="en-AU" altLang="nb-NO" sz="1000" noProof="0" dirty="0">
+                <a:latin typeface="FiraCode Nerd Font" panose="020B0809050000020004" pitchFamily="49" charset="0"/>
+                <a:ea typeface="FiraCode Nerd Font" panose="020B0809050000020004" pitchFamily="49" charset="0"/>
+              </a:rPr>
+              <a:t>) and exam grades are included in the GPA calculation.</a:t>
+            </a:r>
+          </a:p>
+          <a:p>
+            <a:pPr eaLnBrk="1" hangingPunct="1"/>
+            <a:r>
+              <a:rPr lang="en-AU" altLang="nb-NO" sz="1000" noProof="0" dirty="0">
+                <a:latin typeface="FiraCode Nerd Font" panose="020B0809050000020004" pitchFamily="49" charset="0"/>
+                <a:ea typeface="FiraCode Nerd Font" panose="020B0809050000020004" pitchFamily="49" charset="0"/>
+              </a:rPr>
+              <a:t>Both teacher-assigned and exam grades are integers between 1 and 6, with 6 being the top grade.</a:t>
+            </a:r>
+          </a:p>
+          <a:p>
+            <a:pPr eaLnBrk="1" hangingPunct="1"/>
+            <a:endParaRPr lang="en-AU" altLang="nb-NO" sz="1000" noProof="0" dirty="0">
+              <a:latin typeface="FiraCode Nerd Font" panose="020B0809050000020004" pitchFamily="49" charset="0"/>
+              <a:ea typeface="FiraCode Nerd Font" panose="020B0809050000020004" pitchFamily="49" charset="0"/>
+            </a:endParaRPr>
+          </a:p>
+          <a:p>
+            <a:pPr eaLnBrk="1" hangingPunct="1"/>
+            <a:r>
+              <a:rPr lang="en-AU" altLang="nb-NO" sz="1000" noProof="0" dirty="0">
+                <a:latin typeface="FiraCode Nerd Font" panose="020B0809050000020004" pitchFamily="49" charset="0"/>
+                <a:ea typeface="FiraCode Nerd Font" panose="020B0809050000020004" pitchFamily="49" charset="0"/>
+              </a:rPr>
+              <a:t>Students receive grades from their teachers on 13 compulsory subjects, such as Norwegian, English, mathematics, natural sciences and social sciences, etc, as well as from a wide selection of electives.</a:t>
+            </a:r>
+          </a:p>
+          <a:p>
+            <a:pPr eaLnBrk="1" hangingPunct="1"/>
+            <a:r>
+              <a:rPr lang="en-AU" altLang="nb-NO" sz="1000" noProof="0" dirty="0">
+                <a:latin typeface="FiraCode Nerd Font" panose="020B0809050000020004" pitchFamily="49" charset="0"/>
+                <a:ea typeface="FiraCode Nerd Font" panose="020B0809050000020004" pitchFamily="49" charset="0"/>
+              </a:rPr>
+              <a:t>Exams consist of both written and oral forms.</a:t>
+            </a:r>
+          </a:p>
+          <a:p>
+            <a:pPr eaLnBrk="1" hangingPunct="1"/>
+            <a:r>
+              <a:rPr lang="en-AU" altLang="nb-NO" sz="1000" noProof="0" dirty="0">
+                <a:latin typeface="FiraCode Nerd Font" panose="020B0809050000020004" pitchFamily="49" charset="0"/>
+                <a:ea typeface="FiraCode Nerd Font" panose="020B0809050000020004" pitchFamily="49" charset="0"/>
+              </a:rPr>
+              <a:t>	The written form covers Mathematics, Norwegian and English, and,</a:t>
+            </a:r>
+          </a:p>
+          <a:p>
+            <a:pPr eaLnBrk="1" hangingPunct="1"/>
+            <a:r>
+              <a:rPr lang="en-AU" altLang="nb-NO" sz="1000" noProof="0" dirty="0">
+                <a:latin typeface="FiraCode Nerd Font" panose="020B0809050000020004" pitchFamily="49" charset="0"/>
+                <a:ea typeface="FiraCode Nerd Font" panose="020B0809050000020004" pitchFamily="49" charset="0"/>
+              </a:rPr>
+              <a:t>	the oral form covers Norwegian, English, as well as other subjects.</a:t>
+            </a:r>
+          </a:p>
+          <a:p>
+            <a:pPr eaLnBrk="1" hangingPunct="1"/>
+            <a:endParaRPr lang="en-AU" altLang="nb-NO" sz="1000" noProof="0" dirty="0">
+              <a:latin typeface="FiraCode Nerd Font" panose="020B0809050000020004" pitchFamily="49" charset="0"/>
+              <a:ea typeface="FiraCode Nerd Font" panose="020B0809050000020004" pitchFamily="49" charset="0"/>
+            </a:endParaRPr>
+          </a:p>
+          <a:p>
+            <a:pPr eaLnBrk="1" hangingPunct="1"/>
+            <a:r>
+              <a:rPr lang="en-AU" altLang="nb-NO" sz="1000" noProof="0" dirty="0">
+                <a:latin typeface="FiraCode Nerd Font" panose="020B0809050000020004" pitchFamily="49" charset="0"/>
+                <a:ea typeface="FiraCode Nerd Font" panose="020B0809050000020004" pitchFamily="49" charset="0"/>
+              </a:rPr>
+              <a:t>While every student receives teacher-assigned grades (that is, 100% sampling), the student cohort is divided evenly between participating in mathematics, Norwegian and English tests, giving exam grades a 33% sampling probability.</a:t>
+            </a:r>
+          </a:p>
+          <a:p>
+            <a:pPr eaLnBrk="1" hangingPunct="1"/>
+            <a:r>
+              <a:rPr lang="en-AU" altLang="nb-NO" sz="1000" noProof="0" dirty="0">
+                <a:latin typeface="FiraCode Nerd Font" panose="020B0809050000020004" pitchFamily="49" charset="0"/>
+                <a:ea typeface="FiraCode Nerd Font" panose="020B0809050000020004" pitchFamily="49" charset="0"/>
+              </a:rPr>
+              <a:t>Although 2/3 of the exam grades are missing for each exam subject, such situation can be safely modelled under missing completely at random (MCAR) assumptions due to random assignment.</a:t>
+            </a:r>
+          </a:p>
+          <a:p>
+            <a:pPr eaLnBrk="1" hangingPunct="1"/>
+            <a:endParaRPr lang="en-AU" altLang="nb-NO" sz="1000" noProof="0" dirty="0">
+              <a:latin typeface="FiraCode Nerd Font" panose="020B0809050000020004" pitchFamily="49" charset="0"/>
+              <a:ea typeface="FiraCode Nerd Font" panose="020B0809050000020004" pitchFamily="49" charset="0"/>
+            </a:endParaRPr>
+          </a:p>
+          <a:p>
+            <a:pPr eaLnBrk="1" hangingPunct="1"/>
+            <a:r>
+              <a:rPr lang="en-AU" altLang="nb-NO" sz="1000" noProof="0" dirty="0">
+                <a:latin typeface="FiraCode Nerd Font" panose="020B0809050000020004" pitchFamily="49" charset="0"/>
+                <a:ea typeface="FiraCode Nerd Font" panose="020B0809050000020004" pitchFamily="49" charset="0"/>
+              </a:rPr>
+              <a:t>GPA is then computed as the unweighted sum divided by the number of subjects (</a:t>
+            </a:r>
+            <a:r>
+              <a:rPr lang="en-AU" altLang="nb-NO" sz="1000" noProof="0" dirty="0" err="1">
+                <a:latin typeface="FiraCode Nerd Font" panose="020B0809050000020004" pitchFamily="49" charset="0"/>
+                <a:ea typeface="FiraCode Nerd Font" panose="020B0809050000020004" pitchFamily="49" charset="0"/>
+              </a:rPr>
+              <a:t>ie</a:t>
+            </a:r>
+            <a:r>
+              <a:rPr lang="en-AU" altLang="nb-NO" sz="1000" noProof="0" dirty="0">
+                <a:latin typeface="FiraCode Nerd Font" panose="020B0809050000020004" pitchFamily="49" charset="0"/>
+                <a:ea typeface="FiraCode Nerd Font" panose="020B0809050000020004" pitchFamily="49" charset="0"/>
+              </a:rPr>
+              <a:t>, a simple average), multiplied by 10, then rounded to two decimal points.</a:t>
+            </a:r>
+          </a:p>
+          <a:p>
+            <a:endParaRPr lang="en-AU" dirty="0"/>
+          </a:p>
+        </p:txBody>
+      </p:sp>
+      <p:sp>
+        <p:nvSpPr>
+          <p:cNvPr id="4" name="Slide Number Placeholder 3"/>
+          <p:cNvSpPr>
+            <a:spLocks noGrp="1"/>
+          </p:cNvSpPr>
+          <p:nvPr>
+            <p:ph type="sldNum" sz="quarter" idx="5"/>
+          </p:nvPr>
+        </p:nvSpPr>
+        <p:spPr/>
+        <p:txBody>
+          <a:bodyPr/>
+          <a:lstStyle/>
+          <a:p>
+            <a:pPr>
+              <a:defRPr/>
+            </a:pPr>
+            <a:fld id="{FC054C7B-6FC2-4923-AF6D-51288AE7A1B4}" type="slidenum">
+              <a:rPr lang="en-US" altLang="nb-NO" smtClean="0"/>
+              <a:pPr>
+                <a:defRPr/>
+              </a:pPr>
+              <a:t>4</a:t>
+            </a:fld>
+            <a:endParaRPr lang="en-US" altLang="nb-NO"/>
+          </a:p>
+        </p:txBody>
+      </p:sp>
+    </p:spTree>
+    <p:extLst>
+      <p:ext uri="{BB962C8B-B14F-4D97-AF65-F5344CB8AC3E}">
+        <p14:creationId xmlns:p14="http://schemas.microsoft.com/office/powerpoint/2010/main" val="4063301736"/>
+      </p:ext>
+    </p:extLst>
+  </p:cSld>
+  <p:clrMapOvr>
+    <a:masterClrMapping/>
+  </p:clrMapOvr>
+</p:notes>
+</file>
+
+<file path=ppt/notesSlides/notesSlide4.xml><?xml version="1.0" encoding="utf-8"?>
+<p:notes xmlns:a="http://schemas.openxmlformats.org/drawingml/2006/main" xmlns:r="http://schemas.openxmlformats.org/officeDocument/2006/relationships" xmlns:p="http://schemas.openxmlformats.org/presentationml/2006/main">
+  <p:cSld>
+    <p:spTree>
+      <p:nvGrpSpPr>
+        <p:cNvPr id="1" name=""/>
+        <p:cNvGrpSpPr/>
+        <p:nvPr/>
+      </p:nvGrpSpPr>
+      <p:grpSpPr>
+        <a:xfrm>
+          <a:off x="0" y="0"/>
+          <a:ext cx="0" cy="0"/>
+          <a:chOff x="0" y="0"/>
+          <a:chExt cx="0" cy="0"/>
+        </a:xfrm>
+      </p:grpSpPr>
+      <p:sp>
+        <p:nvSpPr>
           <p:cNvPr id="6146" name="Rectangle 7"/>
           <p:cNvSpPr>
             <a:spLocks noGrp="1" noChangeArrowheads="1"/>
@@ -1158,7 +1618,7 @@
                   <a:spcPct val="0"/>
                 </a:spcBef>
               </a:pPr>
-              <a:t>3</a:t>
+              <a:t>5</a:t>
             </a:fld>
             <a:endParaRPr lang="en-US" altLang="nb-NO" sz="1200"/>
           </a:p>
@@ -1221,21 +1681,7 @@
                 <a:latin typeface="FiraCode Nerd Font" panose="020B0809050000020004" pitchFamily="49" charset="0"/>
                 <a:ea typeface="FiraCode Nerd Font" panose="020B0809050000020004" pitchFamily="49" charset="0"/>
               </a:rPr>
-              <a:t>This question is important because assessment practices have significant impact on students’ lives, particularly when learners approach the end of their </a:t>
-            </a:r>
-            <a:r>
-              <a:rPr lang="en-AU" altLang="nb-NO" sz="1200" noProof="0" dirty="0" err="1">
-                <a:latin typeface="FiraCode Nerd Font" panose="020B0809050000020004" pitchFamily="49" charset="0"/>
-                <a:ea typeface="FiraCode Nerd Font" panose="020B0809050000020004" pitchFamily="49" charset="0"/>
-              </a:rPr>
-              <a:t>grunnskole</a:t>
-            </a:r>
-            <a:r>
-              <a:rPr lang="en-AU" altLang="nb-NO" sz="1200" noProof="0" dirty="0">
-                <a:latin typeface="FiraCode Nerd Font" panose="020B0809050000020004" pitchFamily="49" charset="0"/>
-                <a:ea typeface="FiraCode Nerd Font" panose="020B0809050000020004" pitchFamily="49" charset="0"/>
-              </a:rPr>
-              <a:t> (Year 10), where decisions must be made over vocational or academic trajectories.</a:t>
+              <a:t>With such background in mind, I may now describe the current study.</a:t>
             </a:r>
           </a:p>
           <a:p>
@@ -1252,21 +1698,17 @@
                 <a:latin typeface="FiraCode Nerd Font" panose="020B0809050000020004" pitchFamily="49" charset="0"/>
                 <a:ea typeface="FiraCode Nerd Font" panose="020B0809050000020004" pitchFamily="49" charset="0"/>
               </a:rPr>
-              <a:t>In Norway and most Nordic countries, such high-stake decisions are made almost exclusively based on a single criterion: </a:t>
-            </a:r>
-            <a:r>
-              <a:rPr lang="en-AU" altLang="nb-NO" sz="1200" noProof="0" dirty="0" err="1">
-                <a:latin typeface="FiraCode Nerd Font" panose="020B0809050000020004" pitchFamily="49" charset="0"/>
-                <a:ea typeface="FiraCode Nerd Font" panose="020B0809050000020004" pitchFamily="49" charset="0"/>
-              </a:rPr>
-              <a:t>grunnskolepoeng</a:t>
-            </a:r>
+              <a:t>This study draws its data from Norway’s national register.</a:t>
+            </a:r>
+          </a:p>
+          <a:p>
+            <a:pPr eaLnBrk="1" hangingPunct="1"/>
             <a:r>
               <a:rPr lang="en-AU" altLang="nb-NO" sz="1200" noProof="0" dirty="0">
                 <a:latin typeface="FiraCode Nerd Font" panose="020B0809050000020004" pitchFamily="49" charset="0"/>
                 <a:ea typeface="FiraCode Nerd Font" panose="020B0809050000020004" pitchFamily="49" charset="0"/>
               </a:rPr>
-              <a:t>, a Norwegian term equivalent to grade point averages (GPA) in English.</a:t>
+              <a:t>This data source is unique such that it is the population, not samples, that is the subject of analyses.</a:t>
             </a:r>
           </a:p>
           <a:p>
@@ -1283,17 +1725,7 @@
                 <a:latin typeface="FiraCode Nerd Font" panose="020B0809050000020004" pitchFamily="49" charset="0"/>
                 <a:ea typeface="FiraCode Nerd Font" panose="020B0809050000020004" pitchFamily="49" charset="0"/>
               </a:rPr>
-              <a:t>Although details vary across jurisdictions, GPA is largely a sum-score measure.</a:t>
-            </a:r>
-          </a:p>
-          <a:p>
-            <a:pPr eaLnBrk="1" hangingPunct="1"/>
-            <a:r>
-              <a:rPr lang="en-AU" altLang="nb-NO" sz="1200" noProof="0" dirty="0">
-                <a:latin typeface="FiraCode Nerd Font" panose="020B0809050000020004" pitchFamily="49" charset="0"/>
-                <a:ea typeface="FiraCode Nerd Font" panose="020B0809050000020004" pitchFamily="49" charset="0"/>
-              </a:rPr>
-              <a:t>Ensuring each component entering GPA computation is comparable in difficulties is, therefore, important not only for upholding assessment fairness, but also for enhancing measurement validity.</a:t>
+              <a:t>The targeted population is the Year 10 cohort in the administrative year 2019, whose academic records reached the government database in June 2019.</a:t>
             </a:r>
           </a:p>
           <a:p>
@@ -1310,31 +1742,7 @@
                 <a:latin typeface="FiraCode Nerd Font" panose="020B0809050000020004" pitchFamily="49" charset="0"/>
                 <a:ea typeface="FiraCode Nerd Font" panose="020B0809050000020004" pitchFamily="49" charset="0"/>
               </a:rPr>
-              <a:t>Surprisingly scarce studies, however, have been devoted into answering this fundamental question in the Nordic context, leaving both fairness and validity as untested assumptions.</a:t>
-            </a:r>
-          </a:p>
-          <a:p>
-            <a:pPr eaLnBrk="1" hangingPunct="1"/>
-            <a:r>
-              <a:rPr lang="en-AU" altLang="nb-NO" sz="1200" noProof="0" dirty="0">
-                <a:latin typeface="FiraCode Nerd Font" panose="020B0809050000020004" pitchFamily="49" charset="0"/>
-                <a:ea typeface="FiraCode Nerd Font" panose="020B0809050000020004" pitchFamily="49" charset="0"/>
-              </a:rPr>
-              <a:t>Such concern is only exacerbated by reports from neighbouring countries, such as the UK and the Netherlands, with evidence challenging the </a:t>
-            </a:r>
-            <a:r>
-              <a:rPr lang="en-AU" altLang="nb-NO" sz="1200" noProof="0" dirty="0" err="1">
-                <a:latin typeface="FiraCode Nerd Font" panose="020B0809050000020004" pitchFamily="49" charset="0"/>
-                <a:ea typeface="FiraCode Nerd Font" panose="020B0809050000020004" pitchFamily="49" charset="0"/>
-              </a:rPr>
-              <a:t>equi</a:t>
-            </a:r>
-            <a:r>
-              <a:rPr lang="en-AU" altLang="nb-NO" sz="1200" noProof="0" dirty="0">
-                <a:latin typeface="FiraCode Nerd Font" panose="020B0809050000020004" pitchFamily="49" charset="0"/>
-                <a:ea typeface="FiraCode Nerd Font" panose="020B0809050000020004" pitchFamily="49" charset="0"/>
-              </a:rPr>
-              <a:t>-difficulty assumption.</a:t>
+              <a:t>I excluded students without valid GPAs, and the subject “Norwegian as a Second Language” from my analyses, leading to a dataset of 60,618 observations and 12 teacher-assigned grades, 3 written- and 2 oral-exam grades.</a:t>
             </a:r>
           </a:p>
           <a:p>
@@ -1351,7 +1759,177 @@
                 <a:latin typeface="FiraCode Nerd Font" panose="020B0809050000020004" pitchFamily="49" charset="0"/>
                 <a:ea typeface="FiraCode Nerd Font" panose="020B0809050000020004" pitchFamily="49" charset="0"/>
               </a:rPr>
-              <a:t>This study therefore wishes to contribute to the academic and policy debates by examining the inter-subject difficulties in Norway’s GPA computation.</a:t>
+              <a:t>I employed partial credit models (PCMs) for my analyses. PCMs are the polytomous analogous of Rasch models.</a:t>
+            </a:r>
+          </a:p>
+          <a:p>
+            <a:pPr eaLnBrk="1" hangingPunct="1"/>
+            <a:r>
+              <a:rPr lang="en-AU" altLang="nb-NO" sz="1200" noProof="0" dirty="0">
+                <a:latin typeface="FiraCode Nerd Font" panose="020B0809050000020004" pitchFamily="49" charset="0"/>
+                <a:ea typeface="FiraCode Nerd Font" panose="020B0809050000020004" pitchFamily="49" charset="0"/>
+              </a:rPr>
+              <a:t>It is particularly suited for the current study because GPAs are constructed as unweighted sums, therefore requiring the same discrimination parameters.</a:t>
+            </a:r>
+          </a:p>
+          <a:p>
+            <a:pPr eaLnBrk="1" hangingPunct="1"/>
+            <a:endParaRPr lang="en-AU" altLang="nb-NO" sz="1200" noProof="0" dirty="0">
+              <a:latin typeface="FiraCode Nerd Font" panose="020B0809050000020004" pitchFamily="49" charset="0"/>
+              <a:ea typeface="FiraCode Nerd Font" panose="020B0809050000020004" pitchFamily="49" charset="0"/>
+            </a:endParaRPr>
+          </a:p>
+          <a:p>
+            <a:pPr eaLnBrk="1" hangingPunct="1"/>
+            <a:r>
+              <a:rPr lang="en-AU" altLang="nb-NO" sz="1200" noProof="0" dirty="0">
+                <a:latin typeface="FiraCode Nerd Font" panose="020B0809050000020004" pitchFamily="49" charset="0"/>
+                <a:ea typeface="FiraCode Nerd Font" panose="020B0809050000020004" pitchFamily="49" charset="0"/>
+              </a:rPr>
+              <a:t>A PCM generates a series of probability curves, as shown in this diagram.</a:t>
+            </a:r>
+          </a:p>
+          <a:p>
+            <a:pPr eaLnBrk="1" hangingPunct="1"/>
+            <a:r>
+              <a:rPr lang="en-AU" altLang="nb-NO" sz="1200" noProof="0" dirty="0">
+                <a:latin typeface="FiraCode Nerd Font" panose="020B0809050000020004" pitchFamily="49" charset="0"/>
+                <a:ea typeface="FiraCode Nerd Font" panose="020B0809050000020004" pitchFamily="49" charset="0"/>
+              </a:rPr>
+              <a:t>The horizontal axis represents students’ competency (usually represented by the Greek letter </a:t>
+            </a:r>
+            <a:r>
+              <a:rPr lang="el-GR" altLang="nb-NO" sz="1200" noProof="0" dirty="0">
+                <a:latin typeface="CMU Serif" panose="02000603000000000000" pitchFamily="2" charset="0"/>
+                <a:ea typeface="CMU Serif" panose="02000603000000000000" pitchFamily="2" charset="0"/>
+                <a:cs typeface="CMU Serif" panose="02000603000000000000" pitchFamily="2" charset="0"/>
+              </a:rPr>
+              <a:t>θ</a:t>
+            </a:r>
+            <a:r>
+              <a:rPr lang="en-AU" altLang="nb-NO" sz="1200" noProof="0" dirty="0">
+                <a:latin typeface="FiraCode Nerd Font" panose="020B0809050000020004" pitchFamily="49" charset="0"/>
+                <a:ea typeface="FiraCode Nerd Font" panose="020B0809050000020004" pitchFamily="49" charset="0"/>
+              </a:rPr>
+              <a:t>), with low competency on the left and high on the right.</a:t>
+            </a:r>
+          </a:p>
+          <a:p>
+            <a:pPr eaLnBrk="1" hangingPunct="1"/>
+            <a:r>
+              <a:rPr lang="en-AU" altLang="nb-NO" sz="1200" noProof="0" dirty="0">
+                <a:latin typeface="FiraCode Nerd Font" panose="020B0809050000020004" pitchFamily="49" charset="0"/>
+                <a:ea typeface="FiraCode Nerd Font" panose="020B0809050000020004" pitchFamily="49" charset="0"/>
+              </a:rPr>
+              <a:t>The vertical axis represents probabilities, ranging from 0 to 1.</a:t>
+            </a:r>
+          </a:p>
+          <a:p>
+            <a:pPr eaLnBrk="1" hangingPunct="1"/>
+            <a:endParaRPr lang="en-AU" altLang="nb-NO" sz="1200" noProof="0" dirty="0">
+              <a:latin typeface="FiraCode Nerd Font" panose="020B0809050000020004" pitchFamily="49" charset="0"/>
+              <a:ea typeface="FiraCode Nerd Font" panose="020B0809050000020004" pitchFamily="49" charset="0"/>
+            </a:endParaRPr>
+          </a:p>
+          <a:p>
+            <a:pPr eaLnBrk="1" hangingPunct="1"/>
+            <a:r>
+              <a:rPr lang="en-AU" altLang="nb-NO" sz="1200" noProof="0" dirty="0">
+                <a:latin typeface="FiraCode Nerd Font" panose="020B0809050000020004" pitchFamily="49" charset="0"/>
+                <a:ea typeface="FiraCode Nerd Font" panose="020B0809050000020004" pitchFamily="49" charset="0"/>
+              </a:rPr>
+              <a:t>Taking the red curve “P4” as an example:</a:t>
+            </a:r>
+          </a:p>
+          <a:p>
+            <a:pPr eaLnBrk="1" hangingPunct="1"/>
+            <a:r>
+              <a:rPr lang="en-AU" altLang="nb-NO" sz="1200" noProof="0" dirty="0">
+                <a:latin typeface="FiraCode Nerd Font" panose="020B0809050000020004" pitchFamily="49" charset="0"/>
+                <a:ea typeface="FiraCode Nerd Font" panose="020B0809050000020004" pitchFamily="49" charset="0"/>
+              </a:rPr>
+              <a:t>Students with average competencies (</a:t>
+            </a:r>
+            <a:r>
+              <a:rPr lang="el-GR" altLang="nb-NO" sz="1200" noProof="0" dirty="0">
+                <a:latin typeface="CMU Serif" panose="02000603000000000000" pitchFamily="2" charset="0"/>
+                <a:ea typeface="CMU Serif" panose="02000603000000000000" pitchFamily="2" charset="0"/>
+                <a:cs typeface="CMU Serif" panose="02000603000000000000" pitchFamily="2" charset="0"/>
+              </a:rPr>
+              <a:t>θ</a:t>
+            </a:r>
+            <a:r>
+              <a:rPr lang="en-AU" altLang="nb-NO" sz="1200" noProof="0" dirty="0">
+                <a:latin typeface="CMU Serif" panose="02000603000000000000" pitchFamily="2" charset="0"/>
+                <a:ea typeface="CMU Serif" panose="02000603000000000000" pitchFamily="2" charset="0"/>
+                <a:cs typeface="CMU Serif" panose="02000603000000000000" pitchFamily="2" charset="0"/>
+              </a:rPr>
+              <a:t> = </a:t>
+            </a:r>
+            <a:r>
+              <a:rPr lang="en-AU" altLang="nb-NO" sz="1200" noProof="0" dirty="0">
+                <a:latin typeface="FiraCode Nerd Font" panose="020B0809050000020004" pitchFamily="49" charset="0"/>
+                <a:ea typeface="FiraCode Nerd Font" panose="020B0809050000020004" pitchFamily="49" charset="0"/>
+                <a:cs typeface="CMU Serif" panose="02000603000000000000" pitchFamily="2" charset="0"/>
+              </a:rPr>
+              <a:t>0</a:t>
+            </a:r>
+            <a:r>
+              <a:rPr lang="en-AU" altLang="nb-NO" sz="1200" noProof="0" dirty="0">
+                <a:latin typeface="FiraCode Nerd Font" panose="020B0809050000020004" pitchFamily="49" charset="0"/>
+                <a:ea typeface="FiraCode Nerd Font" panose="020B0809050000020004" pitchFamily="49" charset="0"/>
+              </a:rPr>
+              <a:t>) are most likely to receive a grade of 4 in Written Norwegian.</a:t>
+            </a:r>
+          </a:p>
+          <a:p>
+            <a:pPr eaLnBrk="1" hangingPunct="1"/>
+            <a:r>
+              <a:rPr lang="en-AU" altLang="nb-NO" sz="1200" noProof="0" dirty="0">
+                <a:latin typeface="FiraCode Nerd Font" panose="020B0809050000020004" pitchFamily="49" charset="0"/>
+                <a:ea typeface="FiraCode Nerd Font" panose="020B0809050000020004" pitchFamily="49" charset="0"/>
+              </a:rPr>
+              <a:t>As the competency increases to, say </a:t>
+            </a:r>
+            <a:r>
+              <a:rPr lang="el-GR" altLang="nb-NO" sz="1200" noProof="0" dirty="0">
+                <a:latin typeface="CMU Serif" panose="02000603000000000000" pitchFamily="2" charset="0"/>
+                <a:ea typeface="CMU Serif" panose="02000603000000000000" pitchFamily="2" charset="0"/>
+                <a:cs typeface="CMU Serif" panose="02000603000000000000" pitchFamily="2" charset="0"/>
+              </a:rPr>
+              <a:t>θ</a:t>
+            </a:r>
+            <a:r>
+              <a:rPr lang="en-AU" altLang="nb-NO" sz="1200" noProof="0" dirty="0">
+                <a:latin typeface="CMU Serif" panose="02000603000000000000" pitchFamily="2" charset="0"/>
+                <a:ea typeface="CMU Serif" panose="02000603000000000000" pitchFamily="2" charset="0"/>
+                <a:cs typeface="CMU Serif" panose="02000603000000000000" pitchFamily="2" charset="0"/>
+              </a:rPr>
+              <a:t> = </a:t>
+            </a:r>
+            <a:r>
+              <a:rPr lang="en-AU" altLang="nb-NO" sz="1200" noProof="0" dirty="0">
+                <a:latin typeface="FiraCode Nerd Font" panose="020B0809050000020004" pitchFamily="49" charset="0"/>
+                <a:ea typeface="FiraCode Nerd Font" panose="020B0809050000020004" pitchFamily="49" charset="0"/>
+              </a:rPr>
+              <a:t>3, the probability of receiving 4 in Written Norwegian drops, while the probability of receiving a grade of 5 increases.</a:t>
+            </a:r>
+          </a:p>
+          <a:p>
+            <a:pPr eaLnBrk="1" hangingPunct="1"/>
+            <a:endParaRPr lang="en-AU" altLang="nb-NO" sz="1200" noProof="0" dirty="0">
+              <a:latin typeface="FiraCode Nerd Font" panose="020B0809050000020004" pitchFamily="49" charset="0"/>
+              <a:ea typeface="FiraCode Nerd Font" panose="020B0809050000020004" pitchFamily="49" charset="0"/>
+            </a:endParaRPr>
+          </a:p>
+          <a:p>
+            <a:pPr eaLnBrk="1" hangingPunct="1"/>
+            <a:r>
+              <a:rPr lang="en-AU" altLang="nb-NO" sz="1200" noProof="0" dirty="0">
+                <a:latin typeface="FiraCode Nerd Font" panose="020B0809050000020004" pitchFamily="49" charset="0"/>
+                <a:ea typeface="FiraCode Nerd Font" panose="020B0809050000020004" pitchFamily="49" charset="0"/>
+              </a:rPr>
+              <a:t>At certain point, the red curve “P4” crosses the yellow curve “P5”, signalling that students at this point is switching from being “more likely to be a 4” to “more likely to be a 5”. This switching point is marked as “b_4” in this study.</a:t>
             </a:r>
           </a:p>
         </p:txBody>
@@ -1359,7 +1937,7 @@
     </p:spTree>
     <p:extLst>
       <p:ext uri="{BB962C8B-B14F-4D97-AF65-F5344CB8AC3E}">
-        <p14:creationId xmlns:p14="http://schemas.microsoft.com/office/powerpoint/2010/main" val="4169346730"/>
+        <p14:creationId xmlns:p14="http://schemas.microsoft.com/office/powerpoint/2010/main" val="688779559"/>
       </p:ext>
     </p:extLst>
   </p:cSld>
@@ -1369,7 +1947,7 @@
 </p:notes>
 </file>
 
-<file path=ppt/notesSlides/notesSlide3.xml><?xml version="1.0" encoding="utf-8"?>
+<file path=ppt/notesSlides/notesSlide5.xml><?xml version="1.0" encoding="utf-8"?>
 <p:notes xmlns:a="http://schemas.openxmlformats.org/drawingml/2006/main" xmlns:r="http://schemas.openxmlformats.org/officeDocument/2006/relationships" xmlns:p="http://schemas.openxmlformats.org/presentationml/2006/main">
   <p:cSld>
     <p:spTree>
@@ -1556,7 +2134,7 @@
                   <a:spcPct val="0"/>
                 </a:spcBef>
               </a:pPr>
-              <a:t>4</a:t>
+              <a:t>6</a:t>
             </a:fld>
             <a:endParaRPr lang="en-US" altLang="nb-NO" sz="1200"/>
           </a:p>
@@ -1619,31 +2197,7 @@
                 <a:latin typeface="FiraCode Nerd Font" panose="020B0809050000020004" pitchFamily="49" charset="0"/>
                 <a:ea typeface="FiraCode Nerd Font" panose="020B0809050000020004" pitchFamily="49" charset="0"/>
               </a:rPr>
-              <a:t>Under the Norwegian system, both teacher-assigned grades (</a:t>
-            </a:r>
-            <a:r>
-              <a:rPr lang="en-AU" altLang="nb-NO" sz="1200" noProof="0" dirty="0" err="1">
-                <a:latin typeface="FiraCode Nerd Font" panose="020B0809050000020004" pitchFamily="49" charset="0"/>
-                <a:ea typeface="FiraCode Nerd Font" panose="020B0809050000020004" pitchFamily="49" charset="0"/>
-              </a:rPr>
-              <a:t>standpunkt</a:t>
-            </a:r>
-            <a:r>
-              <a:rPr lang="en-AU" altLang="nb-NO" sz="1200" noProof="0" dirty="0">
-                <a:latin typeface="FiraCode Nerd Font" panose="020B0809050000020004" pitchFamily="49" charset="0"/>
-                <a:ea typeface="FiraCode Nerd Font" panose="020B0809050000020004" pitchFamily="49" charset="0"/>
-              </a:rPr>
-              <a:t>) and exam grades are included in the GPA calculation.</a:t>
-            </a:r>
-          </a:p>
-          <a:p>
-            <a:pPr eaLnBrk="1" hangingPunct="1"/>
-            <a:r>
-              <a:rPr lang="en-AU" altLang="nb-NO" sz="1200" noProof="0" dirty="0">
-                <a:latin typeface="FiraCode Nerd Font" panose="020B0809050000020004" pitchFamily="49" charset="0"/>
-                <a:ea typeface="FiraCode Nerd Font" panose="020B0809050000020004" pitchFamily="49" charset="0"/>
-              </a:rPr>
-              <a:t>Both teacher-assigned and exam grades are integers between 1 and 6, with 6 being the top grade.</a:t>
+              <a:t>This slide presents visual summaries of the “b” parameters derived from PCMs.</a:t>
             </a:r>
           </a:p>
           <a:p>
@@ -1660,17 +2214,21 @@
                 <a:latin typeface="FiraCode Nerd Font" panose="020B0809050000020004" pitchFamily="49" charset="0"/>
                 <a:ea typeface="FiraCode Nerd Font" panose="020B0809050000020004" pitchFamily="49" charset="0"/>
               </a:rPr>
-              <a:t>Students receive grades from their teachers on 13 compulsory subjects, such as Norwegian, English, mathematics, natural sciences and social sciences, etc, as well as from a wide selection of electives.</a:t>
-            </a:r>
-          </a:p>
-          <a:p>
-            <a:pPr eaLnBrk="1" hangingPunct="1"/>
+              <a:t>Difficulty parameters of the 12 compulsory subjects (</a:t>
+            </a:r>
+            <a:r>
+              <a:rPr lang="en-AU" altLang="nb-NO" sz="1200" noProof="0" dirty="0" err="1">
+                <a:latin typeface="FiraCode Nerd Font" panose="020B0809050000020004" pitchFamily="49" charset="0"/>
+                <a:ea typeface="FiraCode Nerd Font" panose="020B0809050000020004" pitchFamily="49" charset="0"/>
+              </a:rPr>
+              <a:t>ie</a:t>
+            </a:r>
             <a:r>
               <a:rPr lang="en-AU" altLang="nb-NO" sz="1200" noProof="0" dirty="0">
                 <a:latin typeface="FiraCode Nerd Font" panose="020B0809050000020004" pitchFamily="49" charset="0"/>
                 <a:ea typeface="FiraCode Nerd Font" panose="020B0809050000020004" pitchFamily="49" charset="0"/>
               </a:rPr>
-              <a:t>Exams consist of both written and oral forms.</a:t>
+              <a:t>, teacher-assigned grades) are grouped on the left panel, in descending order.</a:t>
             </a:r>
           </a:p>
           <a:p>
@@ -1680,17 +2238,7 @@
                 <a:latin typeface="FiraCode Nerd Font" panose="020B0809050000020004" pitchFamily="49" charset="0"/>
                 <a:ea typeface="FiraCode Nerd Font" panose="020B0809050000020004" pitchFamily="49" charset="0"/>
               </a:rPr>
-              <a:t>	The written form covers Mathematics, Norwegian and English, and,</a:t>
-            </a:r>
-          </a:p>
-          <a:p>
-            <a:pPr eaLnBrk="1" hangingPunct="1"/>
-            <a:r>
-              <a:rPr lang="en-AU" altLang="nb-NO" sz="1200" noProof="0" dirty="0">
-                <a:latin typeface="FiraCode Nerd Font" panose="020B0809050000020004" pitchFamily="49" charset="0"/>
-                <a:ea typeface="FiraCode Nerd Font" panose="020B0809050000020004" pitchFamily="49" charset="0"/>
-              </a:rPr>
-              <a:t>	the oral form covers Norwegian, English, as well as other subjects.</a:t>
+              <a:t>For the purpose of enhancing comparability, difficulty parameters of the exam grades are presented in pairs with their teacher-assigned counterparts in the right panel.</a:t>
             </a:r>
           </a:p>
           <a:p>
@@ -1707,7 +2255,7 @@
                 <a:latin typeface="FiraCode Nerd Font" panose="020B0809050000020004" pitchFamily="49" charset="0"/>
                 <a:ea typeface="FiraCode Nerd Font" panose="020B0809050000020004" pitchFamily="49" charset="0"/>
               </a:rPr>
-              <a:t>While every student receives teacher-assigned grades (that is, 100% sampling), the student cohort is divided evenly between participating in mathematics, Norwegian and English tests, giving exam grades a 33% sampling probability.</a:t>
+              <a:t>Let’s first of all examine the teacher-assigned grades:</a:t>
             </a:r>
           </a:p>
           <a:p>
@@ -1717,7 +2265,47 @@
                 <a:latin typeface="FiraCode Nerd Font" panose="020B0809050000020004" pitchFamily="49" charset="0"/>
                 <a:ea typeface="FiraCode Nerd Font" panose="020B0809050000020004" pitchFamily="49" charset="0"/>
               </a:rPr>
-              <a:t>Although 2/3 of the exam grades are missing for each exam subject, such situation can be safely modelled under missing completely at random (MCAR) assumptions due to random assignment.</a:t>
+              <a:t>The b_5 line on the top is relative flat, while the b_4, b_3, down to b_1 lines are increasingly downward-sloping.</a:t>
+            </a:r>
+          </a:p>
+          <a:p>
+            <a:pPr eaLnBrk="1" hangingPunct="1"/>
+            <a:r>
+              <a:rPr lang="en-AU" altLang="nb-NO" sz="1200" noProof="0" dirty="0">
+                <a:latin typeface="FiraCode Nerd Font" panose="020B0809050000020004" pitchFamily="49" charset="0"/>
+                <a:ea typeface="FiraCode Nerd Font" panose="020B0809050000020004" pitchFamily="49" charset="0"/>
+              </a:rPr>
+              <a:t>This “fanning out“ effect suggests a partial answer to the research question:</a:t>
+            </a:r>
+          </a:p>
+          <a:p>
+            <a:pPr eaLnBrk="1" hangingPunct="1"/>
+            <a:r>
+              <a:rPr lang="en-AU" altLang="nb-NO" sz="1200" noProof="0" dirty="0">
+                <a:latin typeface="FiraCode Nerd Font" panose="020B0809050000020004" pitchFamily="49" charset="0"/>
+                <a:ea typeface="FiraCode Nerd Font" panose="020B0809050000020004" pitchFamily="49" charset="0"/>
+              </a:rPr>
+              <a:t>	“Yes, subjects difficulties did differ—more so for the lower grades.”</a:t>
+            </a:r>
+          </a:p>
+          <a:p>
+            <a:pPr eaLnBrk="1" hangingPunct="1"/>
+            <a:r>
+              <a:rPr lang="en-AU" altLang="nb-NO" sz="1200" noProof="0" dirty="0">
+                <a:latin typeface="FiraCode Nerd Font" panose="020B0809050000020004" pitchFamily="49" charset="0"/>
+                <a:ea typeface="FiraCode Nerd Font" panose="020B0809050000020004" pitchFamily="49" charset="0"/>
+              </a:rPr>
+              <a:t>In fact, a Grade 2 in the easiest subject (Food and Health) shared similar “b” parameter with a Grade 1 in the hardest subject (Mathematics).</a:t>
+            </a:r>
+          </a:p>
+          <a:p>
+            <a:pPr eaLnBrk="1" hangingPunct="1"/>
+            <a:r>
+              <a:rPr lang="en-AU" altLang="nb-NO" sz="1200" noProof="0" dirty="0">
+                <a:latin typeface="FiraCode Nerd Font" panose="020B0809050000020004" pitchFamily="49" charset="0"/>
+                <a:ea typeface="FiraCode Nerd Font" panose="020B0809050000020004" pitchFamily="49" charset="0"/>
+              </a:rPr>
+              <a:t>Such differences, however, were minimum among the top grades 5 and 6.</a:t>
             </a:r>
           </a:p>
           <a:p>
@@ -1734,21 +2322,67 @@
                 <a:latin typeface="FiraCode Nerd Font" panose="020B0809050000020004" pitchFamily="49" charset="0"/>
                 <a:ea typeface="FiraCode Nerd Font" panose="020B0809050000020004" pitchFamily="49" charset="0"/>
               </a:rPr>
-              <a:t>GPA is then computed as the unweighted sum divided by the number of subjects (</a:t>
-            </a:r>
-            <a:r>
-              <a:rPr lang="en-AU" altLang="nb-NO" sz="1200" noProof="0" dirty="0" err="1">
-                <a:latin typeface="FiraCode Nerd Font" panose="020B0809050000020004" pitchFamily="49" charset="0"/>
-                <a:ea typeface="FiraCode Nerd Font" panose="020B0809050000020004" pitchFamily="49" charset="0"/>
-              </a:rPr>
-              <a:t>ie</a:t>
-            </a:r>
+              <a:t>From the right panel, differences between teacher- and examiner-assigned marks also showed interesting patterns.</a:t>
+            </a:r>
+          </a:p>
+          <a:p>
+            <a:pPr eaLnBrk="1" hangingPunct="1"/>
             <a:r>
               <a:rPr lang="en-AU" altLang="nb-NO" sz="1200" noProof="0" dirty="0">
                 <a:latin typeface="FiraCode Nerd Font" panose="020B0809050000020004" pitchFamily="49" charset="0"/>
                 <a:ea typeface="FiraCode Nerd Font" panose="020B0809050000020004" pitchFamily="49" charset="0"/>
               </a:rPr>
-              <a:t>, a simple average), multiplied by 10, then rounded to two decimal points.</a:t>
+              <a:t>It is first of all noticeable that written exams all had upward-sloping curves, while oral exams had downward-sloping ones.</a:t>
+            </a:r>
+          </a:p>
+          <a:p>
+            <a:pPr eaLnBrk="1" hangingPunct="1"/>
+            <a:r>
+              <a:rPr lang="en-AU" altLang="nb-NO" sz="1200" noProof="0" dirty="0">
+                <a:latin typeface="FiraCode Nerd Font" panose="020B0809050000020004" pitchFamily="49" charset="0"/>
+                <a:ea typeface="FiraCode Nerd Font" panose="020B0809050000020004" pitchFamily="49" charset="0"/>
+              </a:rPr>
+              <a:t>On the surface, this pattern suggests that examiners were stricter than teachers in marking written tests, but more lenient in oral exams.</a:t>
+            </a:r>
+          </a:p>
+          <a:p>
+            <a:pPr eaLnBrk="1" hangingPunct="1"/>
+            <a:r>
+              <a:rPr lang="en-AU" altLang="nb-NO" sz="1200" noProof="0" dirty="0">
+                <a:latin typeface="FiraCode Nerd Font" panose="020B0809050000020004" pitchFamily="49" charset="0"/>
+                <a:ea typeface="FiraCode Nerd Font" panose="020B0809050000020004" pitchFamily="49" charset="0"/>
+              </a:rPr>
+              <a:t>The second strand of the answer to the research question therefore can be:</a:t>
+            </a:r>
+          </a:p>
+          <a:p>
+            <a:pPr eaLnBrk="1" hangingPunct="1"/>
+            <a:r>
+              <a:rPr lang="en-AU" altLang="nb-NO" sz="1200" noProof="0" dirty="0">
+                <a:latin typeface="FiraCode Nerd Font" panose="020B0809050000020004" pitchFamily="49" charset="0"/>
+                <a:ea typeface="FiraCode Nerd Font" panose="020B0809050000020004" pitchFamily="49" charset="0"/>
+              </a:rPr>
+              <a:t>	“Yes, exam grades differ from teacher-assigned grades, depending on the form of examination.”</a:t>
+            </a:r>
+          </a:p>
+          <a:p>
+            <a:pPr eaLnBrk="1" hangingPunct="1"/>
+            <a:r>
+              <a:rPr lang="en-AU" altLang="nb-NO" sz="1200" noProof="0" dirty="0">
+                <a:latin typeface="FiraCode Nerd Font" panose="020B0809050000020004" pitchFamily="49" charset="0"/>
+                <a:ea typeface="FiraCode Nerd Font" panose="020B0809050000020004" pitchFamily="49" charset="0"/>
+              </a:rPr>
+              <a:t>Contrary to the previous observation form the left panel, slopes in the right panel were the steepest on the top end, suggesting larger disagreement between teachers and examiners for awarding grade 5s and 6s while disagreement remained minimum for lower grades.</a:t>
+            </a:r>
+          </a:p>
+          <a:p>
+            <a:pPr eaLnBrk="1" hangingPunct="1"/>
+            <a:r>
+              <a:rPr lang="en-AU" altLang="nb-NO" sz="1200" noProof="0" dirty="0">
+                <a:latin typeface="FiraCode Nerd Font" panose="020B0809050000020004" pitchFamily="49" charset="0"/>
+                <a:ea typeface="FiraCode Nerd Font" panose="020B0809050000020004" pitchFamily="49" charset="0"/>
+              </a:rPr>
+              <a:t>Amongst the 5 exams, Written Norwegian stood out as the subject with the largest teacher-examiner disagreement.</a:t>
             </a:r>
           </a:p>
         </p:txBody>
@@ -1756,7 +2390,7 @@
     </p:spTree>
     <p:extLst>
       <p:ext uri="{BB962C8B-B14F-4D97-AF65-F5344CB8AC3E}">
-        <p14:creationId xmlns:p14="http://schemas.microsoft.com/office/powerpoint/2010/main" val="2869485746"/>
+        <p14:creationId xmlns:p14="http://schemas.microsoft.com/office/powerpoint/2010/main" val="41959551"/>
       </p:ext>
     </p:extLst>
   </p:cSld>
@@ -1766,7 +2400,7 @@
 </p:notes>
 </file>
 
-<file path=ppt/notesSlides/notesSlide4.xml><?xml version="1.0" encoding="utf-8"?>
+<file path=ppt/notesSlides/notesSlide6.xml><?xml version="1.0" encoding="utf-8"?>
 <p:notes xmlns:a="http://schemas.openxmlformats.org/drawingml/2006/main" xmlns:r="http://schemas.openxmlformats.org/officeDocument/2006/relationships" xmlns:p="http://schemas.openxmlformats.org/presentationml/2006/main">
   <p:cSld>
     <p:spTree>
@@ -1953,7 +2587,7 @@
                   <a:spcPct val="0"/>
                 </a:spcBef>
               </a:pPr>
-              <a:t>5</a:t>
+              <a:t>7</a:t>
             </a:fld>
             <a:endParaRPr lang="en-US" altLang="nb-NO" sz="1200"/>
           </a:p>
@@ -2016,7 +2650,7 @@
                 <a:latin typeface="FiraCode Nerd Font" panose="020B0809050000020004" pitchFamily="49" charset="0"/>
                 <a:ea typeface="FiraCode Nerd Font" panose="020B0809050000020004" pitchFamily="49" charset="0"/>
               </a:rPr>
-              <a:t>With such background in mind, I may now describe the current study.</a:t>
+              <a:t>This slide presents visual summaries of the “b” parameters derived from PCMs.</a:t>
             </a:r>
           </a:p>
           <a:p>
@@ -2033,17 +2667,31 @@
                 <a:latin typeface="FiraCode Nerd Font" panose="020B0809050000020004" pitchFamily="49" charset="0"/>
                 <a:ea typeface="FiraCode Nerd Font" panose="020B0809050000020004" pitchFamily="49" charset="0"/>
               </a:rPr>
-              <a:t>This study draws its data from Norway’s national register.</a:t>
-            </a:r>
-          </a:p>
-          <a:p>
-            <a:pPr eaLnBrk="1" hangingPunct="1"/>
+              <a:t>Difficulty parameters of the 12 compulsory subjects (</a:t>
+            </a:r>
+            <a:r>
+              <a:rPr lang="en-AU" altLang="nb-NO" sz="1200" noProof="0" dirty="0" err="1">
+                <a:latin typeface="FiraCode Nerd Font" panose="020B0809050000020004" pitchFamily="49" charset="0"/>
+                <a:ea typeface="FiraCode Nerd Font" panose="020B0809050000020004" pitchFamily="49" charset="0"/>
+              </a:rPr>
+              <a:t>ie</a:t>
+            </a:r>
             <a:r>
               <a:rPr lang="en-AU" altLang="nb-NO" sz="1200" noProof="0" dirty="0">
                 <a:latin typeface="FiraCode Nerd Font" panose="020B0809050000020004" pitchFamily="49" charset="0"/>
                 <a:ea typeface="FiraCode Nerd Font" panose="020B0809050000020004" pitchFamily="49" charset="0"/>
               </a:rPr>
-              <a:t>This data source is unique such that it is the population, not samples, that is the subject of analyses.</a:t>
+              <a:t>, teacher-assigned grades) are grouped on the left panel, in descending order.</a:t>
+            </a:r>
+          </a:p>
+          <a:p>
+            <a:pPr eaLnBrk="1" hangingPunct="1"/>
+            <a:r>
+              <a:rPr lang="en-AU" altLang="nb-NO" sz="1200" noProof="0" dirty="0">
+                <a:latin typeface="FiraCode Nerd Font" panose="020B0809050000020004" pitchFamily="49" charset="0"/>
+                <a:ea typeface="FiraCode Nerd Font" panose="020B0809050000020004" pitchFamily="49" charset="0"/>
+              </a:rPr>
+              <a:t>For the purpose of enhancing comparability, difficulty parameters of the exam grades are presented in pairs with their teacher-assigned counterparts in the right panel.</a:t>
             </a:r>
           </a:p>
           <a:p>
@@ -2060,7 +2708,57 @@
                 <a:latin typeface="FiraCode Nerd Font" panose="020B0809050000020004" pitchFamily="49" charset="0"/>
                 <a:ea typeface="FiraCode Nerd Font" panose="020B0809050000020004" pitchFamily="49" charset="0"/>
               </a:rPr>
-              <a:t>The targeted population is the Year 10 cohort in the administrative year 2019, whose academic records reached the government database in June 2019.</a:t>
+              <a:t>Let’s first of all examine the teacher-assigned grades:</a:t>
+            </a:r>
+          </a:p>
+          <a:p>
+            <a:pPr eaLnBrk="1" hangingPunct="1"/>
+            <a:r>
+              <a:rPr lang="en-AU" altLang="nb-NO" sz="1200" noProof="0" dirty="0">
+                <a:latin typeface="FiraCode Nerd Font" panose="020B0809050000020004" pitchFamily="49" charset="0"/>
+                <a:ea typeface="FiraCode Nerd Font" panose="020B0809050000020004" pitchFamily="49" charset="0"/>
+              </a:rPr>
+              <a:t>The b_5 line on the top is relative flat, while the b_4, b_3, down to b_1 lines are increasingly downward-sloping.</a:t>
+            </a:r>
+          </a:p>
+          <a:p>
+            <a:pPr eaLnBrk="1" hangingPunct="1"/>
+            <a:r>
+              <a:rPr lang="en-AU" altLang="nb-NO" sz="1200" noProof="0" dirty="0">
+                <a:latin typeface="FiraCode Nerd Font" panose="020B0809050000020004" pitchFamily="49" charset="0"/>
+                <a:ea typeface="FiraCode Nerd Font" panose="020B0809050000020004" pitchFamily="49" charset="0"/>
+              </a:rPr>
+              <a:t>This “fanning out“ effect suggests a partial answer to the research question:</a:t>
+            </a:r>
+          </a:p>
+          <a:p>
+            <a:pPr eaLnBrk="1" hangingPunct="1"/>
+            <a:r>
+              <a:rPr lang="en-AU" altLang="nb-NO" sz="1200" noProof="0" dirty="0">
+                <a:latin typeface="FiraCode Nerd Font" panose="020B0809050000020004" pitchFamily="49" charset="0"/>
+                <a:ea typeface="FiraCode Nerd Font" panose="020B0809050000020004" pitchFamily="49" charset="0"/>
+              </a:rPr>
+              <a:t>	“Yes, subjects difficulties did differ—more so for the lower grades.”</a:t>
+            </a:r>
+          </a:p>
+          <a:p>
+            <a:pPr eaLnBrk="1" hangingPunct="1"/>
+            <a:r>
+              <a:rPr lang="en-AU" altLang="nb-NO" sz="1200" noProof="0" dirty="0">
+                <a:latin typeface="FiraCode Nerd Font" panose="020B0809050000020004" pitchFamily="49" charset="0"/>
+                <a:ea typeface="FiraCode Nerd Font" panose="020B0809050000020004" pitchFamily="49" charset="0"/>
+              </a:rPr>
+              <a:t>In fact, a Grade 2 in the easiest subject (Food and Health) shared similar “b” parameter with a Grade 1 in the hardest subject (Mathematics).</a:t>
+            </a:r>
+          </a:p>
+          <a:p>
+            <a:pPr eaLnBrk="1" hangingPunct="1"/>
+            <a:r>
+              <a:rPr lang="en-AU" altLang="nb-NO" sz="1200" noProof="0" dirty="0">
+                <a:latin typeface="FiraCode Nerd Font" panose="020B0809050000020004" pitchFamily="49" charset="0"/>
+                <a:ea typeface="FiraCode Nerd Font" panose="020B0809050000020004" pitchFamily="49" charset="0"/>
+              </a:rPr>
+              <a:t>Such differences, however, were minimum among the top grades 5 and 6.</a:t>
             </a:r>
           </a:p>
           <a:p>
@@ -2077,15 +2775,8 @@
                 <a:latin typeface="FiraCode Nerd Font" panose="020B0809050000020004" pitchFamily="49" charset="0"/>
                 <a:ea typeface="FiraCode Nerd Font" panose="020B0809050000020004" pitchFamily="49" charset="0"/>
               </a:rPr>
-              <a:t>I excluded students without valid GPAs, and the subject “Norwegian as a Second Language” from my analyses, leading to a dataset of 60,618 observations and 12 teacher-assigned grades, 3 written- and 2 oral-exam grades.</a:t>
-            </a:r>
-          </a:p>
-          <a:p>
-            <a:pPr eaLnBrk="1" hangingPunct="1"/>
-            <a:endParaRPr lang="en-AU" altLang="nb-NO" sz="1200" noProof="0" dirty="0">
-              <a:latin typeface="FiraCode Nerd Font" panose="020B0809050000020004" pitchFamily="49" charset="0"/>
-              <a:ea typeface="FiraCode Nerd Font" panose="020B0809050000020004" pitchFamily="49" charset="0"/>
-            </a:endParaRPr>
+              <a:t>From the right panel, differences between teacher- and examiner-assigned marks also showed interesting patterns.</a:t>
+            </a:r>
           </a:p>
           <a:p>
             <a:pPr eaLnBrk="1" hangingPunct="1"/>
@@ -2094,7 +2785,7 @@
                 <a:latin typeface="FiraCode Nerd Font" panose="020B0809050000020004" pitchFamily="49" charset="0"/>
                 <a:ea typeface="FiraCode Nerd Font" panose="020B0809050000020004" pitchFamily="49" charset="0"/>
               </a:rPr>
-              <a:t>I employed partial credit models (PCMs) for my analyses. PCMs are the polytomous analogous of Rasch models.</a:t>
+              <a:t>It is first of all noticeable that written exams all had upward-sloping curves, while oral exams had downward-sloping ones.</a:t>
             </a:r>
           </a:p>
           <a:p>
@@ -2104,15 +2795,8 @@
                 <a:latin typeface="FiraCode Nerd Font" panose="020B0809050000020004" pitchFamily="49" charset="0"/>
                 <a:ea typeface="FiraCode Nerd Font" panose="020B0809050000020004" pitchFamily="49" charset="0"/>
               </a:rPr>
-              <a:t>It is particularly suited for the current study because GPAs are constructed as unweighted sums, therefore requiring the same discrimination parameters.</a:t>
-            </a:r>
-          </a:p>
-          <a:p>
-            <a:pPr eaLnBrk="1" hangingPunct="1"/>
-            <a:endParaRPr lang="en-AU" altLang="nb-NO" sz="1200" noProof="0" dirty="0">
-              <a:latin typeface="FiraCode Nerd Font" panose="020B0809050000020004" pitchFamily="49" charset="0"/>
-              <a:ea typeface="FiraCode Nerd Font" panose="020B0809050000020004" pitchFamily="49" charset="0"/>
-            </a:endParaRPr>
+              <a:t>On the surface, this pattern suggests that examiners were stricter than teachers in marking written tests, but more lenient in oral exams.</a:t>
+            </a:r>
           </a:p>
           <a:p>
             <a:pPr eaLnBrk="1" hangingPunct="1"/>
@@ -2121,7 +2805,7 @@
                 <a:latin typeface="FiraCode Nerd Font" panose="020B0809050000020004" pitchFamily="49" charset="0"/>
                 <a:ea typeface="FiraCode Nerd Font" panose="020B0809050000020004" pitchFamily="49" charset="0"/>
               </a:rPr>
-              <a:t>A PCM generates a series of probability curves, as shown in this diagram.</a:t>
+              <a:t>The second strand of the answer to the research question therefore can be:</a:t>
             </a:r>
           </a:p>
           <a:p>
@@ -2131,22 +2815,17 @@
                 <a:latin typeface="FiraCode Nerd Font" panose="020B0809050000020004" pitchFamily="49" charset="0"/>
                 <a:ea typeface="FiraCode Nerd Font" panose="020B0809050000020004" pitchFamily="49" charset="0"/>
               </a:rPr>
-              <a:t>The horizontal axis represents students’ competency (usually represented by the Greek letter </a:t>
-            </a:r>
-            <a:r>
-              <a:rPr lang="el-GR" altLang="nb-NO" sz="1200" noProof="0" dirty="0">
-                <a:latin typeface="CMU Serif" panose="02000603000000000000" pitchFamily="2" charset="0"/>
-                <a:ea typeface="CMU Serif" panose="02000603000000000000" pitchFamily="2" charset="0"/>
-                <a:cs typeface="CMU Serif" panose="02000603000000000000" pitchFamily="2" charset="0"/>
-              </a:rPr>
-              <a:t>θ</a:t>
-            </a:r>
+              <a:t>	“Yes, exam grades differ from teacher-assigned grades, depending on the form of examination.”</a:t>
+            </a:r>
+          </a:p>
+          <a:p>
+            <a:pPr eaLnBrk="1" hangingPunct="1"/>
             <a:r>
               <a:rPr lang="en-AU" altLang="nb-NO" sz="1200" noProof="0" dirty="0">
                 <a:latin typeface="FiraCode Nerd Font" panose="020B0809050000020004" pitchFamily="49" charset="0"/>
                 <a:ea typeface="FiraCode Nerd Font" panose="020B0809050000020004" pitchFamily="49" charset="0"/>
               </a:rPr>
-              <a:t>), with low competency on the left and high on the right.</a:t>
+              <a:t>Contrary to the previous observation form the left panel, slopes in the right panel were the steepest on the top end, suggesting larger disagreement between teachers and examiners for awarding grade 5s and 6s while disagreement remained minimum for lower grades.</a:t>
             </a:r>
           </a:p>
           <a:p>
@@ -2156,117 +2835,7 @@
                 <a:latin typeface="FiraCode Nerd Font" panose="020B0809050000020004" pitchFamily="49" charset="0"/>
                 <a:ea typeface="FiraCode Nerd Font" panose="020B0809050000020004" pitchFamily="49" charset="0"/>
               </a:rPr>
-              <a:t>The vertical axis represents probabilities, ranging from 0 to 1.</a:t>
-            </a:r>
-          </a:p>
-          <a:p>
-            <a:pPr eaLnBrk="1" hangingPunct="1"/>
-            <a:endParaRPr lang="en-AU" altLang="nb-NO" sz="1200" noProof="0" dirty="0">
-              <a:latin typeface="FiraCode Nerd Font" panose="020B0809050000020004" pitchFamily="49" charset="0"/>
-              <a:ea typeface="FiraCode Nerd Font" panose="020B0809050000020004" pitchFamily="49" charset="0"/>
-            </a:endParaRPr>
-          </a:p>
-          <a:p>
-            <a:pPr eaLnBrk="1" hangingPunct="1"/>
-            <a:r>
-              <a:rPr lang="en-AU" altLang="nb-NO" sz="1200" noProof="0" dirty="0">
-                <a:latin typeface="FiraCode Nerd Font" panose="020B0809050000020004" pitchFamily="49" charset="0"/>
-                <a:ea typeface="FiraCode Nerd Font" panose="020B0809050000020004" pitchFamily="49" charset="0"/>
-              </a:rPr>
-              <a:t>Taking the red curve “P4” as an example:</a:t>
-            </a:r>
-          </a:p>
-          <a:p>
-            <a:pPr eaLnBrk="1" hangingPunct="1"/>
-            <a:r>
-              <a:rPr lang="en-AU" altLang="nb-NO" sz="1200" noProof="0" dirty="0">
-                <a:latin typeface="FiraCode Nerd Font" panose="020B0809050000020004" pitchFamily="49" charset="0"/>
-                <a:ea typeface="FiraCode Nerd Font" panose="020B0809050000020004" pitchFamily="49" charset="0"/>
-              </a:rPr>
-              <a:t>Students with a competency score of </a:t>
-            </a:r>
-            <a:r>
-              <a:rPr lang="el-GR" altLang="nb-NO" sz="1200" noProof="0" dirty="0">
-                <a:latin typeface="CMU Serif" panose="02000603000000000000" pitchFamily="2" charset="0"/>
-                <a:ea typeface="CMU Serif" panose="02000603000000000000" pitchFamily="2" charset="0"/>
-                <a:cs typeface="CMU Serif" panose="02000603000000000000" pitchFamily="2" charset="0"/>
-              </a:rPr>
-              <a:t>θ</a:t>
-            </a:r>
-            <a:r>
-              <a:rPr lang="en-AU" altLang="nb-NO" sz="1200" noProof="0" dirty="0">
-                <a:latin typeface="CMU Serif" panose="02000603000000000000" pitchFamily="2" charset="0"/>
-                <a:ea typeface="CMU Serif" panose="02000603000000000000" pitchFamily="2" charset="0"/>
-                <a:cs typeface="CMU Serif" panose="02000603000000000000" pitchFamily="2" charset="0"/>
-              </a:rPr>
-              <a:t> = </a:t>
-            </a:r>
-            <a:r>
-              <a:rPr lang="en-AU" altLang="nb-NO" sz="1200" noProof="0" dirty="0">
-                <a:latin typeface="FiraCode Nerd Font" panose="020B0809050000020004" pitchFamily="49" charset="0"/>
-                <a:ea typeface="FiraCode Nerd Font" panose="020B0809050000020004" pitchFamily="49" charset="0"/>
-              </a:rPr>
-              <a:t>0 is most likely to receive a grade of 4.</a:t>
-            </a:r>
-          </a:p>
-          <a:p>
-            <a:pPr eaLnBrk="1" hangingPunct="1"/>
-            <a:r>
-              <a:rPr lang="en-AU" altLang="nb-NO" sz="1200" noProof="0" dirty="0">
-                <a:latin typeface="FiraCode Nerd Font" panose="020B0809050000020004" pitchFamily="49" charset="0"/>
-                <a:ea typeface="FiraCode Nerd Font" panose="020B0809050000020004" pitchFamily="49" charset="0"/>
-              </a:rPr>
-              <a:t>As the competency increases to, say </a:t>
-            </a:r>
-            <a:r>
-              <a:rPr lang="el-GR" altLang="nb-NO" sz="1200" noProof="0" dirty="0">
-                <a:latin typeface="CMU Serif" panose="02000603000000000000" pitchFamily="2" charset="0"/>
-                <a:ea typeface="CMU Serif" panose="02000603000000000000" pitchFamily="2" charset="0"/>
-                <a:cs typeface="CMU Serif" panose="02000603000000000000" pitchFamily="2" charset="0"/>
-              </a:rPr>
-              <a:t>θ</a:t>
-            </a:r>
-            <a:r>
-              <a:rPr lang="en-AU" altLang="nb-NO" sz="1200" noProof="0" dirty="0">
-                <a:latin typeface="CMU Serif" panose="02000603000000000000" pitchFamily="2" charset="0"/>
-                <a:ea typeface="CMU Serif" panose="02000603000000000000" pitchFamily="2" charset="0"/>
-                <a:cs typeface="CMU Serif" panose="02000603000000000000" pitchFamily="2" charset="0"/>
-              </a:rPr>
-              <a:t> = </a:t>
-            </a:r>
-            <a:r>
-              <a:rPr lang="en-AU" altLang="nb-NO" sz="1200" noProof="0" dirty="0">
-                <a:latin typeface="FiraCode Nerd Font" panose="020B0809050000020004" pitchFamily="49" charset="0"/>
-                <a:ea typeface="FiraCode Nerd Font" panose="020B0809050000020004" pitchFamily="49" charset="0"/>
-              </a:rPr>
-              <a:t>3, the probability of receiving 4 drops, while the probability of receiving a grade of 5 increases.</a:t>
-            </a:r>
-          </a:p>
-          <a:p>
-            <a:pPr eaLnBrk="1" hangingPunct="1"/>
-            <a:endParaRPr lang="en-AU" altLang="nb-NO" sz="1200" noProof="0" dirty="0">
-              <a:latin typeface="FiraCode Nerd Font" panose="020B0809050000020004" pitchFamily="49" charset="0"/>
-              <a:ea typeface="FiraCode Nerd Font" panose="020B0809050000020004" pitchFamily="49" charset="0"/>
-            </a:endParaRPr>
-          </a:p>
-          <a:p>
-            <a:pPr eaLnBrk="1" hangingPunct="1"/>
-            <a:r>
-              <a:rPr lang="en-AU" altLang="nb-NO" sz="1200" noProof="0" dirty="0">
-                <a:latin typeface="FiraCode Nerd Font" panose="020B0809050000020004" pitchFamily="49" charset="0"/>
-                <a:ea typeface="FiraCode Nerd Font" panose="020B0809050000020004" pitchFamily="49" charset="0"/>
-              </a:rPr>
-              <a:t>At certain point, the red curve “P4” crosses the yellow curve “P5”, signalling that students at this point is switching from being “more likely to be a 4” to “more likely to be a 5”. This switching point is marked as “b_4” in this study.</a:t>
-            </a:r>
-          </a:p>
-          <a:p>
-            <a:pPr eaLnBrk="1" hangingPunct="1"/>
-            <a:r>
-              <a:rPr lang="en-AU" altLang="nb-NO" sz="1200" noProof="0" dirty="0">
-                <a:latin typeface="FiraCode Nerd Font" panose="020B0809050000020004" pitchFamily="49" charset="0"/>
-                <a:ea typeface="FiraCode Nerd Font" panose="020B0809050000020004" pitchFamily="49" charset="0"/>
-              </a:rPr>
-              <a:t>Geometrically, these “b” parameters mark where the probability curves cross each other.</a:t>
+              <a:t>Amongst the 5 exams, Written Norwegian stood out as the subject with the largest teacher-examiner disagreement.</a:t>
             </a:r>
           </a:p>
         </p:txBody>
@@ -2274,7 +2843,7 @@
     </p:spTree>
     <p:extLst>
       <p:ext uri="{BB962C8B-B14F-4D97-AF65-F5344CB8AC3E}">
-        <p14:creationId xmlns:p14="http://schemas.microsoft.com/office/powerpoint/2010/main" val="1119406925"/>
+        <p14:creationId xmlns:p14="http://schemas.microsoft.com/office/powerpoint/2010/main" val="4181002907"/>
       </p:ext>
     </p:extLst>
   </p:cSld>
@@ -2284,7 +2853,7 @@
 </p:notes>
 </file>
 
-<file path=ppt/notesSlides/notesSlide5.xml><?xml version="1.0" encoding="utf-8"?>
+<file path=ppt/notesSlides/notesSlide7.xml><?xml version="1.0" encoding="utf-8"?>
 <p:notes xmlns:a="http://schemas.openxmlformats.org/drawingml/2006/main" xmlns:r="http://schemas.openxmlformats.org/officeDocument/2006/relationships" xmlns:p="http://schemas.openxmlformats.org/presentationml/2006/main">
   <p:cSld>
     <p:spTree>
@@ -2303,243 +2872,43 @@
       </p:grpSpPr>
       <p:sp>
         <p:nvSpPr>
-          <p:cNvPr id="6146" name="Rectangle 7"/>
-          <p:cNvSpPr>
-            <a:spLocks noGrp="1" noChangeArrowheads="1"/>
-          </p:cNvSpPr>
-          <p:nvPr>
-            <p:ph type="sldNum" sz="quarter" idx="5"/>
-          </p:nvPr>
-        </p:nvSpPr>
-        <p:spPr>
-          <a:noFill/>
-          <a:ln/>
-          <a:extLst>
-            <a:ext uri="{909E8E84-426E-40DD-AFC4-6F175D3DCCD1}">
-              <a14:hiddenFill xmlns:a14="http://schemas.microsoft.com/office/drawing/2010/main">
-                <a:solidFill>
-                  <a:srgbClr val="FFFFFF"/>
-                </a:solidFill>
-              </a14:hiddenFill>
-            </a:ext>
-            <a:ext uri="{91240B29-F687-4F45-9708-019B960494DF}">
-              <a14:hiddenLine xmlns:a14="http://schemas.microsoft.com/office/drawing/2010/main" w="9525">
-                <a:solidFill>
-                  <a:srgbClr val="000000"/>
-                </a:solidFill>
-                <a:miter lim="800000"/>
-                <a:headEnd/>
-                <a:tailEnd/>
-              </a14:hiddenLine>
-            </a:ext>
-          </a:extLst>
-        </p:spPr>
-        <p:txBody>
-          <a:bodyPr/>
-          <a:lstStyle>
-            <a:lvl1pPr eaLnBrk="0" hangingPunct="0">
-              <a:spcBef>
-                <a:spcPct val="30000"/>
-              </a:spcBef>
-              <a:defRPr sz="1000">
-                <a:solidFill>
-                  <a:schemeClr val="tx1"/>
-                </a:solidFill>
-                <a:latin typeface="Arial" charset="0"/>
-                <a:ea typeface="ヒラギノ角ゴ Pro W3" charset="-128"/>
-              </a:defRPr>
-            </a:lvl1pPr>
-            <a:lvl2pPr marL="37931725" indent="-37474525" eaLnBrk="0" hangingPunct="0">
-              <a:spcBef>
-                <a:spcPct val="30000"/>
-              </a:spcBef>
-              <a:defRPr sz="1000">
-                <a:solidFill>
-                  <a:schemeClr val="tx1"/>
-                </a:solidFill>
-                <a:latin typeface="Arial" charset="0"/>
-                <a:ea typeface="ヒラギノ角ゴ Pro W3" charset="-128"/>
-              </a:defRPr>
-            </a:lvl2pPr>
-            <a:lvl3pPr marL="1143000" indent="-228600" eaLnBrk="0" hangingPunct="0">
-              <a:spcBef>
-                <a:spcPct val="30000"/>
-              </a:spcBef>
-              <a:defRPr sz="1000">
-                <a:solidFill>
-                  <a:schemeClr val="tx1"/>
-                </a:solidFill>
-                <a:latin typeface="Arial" charset="0"/>
-                <a:ea typeface="ヒラギノ角ゴ Pro W3" charset="-128"/>
-              </a:defRPr>
-            </a:lvl3pPr>
-            <a:lvl4pPr marL="1600200" indent="-228600" eaLnBrk="0" hangingPunct="0">
-              <a:spcBef>
-                <a:spcPct val="30000"/>
-              </a:spcBef>
-              <a:defRPr sz="1000">
-                <a:solidFill>
-                  <a:schemeClr val="tx1"/>
-                </a:solidFill>
-                <a:latin typeface="Arial" charset="0"/>
-                <a:ea typeface="ヒラギノ角ゴ Pro W3" charset="-128"/>
-              </a:defRPr>
-            </a:lvl4pPr>
-            <a:lvl5pPr marL="2057400" indent="-228600" eaLnBrk="0" hangingPunct="0">
-              <a:spcBef>
-                <a:spcPct val="30000"/>
-              </a:spcBef>
-              <a:defRPr sz="1000">
-                <a:solidFill>
-                  <a:schemeClr val="tx1"/>
-                </a:solidFill>
-                <a:latin typeface="Arial" charset="0"/>
-                <a:ea typeface="ヒラギノ角ゴ Pro W3" charset="-128"/>
-              </a:defRPr>
-            </a:lvl5pPr>
-            <a:lvl6pPr marL="2514600" indent="-228600" eaLnBrk="0" fontAlgn="base" hangingPunct="0">
-              <a:spcBef>
-                <a:spcPct val="30000"/>
-              </a:spcBef>
-              <a:spcAft>
-                <a:spcPct val="0"/>
-              </a:spcAft>
-              <a:defRPr sz="1000">
-                <a:solidFill>
-                  <a:schemeClr val="tx1"/>
-                </a:solidFill>
-                <a:latin typeface="Arial" charset="0"/>
-                <a:ea typeface="ヒラギノ角ゴ Pro W3" charset="-128"/>
-              </a:defRPr>
-            </a:lvl6pPr>
-            <a:lvl7pPr marL="2971800" indent="-228600" eaLnBrk="0" fontAlgn="base" hangingPunct="0">
-              <a:spcBef>
-                <a:spcPct val="30000"/>
-              </a:spcBef>
-              <a:spcAft>
-                <a:spcPct val="0"/>
-              </a:spcAft>
-              <a:defRPr sz="1000">
-                <a:solidFill>
-                  <a:schemeClr val="tx1"/>
-                </a:solidFill>
-                <a:latin typeface="Arial" charset="0"/>
-                <a:ea typeface="ヒラギノ角ゴ Pro W3" charset="-128"/>
-              </a:defRPr>
-            </a:lvl7pPr>
-            <a:lvl8pPr marL="3429000" indent="-228600" eaLnBrk="0" fontAlgn="base" hangingPunct="0">
-              <a:spcBef>
-                <a:spcPct val="30000"/>
-              </a:spcBef>
-              <a:spcAft>
-                <a:spcPct val="0"/>
-              </a:spcAft>
-              <a:defRPr sz="1000">
-                <a:solidFill>
-                  <a:schemeClr val="tx1"/>
-                </a:solidFill>
-                <a:latin typeface="Arial" charset="0"/>
-                <a:ea typeface="ヒラギノ角ゴ Pro W3" charset="-128"/>
-              </a:defRPr>
-            </a:lvl8pPr>
-            <a:lvl9pPr marL="3886200" indent="-228600" eaLnBrk="0" fontAlgn="base" hangingPunct="0">
-              <a:spcBef>
-                <a:spcPct val="30000"/>
-              </a:spcBef>
-              <a:spcAft>
-                <a:spcPct val="0"/>
-              </a:spcAft>
-              <a:defRPr sz="1000">
-                <a:solidFill>
-                  <a:schemeClr val="tx1"/>
-                </a:solidFill>
-                <a:latin typeface="Arial" charset="0"/>
-                <a:ea typeface="ヒラギノ角ゴ Pro W3" charset="-128"/>
-              </a:defRPr>
-            </a:lvl9pPr>
-          </a:lstStyle>
-          <a:p>
-            <a:pPr>
-              <a:spcBef>
-                <a:spcPct val="0"/>
-              </a:spcBef>
-            </a:pPr>
-            <a:fld id="{1DFC7A55-10E7-4DC8-94C9-829C4F55AAF2}" type="slidenum">
-              <a:rPr lang="en-US" altLang="nb-NO" sz="1200" smtClean="0"/>
-              <a:pPr>
-                <a:spcBef>
-                  <a:spcPct val="0"/>
-                </a:spcBef>
-              </a:pPr>
-              <a:t>6</a:t>
-            </a:fld>
-            <a:endParaRPr lang="en-US" altLang="nb-NO" sz="1200"/>
-          </a:p>
-        </p:txBody>
-      </p:sp>
-      <p:sp>
-        <p:nvSpPr>
-          <p:cNvPr id="6147" name="Rectangle 2"/>
-          <p:cNvSpPr>
-            <a:spLocks noGrp="1" noRot="1" noChangeAspect="1" noChangeArrowheads="1" noTextEdit="1"/>
+          <p:cNvPr id="2" name="Slide Image Placeholder 1"/>
+          <p:cNvSpPr>
+            <a:spLocks noGrp="1" noRot="1" noChangeAspect="1"/>
           </p:cNvSpPr>
           <p:nvPr>
             <p:ph type="sldImg"/>
           </p:nvPr>
         </p:nvSpPr>
-        <p:spPr>
-          <a:ln/>
-        </p:spPr>
-      </p:sp>
-      <p:sp>
-        <p:nvSpPr>
-          <p:cNvPr id="6148" name="Rectangle 3"/>
-          <p:cNvSpPr>
-            <a:spLocks noGrp="1" noChangeArrowheads="1"/>
+        <p:spPr/>
+      </p:sp>
+      <p:sp>
+        <p:nvSpPr>
+          <p:cNvPr id="3" name="Notes Placeholder 2"/>
+          <p:cNvSpPr>
+            <a:spLocks noGrp="1"/>
           </p:cNvSpPr>
           <p:nvPr>
             <p:ph type="body" idx="1"/>
           </p:nvPr>
         </p:nvSpPr>
-        <p:spPr>
-          <a:noFill/>
-          <a:ln/>
-          <a:extLst>
-            <a:ext uri="{909E8E84-426E-40DD-AFC4-6F175D3DCCD1}">
-              <a14:hiddenFill xmlns:a14="http://schemas.microsoft.com/office/drawing/2010/main">
-                <a:solidFill>
-                  <a:srgbClr val="FFFFFF"/>
-                </a:solidFill>
-              </a14:hiddenFill>
-            </a:ext>
-            <a:ext uri="{91240B29-F687-4F45-9708-019B960494DF}">
-              <a14:hiddenLine xmlns:a14="http://schemas.microsoft.com/office/drawing/2010/main" w="9525">
-                <a:solidFill>
-                  <a:srgbClr val="000000"/>
-                </a:solidFill>
-                <a:miter lim="800000"/>
-                <a:headEnd/>
-                <a:tailEnd/>
-              </a14:hiddenLine>
-            </a:ext>
-          </a:extLst>
-        </p:spPr>
+        <p:spPr/>
         <p:txBody>
           <a:bodyPr/>
           <a:lstStyle/>
           <a:p>
             <a:pPr eaLnBrk="1" hangingPunct="1"/>
             <a:r>
-              <a:rPr lang="en-AU" altLang="nb-NO" sz="1200" noProof="0" dirty="0">
-                <a:latin typeface="FiraCode Nerd Font" panose="020B0809050000020004" pitchFamily="49" charset="0"/>
-                <a:ea typeface="FiraCode Nerd Font" panose="020B0809050000020004" pitchFamily="49" charset="0"/>
-              </a:rPr>
-              <a:t>This slide presents visual summaries of the “b” parameters derives from PCMs.</a:t>
-            </a:r>
-          </a:p>
-          <a:p>
-            <a:pPr eaLnBrk="1" hangingPunct="1"/>
-            <a:endParaRPr lang="en-AU" altLang="nb-NO" sz="1200" noProof="0" dirty="0">
+              <a:rPr lang="en-AU" altLang="nb-NO" sz="1000" noProof="0" dirty="0">
+                <a:latin typeface="FiraCode Nerd Font" panose="020B0809050000020004" pitchFamily="49" charset="0"/>
+                <a:ea typeface="FiraCode Nerd Font" panose="020B0809050000020004" pitchFamily="49" charset="0"/>
+              </a:rPr>
+              <a:t>These preliminary results suggest great nuance among the GPA debates.</a:t>
+            </a:r>
+          </a:p>
+          <a:p>
+            <a:pPr eaLnBrk="1" hangingPunct="1"/>
+            <a:endParaRPr lang="en-AU" altLang="nb-NO" sz="1000" noProof="0" dirty="0">
               <a:latin typeface="FiraCode Nerd Font" panose="020B0809050000020004" pitchFamily="49" charset="0"/>
               <a:ea typeface="FiraCode Nerd Font" panose="020B0809050000020004" pitchFamily="49" charset="0"/>
             </a:endParaRPr>
@@ -2547,40 +2916,16 @@
           <a:p>
             <a:pPr eaLnBrk="1" hangingPunct="1"/>
             <a:r>
-              <a:rPr lang="en-AU" altLang="nb-NO" sz="1200" noProof="0" dirty="0">
-                <a:latin typeface="FiraCode Nerd Font" panose="020B0809050000020004" pitchFamily="49" charset="0"/>
-                <a:ea typeface="FiraCode Nerd Font" panose="020B0809050000020004" pitchFamily="49" charset="0"/>
-              </a:rPr>
-              <a:t>Difficulty parameters of the 12 compulsory subjects (</a:t>
-            </a:r>
-            <a:r>
-              <a:rPr lang="en-AU" altLang="nb-NO" sz="1200" noProof="0" dirty="0" err="1">
-                <a:latin typeface="FiraCode Nerd Font" panose="020B0809050000020004" pitchFamily="49" charset="0"/>
-                <a:ea typeface="FiraCode Nerd Font" panose="020B0809050000020004" pitchFamily="49" charset="0"/>
-              </a:rPr>
-              <a:t>ie</a:t>
-            </a:r>
-            <a:r>
-              <a:rPr lang="en-AU" altLang="nb-NO" sz="1200" noProof="0" dirty="0">
-                <a:latin typeface="FiraCode Nerd Font" panose="020B0809050000020004" pitchFamily="49" charset="0"/>
-                <a:ea typeface="FiraCode Nerd Font" panose="020B0809050000020004" pitchFamily="49" charset="0"/>
-              </a:rPr>
-              <a:t>, teacher-assigned grades) are grouped on the left panel in descending order.</a:t>
-            </a:r>
-          </a:p>
-          <a:p>
-            <a:pPr eaLnBrk="1" hangingPunct="1"/>
-            <a:r>
-              <a:rPr lang="en-AU" altLang="nb-NO" sz="1200" noProof="0" dirty="0">
-                <a:latin typeface="FiraCode Nerd Font" panose="020B0809050000020004" pitchFamily="49" charset="0"/>
-                <a:ea typeface="FiraCode Nerd Font" panose="020B0809050000020004" pitchFamily="49" charset="0"/>
-              </a:rPr>
-              <a:t>For the purpose of enhancing comparability, difficulty parameters of the exam grades (with “[Exam]” in front) are presented on the right panel next to their teacher-assigned counterpart.</a:t>
-            </a:r>
-          </a:p>
-          <a:p>
-            <a:pPr eaLnBrk="1" hangingPunct="1"/>
-            <a:endParaRPr lang="en-AU" altLang="nb-NO" sz="1200" noProof="0" dirty="0">
+              <a:rPr lang="en-AU" altLang="nb-NO" sz="1000" noProof="0" dirty="0">
+                <a:latin typeface="FiraCode Nerd Font" panose="020B0809050000020004" pitchFamily="49" charset="0"/>
+                <a:ea typeface="FiraCode Nerd Font" panose="020B0809050000020004" pitchFamily="49" charset="0"/>
+              </a:rPr>
+              <a:t>If divergence in grade difficulties signals potential unfairness or threats to measurement validity, it is the lower end in teacher-assigned grades, and higher end in exam grades, that are highlighted by this study for consideration.</a:t>
+            </a:r>
+          </a:p>
+          <a:p>
+            <a:pPr eaLnBrk="1" hangingPunct="1"/>
+            <a:endParaRPr lang="en-AU" altLang="nb-NO" sz="1000" noProof="0" dirty="0">
               <a:latin typeface="FiraCode Nerd Font" panose="020B0809050000020004" pitchFamily="49" charset="0"/>
               <a:ea typeface="FiraCode Nerd Font" panose="020B0809050000020004" pitchFamily="49" charset="0"/>
             </a:endParaRPr>
@@ -2588,305 +2933,135 @@
           <a:p>
             <a:pPr eaLnBrk="1" hangingPunct="1"/>
             <a:r>
-              <a:rPr lang="en-AU" altLang="nb-NO" sz="1200" noProof="0" dirty="0">
-                <a:latin typeface="FiraCode Nerd Font" panose="020B0809050000020004" pitchFamily="49" charset="0"/>
-                <a:ea typeface="FiraCode Nerd Font" panose="020B0809050000020004" pitchFamily="49" charset="0"/>
-              </a:rPr>
-              <a:t>Let’s first of all examine the teacher-assigned grades:</a:t>
-            </a:r>
-          </a:p>
-          <a:p>
-            <a:pPr eaLnBrk="1" hangingPunct="1"/>
-            <a:r>
-              <a:rPr lang="en-AU" altLang="nb-NO" sz="1200" noProof="0" dirty="0">
-                <a:latin typeface="FiraCode Nerd Font" panose="020B0809050000020004" pitchFamily="49" charset="0"/>
-                <a:ea typeface="FiraCode Nerd Font" panose="020B0809050000020004" pitchFamily="49" charset="0"/>
-              </a:rPr>
-              <a:t>	The b_5 line is relative flat, while the b_4, b_3, down to b_1 lines are </a:t>
-            </a:r>
-            <a:r>
-              <a:rPr lang="en-AU" altLang="nb-NO" sz="1200" noProof="0">
-                <a:latin typeface="FiraCode Nerd Font" panose="020B0809050000020004" pitchFamily="49" charset="0"/>
-                <a:ea typeface="FiraCode Nerd Font" panose="020B0809050000020004" pitchFamily="49" charset="0"/>
-              </a:rPr>
-              <a:t>increasingly downward-sloping.</a:t>
-            </a:r>
-            <a:endParaRPr lang="en-AU" altLang="nb-NO" sz="1200" noProof="0" dirty="0">
+              <a:rPr lang="en-AU" altLang="nb-NO" sz="1000" noProof="0" dirty="0">
+                <a:latin typeface="FiraCode Nerd Font" panose="020B0809050000020004" pitchFamily="49" charset="0"/>
+                <a:ea typeface="FiraCode Nerd Font" panose="020B0809050000020004" pitchFamily="49" charset="0"/>
+              </a:rPr>
+              <a:t>The causes and practical implications of difficulty parameters remain open to interpretation:</a:t>
+            </a:r>
+          </a:p>
+          <a:p>
+            <a:pPr eaLnBrk="1" hangingPunct="1"/>
+            <a:r>
+              <a:rPr lang="en-AU" altLang="nb-NO" sz="1000" noProof="0" dirty="0">
+                <a:latin typeface="FiraCode Nerd Font" panose="020B0809050000020004" pitchFamily="49" charset="0"/>
+                <a:ea typeface="FiraCode Nerd Font" panose="020B0809050000020004" pitchFamily="49" charset="0"/>
+              </a:rPr>
+              <a:t>	If mathematics carries higher difficulty parameters, does it suggest</a:t>
+            </a:r>
+          </a:p>
+          <a:p>
+            <a:pPr eaLnBrk="1" hangingPunct="1"/>
+            <a:r>
+              <a:rPr lang="en-AU" altLang="nb-NO" sz="1000" noProof="0" dirty="0">
+                <a:latin typeface="FiraCode Nerd Font" panose="020B0809050000020004" pitchFamily="49" charset="0"/>
+                <a:ea typeface="FiraCode Nerd Font" panose="020B0809050000020004" pitchFamily="49" charset="0"/>
+              </a:rPr>
+              <a:t>		learners are inherently less capable in this subject, or</a:t>
+            </a:r>
+          </a:p>
+          <a:p>
+            <a:pPr eaLnBrk="1" hangingPunct="1"/>
+            <a:r>
+              <a:rPr lang="en-AU" altLang="nb-NO" sz="1000" noProof="0" dirty="0">
+                <a:latin typeface="FiraCode Nerd Font" panose="020B0809050000020004" pitchFamily="49" charset="0"/>
+                <a:ea typeface="FiraCode Nerd Font" panose="020B0809050000020004" pitchFamily="49" charset="0"/>
+              </a:rPr>
+              <a:t>		the measurement device for mathematics is less sensitive than that of other subjects?</a:t>
+            </a:r>
+          </a:p>
+          <a:p>
+            <a:pPr eaLnBrk="1" hangingPunct="1"/>
+            <a:r>
+              <a:rPr lang="en-AU" altLang="nb-NO" sz="1000" noProof="0" dirty="0">
+                <a:latin typeface="FiraCode Nerd Font" panose="020B0809050000020004" pitchFamily="49" charset="0"/>
+                <a:ea typeface="FiraCode Nerd Font" panose="020B0809050000020004" pitchFamily="49" charset="0"/>
+              </a:rPr>
+              <a:t>	This person-centric vs subject-centric interpretations demand vastly different policy responses.</a:t>
+            </a:r>
+          </a:p>
+          <a:p>
+            <a:pPr eaLnBrk="1" hangingPunct="1"/>
+            <a:endParaRPr lang="en-AU" altLang="nb-NO" sz="1000" noProof="0" dirty="0">
               <a:latin typeface="FiraCode Nerd Font" panose="020B0809050000020004" pitchFamily="49" charset="0"/>
               <a:ea typeface="FiraCode Nerd Font" panose="020B0809050000020004" pitchFamily="49" charset="0"/>
             </a:endParaRPr>
           </a:p>
+          <a:p>
+            <a:pPr eaLnBrk="1" hangingPunct="1"/>
+            <a:r>
+              <a:rPr lang="en-AU" altLang="nb-NO" sz="1000" noProof="0" dirty="0">
+                <a:latin typeface="FiraCode Nerd Font" panose="020B0809050000020004" pitchFamily="49" charset="0"/>
+                <a:ea typeface="FiraCode Nerd Font" panose="020B0809050000020004" pitchFamily="49" charset="0"/>
+              </a:rPr>
+              <a:t>These results are also aggregates at geography level, sex level and SES level.</a:t>
+            </a:r>
+          </a:p>
+          <a:p>
+            <a:pPr eaLnBrk="1" hangingPunct="1"/>
+            <a:r>
+              <a:rPr lang="en-AU" altLang="nb-NO" sz="1000" noProof="0" dirty="0">
+                <a:latin typeface="FiraCode Nerd Font" panose="020B0809050000020004" pitchFamily="49" charset="0"/>
+                <a:ea typeface="FiraCode Nerd Font" panose="020B0809050000020004" pitchFamily="49" charset="0"/>
+              </a:rPr>
+              <a:t>It would be fruitful to dissect these results to see whether grade difficulties diverge more severely for, say rural schools, females and the left tails of the SES distribution.</a:t>
+            </a:r>
+          </a:p>
+          <a:p>
+            <a:pPr eaLnBrk="1" hangingPunct="1"/>
+            <a:endParaRPr lang="en-AU" altLang="nb-NO" sz="1000" noProof="0" dirty="0">
+              <a:latin typeface="FiraCode Nerd Font" panose="020B0809050000020004" pitchFamily="49" charset="0"/>
+              <a:ea typeface="FiraCode Nerd Font" panose="020B0809050000020004" pitchFamily="49" charset="0"/>
+            </a:endParaRPr>
+          </a:p>
+          <a:p>
+            <a:pPr eaLnBrk="1" hangingPunct="1"/>
+            <a:r>
+              <a:rPr lang="en-AU" altLang="nb-NO" sz="1000" noProof="0" dirty="0">
+                <a:latin typeface="FiraCode Nerd Font" panose="020B0809050000020004" pitchFamily="49" charset="0"/>
+                <a:ea typeface="FiraCode Nerd Font" panose="020B0809050000020004" pitchFamily="49" charset="0"/>
+              </a:rPr>
+              <a:t>Towards the overarching goal of promoting educational fairness, this study may lend itself towards identifying the most vulnerable, who carry the heaviest burden of grade difficulty differentials.</a:t>
+            </a:r>
+          </a:p>
+          <a:p>
+            <a:endParaRPr lang="en-AU" dirty="0"/>
+          </a:p>
+        </p:txBody>
+      </p:sp>
+      <p:sp>
+        <p:nvSpPr>
+          <p:cNvPr id="4" name="Slide Number Placeholder 3"/>
+          <p:cNvSpPr>
+            <a:spLocks noGrp="1"/>
+          </p:cNvSpPr>
+          <p:nvPr>
+            <p:ph type="sldNum" sz="quarter" idx="5"/>
+          </p:nvPr>
+        </p:nvSpPr>
+        <p:spPr/>
+        <p:txBody>
+          <a:bodyPr/>
+          <a:lstStyle/>
+          <a:p>
+            <a:pPr>
+              <a:defRPr/>
+            </a:pPr>
+            <a:fld id="{FC054C7B-6FC2-4923-AF6D-51288AE7A1B4}" type="slidenum">
+              <a:rPr lang="en-US" altLang="nb-NO" smtClean="0"/>
+              <a:pPr>
+                <a:defRPr/>
+              </a:pPr>
+              <a:t>8</a:t>
+            </a:fld>
+            <a:endParaRPr lang="en-US" altLang="nb-NO"/>
+          </a:p>
         </p:txBody>
       </p:sp>
     </p:spTree>
     <p:extLst>
       <p:ext uri="{BB962C8B-B14F-4D97-AF65-F5344CB8AC3E}">
-        <p14:creationId xmlns:p14="http://schemas.microsoft.com/office/powerpoint/2010/main" val="41959551"/>
-      </p:ext>
-    </p:extLst>
-  </p:cSld>
-  <p:clrMapOvr>
-    <a:masterClrMapping/>
-  </p:clrMapOvr>
-</p:notes>
-</file>
-
-<file path=ppt/notesSlides/notesSlide6.xml><?xml version="1.0" encoding="utf-8"?>
-<p:notes xmlns:a="http://schemas.openxmlformats.org/drawingml/2006/main" xmlns:r="http://schemas.openxmlformats.org/officeDocument/2006/relationships" xmlns:p="http://schemas.openxmlformats.org/presentationml/2006/main">
-  <p:cSld>
-    <p:spTree>
-      <p:nvGrpSpPr>
-        <p:cNvPr id="1" name=""/>
-        <p:cNvGrpSpPr/>
-        <p:nvPr/>
-      </p:nvGrpSpPr>
-      <p:grpSpPr>
-        <a:xfrm>
-          <a:off x="0" y="0"/>
-          <a:ext cx="0" cy="0"/>
-          <a:chOff x="0" y="0"/>
-          <a:chExt cx="0" cy="0"/>
-        </a:xfrm>
-      </p:grpSpPr>
-      <p:sp>
-        <p:nvSpPr>
-          <p:cNvPr id="6146" name="Rectangle 7"/>
-          <p:cNvSpPr>
-            <a:spLocks noGrp="1" noChangeArrowheads="1"/>
-          </p:cNvSpPr>
-          <p:nvPr>
-            <p:ph type="sldNum" sz="quarter" idx="5"/>
-          </p:nvPr>
-        </p:nvSpPr>
-        <p:spPr>
-          <a:noFill/>
-          <a:ln/>
-          <a:extLst>
-            <a:ext uri="{909E8E84-426E-40DD-AFC4-6F175D3DCCD1}">
-              <a14:hiddenFill xmlns:a14="http://schemas.microsoft.com/office/drawing/2010/main">
-                <a:solidFill>
-                  <a:srgbClr val="FFFFFF"/>
-                </a:solidFill>
-              </a14:hiddenFill>
-            </a:ext>
-            <a:ext uri="{91240B29-F687-4F45-9708-019B960494DF}">
-              <a14:hiddenLine xmlns:a14="http://schemas.microsoft.com/office/drawing/2010/main" w="9525">
-                <a:solidFill>
-                  <a:srgbClr val="000000"/>
-                </a:solidFill>
-                <a:miter lim="800000"/>
-                <a:headEnd/>
-                <a:tailEnd/>
-              </a14:hiddenLine>
-            </a:ext>
-          </a:extLst>
-        </p:spPr>
-        <p:txBody>
-          <a:bodyPr/>
-          <a:lstStyle>
-            <a:lvl1pPr eaLnBrk="0" hangingPunct="0">
-              <a:spcBef>
-                <a:spcPct val="30000"/>
-              </a:spcBef>
-              <a:defRPr sz="1000">
-                <a:solidFill>
-                  <a:schemeClr val="tx1"/>
-                </a:solidFill>
-                <a:latin typeface="Arial" charset="0"/>
-                <a:ea typeface="ヒラギノ角ゴ Pro W3" charset="-128"/>
-              </a:defRPr>
-            </a:lvl1pPr>
-            <a:lvl2pPr marL="37931725" indent="-37474525" eaLnBrk="0" hangingPunct="0">
-              <a:spcBef>
-                <a:spcPct val="30000"/>
-              </a:spcBef>
-              <a:defRPr sz="1000">
-                <a:solidFill>
-                  <a:schemeClr val="tx1"/>
-                </a:solidFill>
-                <a:latin typeface="Arial" charset="0"/>
-                <a:ea typeface="ヒラギノ角ゴ Pro W3" charset="-128"/>
-              </a:defRPr>
-            </a:lvl2pPr>
-            <a:lvl3pPr marL="1143000" indent="-228600" eaLnBrk="0" hangingPunct="0">
-              <a:spcBef>
-                <a:spcPct val="30000"/>
-              </a:spcBef>
-              <a:defRPr sz="1000">
-                <a:solidFill>
-                  <a:schemeClr val="tx1"/>
-                </a:solidFill>
-                <a:latin typeface="Arial" charset="0"/>
-                <a:ea typeface="ヒラギノ角ゴ Pro W3" charset="-128"/>
-              </a:defRPr>
-            </a:lvl3pPr>
-            <a:lvl4pPr marL="1600200" indent="-228600" eaLnBrk="0" hangingPunct="0">
-              <a:spcBef>
-                <a:spcPct val="30000"/>
-              </a:spcBef>
-              <a:defRPr sz="1000">
-                <a:solidFill>
-                  <a:schemeClr val="tx1"/>
-                </a:solidFill>
-                <a:latin typeface="Arial" charset="0"/>
-                <a:ea typeface="ヒラギノ角ゴ Pro W3" charset="-128"/>
-              </a:defRPr>
-            </a:lvl4pPr>
-            <a:lvl5pPr marL="2057400" indent="-228600" eaLnBrk="0" hangingPunct="0">
-              <a:spcBef>
-                <a:spcPct val="30000"/>
-              </a:spcBef>
-              <a:defRPr sz="1000">
-                <a:solidFill>
-                  <a:schemeClr val="tx1"/>
-                </a:solidFill>
-                <a:latin typeface="Arial" charset="0"/>
-                <a:ea typeface="ヒラギノ角ゴ Pro W3" charset="-128"/>
-              </a:defRPr>
-            </a:lvl5pPr>
-            <a:lvl6pPr marL="2514600" indent="-228600" eaLnBrk="0" fontAlgn="base" hangingPunct="0">
-              <a:spcBef>
-                <a:spcPct val="30000"/>
-              </a:spcBef>
-              <a:spcAft>
-                <a:spcPct val="0"/>
-              </a:spcAft>
-              <a:defRPr sz="1000">
-                <a:solidFill>
-                  <a:schemeClr val="tx1"/>
-                </a:solidFill>
-                <a:latin typeface="Arial" charset="0"/>
-                <a:ea typeface="ヒラギノ角ゴ Pro W3" charset="-128"/>
-              </a:defRPr>
-            </a:lvl6pPr>
-            <a:lvl7pPr marL="2971800" indent="-228600" eaLnBrk="0" fontAlgn="base" hangingPunct="0">
-              <a:spcBef>
-                <a:spcPct val="30000"/>
-              </a:spcBef>
-              <a:spcAft>
-                <a:spcPct val="0"/>
-              </a:spcAft>
-              <a:defRPr sz="1000">
-                <a:solidFill>
-                  <a:schemeClr val="tx1"/>
-                </a:solidFill>
-                <a:latin typeface="Arial" charset="0"/>
-                <a:ea typeface="ヒラギノ角ゴ Pro W3" charset="-128"/>
-              </a:defRPr>
-            </a:lvl7pPr>
-            <a:lvl8pPr marL="3429000" indent="-228600" eaLnBrk="0" fontAlgn="base" hangingPunct="0">
-              <a:spcBef>
-                <a:spcPct val="30000"/>
-              </a:spcBef>
-              <a:spcAft>
-                <a:spcPct val="0"/>
-              </a:spcAft>
-              <a:defRPr sz="1000">
-                <a:solidFill>
-                  <a:schemeClr val="tx1"/>
-                </a:solidFill>
-                <a:latin typeface="Arial" charset="0"/>
-                <a:ea typeface="ヒラギノ角ゴ Pro W3" charset="-128"/>
-              </a:defRPr>
-            </a:lvl8pPr>
-            <a:lvl9pPr marL="3886200" indent="-228600" eaLnBrk="0" fontAlgn="base" hangingPunct="0">
-              <a:spcBef>
-                <a:spcPct val="30000"/>
-              </a:spcBef>
-              <a:spcAft>
-                <a:spcPct val="0"/>
-              </a:spcAft>
-              <a:defRPr sz="1000">
-                <a:solidFill>
-                  <a:schemeClr val="tx1"/>
-                </a:solidFill>
-                <a:latin typeface="Arial" charset="0"/>
-                <a:ea typeface="ヒラギノ角ゴ Pro W3" charset="-128"/>
-              </a:defRPr>
-            </a:lvl9pPr>
-          </a:lstStyle>
-          <a:p>
-            <a:pPr>
-              <a:spcBef>
-                <a:spcPct val="0"/>
-              </a:spcBef>
-            </a:pPr>
-            <a:fld id="{1DFC7A55-10E7-4DC8-94C9-829C4F55AAF2}" type="slidenum">
-              <a:rPr lang="en-US" altLang="nb-NO" sz="1200" smtClean="0"/>
-              <a:pPr>
-                <a:spcBef>
-                  <a:spcPct val="0"/>
-                </a:spcBef>
-              </a:pPr>
-              <a:t>7</a:t>
-            </a:fld>
-            <a:endParaRPr lang="en-US" altLang="nb-NO" sz="1200"/>
-          </a:p>
-        </p:txBody>
-      </p:sp>
-      <p:sp>
-        <p:nvSpPr>
-          <p:cNvPr id="6147" name="Rectangle 2"/>
-          <p:cNvSpPr>
-            <a:spLocks noGrp="1" noRot="1" noChangeAspect="1" noChangeArrowheads="1" noTextEdit="1"/>
-          </p:cNvSpPr>
-          <p:nvPr>
-            <p:ph type="sldImg"/>
-          </p:nvPr>
-        </p:nvSpPr>
-        <p:spPr>
-          <a:ln/>
-        </p:spPr>
-      </p:sp>
-      <p:sp>
-        <p:nvSpPr>
-          <p:cNvPr id="6148" name="Rectangle 3"/>
-          <p:cNvSpPr>
-            <a:spLocks noGrp="1" noChangeArrowheads="1"/>
-          </p:cNvSpPr>
-          <p:nvPr>
-            <p:ph type="body" idx="1"/>
-          </p:nvPr>
-        </p:nvSpPr>
-        <p:spPr>
-          <a:noFill/>
-          <a:ln/>
-          <a:extLst>
-            <a:ext uri="{909E8E84-426E-40DD-AFC4-6F175D3DCCD1}">
-              <a14:hiddenFill xmlns:a14="http://schemas.microsoft.com/office/drawing/2010/main">
-                <a:solidFill>
-                  <a:srgbClr val="FFFFFF"/>
-                </a:solidFill>
-              </a14:hiddenFill>
-            </a:ext>
-            <a:ext uri="{91240B29-F687-4F45-9708-019B960494DF}">
-              <a14:hiddenLine xmlns:a14="http://schemas.microsoft.com/office/drawing/2010/main" w="9525">
-                <a:solidFill>
-                  <a:srgbClr val="000000"/>
-                </a:solidFill>
-                <a:miter lim="800000"/>
-                <a:headEnd/>
-                <a:tailEnd/>
-              </a14:hiddenLine>
-            </a:ext>
-          </a:extLst>
-        </p:spPr>
-        <p:txBody>
-          <a:bodyPr/>
-          <a:lstStyle/>
-          <a:p>
-            <a:pPr eaLnBrk="1" hangingPunct="1"/>
-            <a:endParaRPr lang="en-AU" altLang="nb-NO" sz="1200" noProof="0" dirty="0">
-              <a:latin typeface="FiraCode Nerd Font" panose="020B0809050000020004" pitchFamily="49" charset="0"/>
-              <a:ea typeface="FiraCode Nerd Font" panose="020B0809050000020004" pitchFamily="49" charset="0"/>
-            </a:endParaRPr>
-          </a:p>
-        </p:txBody>
-      </p:sp>
-    </p:spTree>
-    <p:extLst>
-      <p:ext uri="{BB962C8B-B14F-4D97-AF65-F5344CB8AC3E}">
-        <p14:creationId xmlns:p14="http://schemas.microsoft.com/office/powerpoint/2010/main" val="2689834437"/>
+        <p14:creationId xmlns:p14="http://schemas.microsoft.com/office/powerpoint/2010/main" val="2823833172"/>
       </p:ext>
     </p:extLst>
   </p:cSld>
@@ -3125,7 +3300,7 @@
               <a:pPr>
                 <a:defRPr/>
               </a:pPr>
-              <a:t>26.05.2022</a:t>
+              <a:t>27.05.2022</a:t>
             </a:fld>
             <a:endParaRPr lang="nb-NO" altLang="nb-NO"/>
           </a:p>
@@ -3310,7 +3485,7 @@
               <a:pPr>
                 <a:defRPr/>
               </a:pPr>
-              <a:t>26.05.2022</a:t>
+              <a:t>27.05.2022</a:t>
             </a:fld>
             <a:endParaRPr lang="nb-NO" altLang="nb-NO"/>
           </a:p>
@@ -3485,7 +3660,7 @@
               <a:pPr>
                 <a:defRPr/>
               </a:pPr>
-              <a:t>26.05.2022</a:t>
+              <a:t>27.05.2022</a:t>
             </a:fld>
             <a:endParaRPr lang="nb-NO" altLang="nb-NO"/>
           </a:p>
@@ -3682,7 +3857,7 @@
               <a:pPr>
                 <a:defRPr/>
               </a:pPr>
-              <a:t>26.05.2022</a:t>
+              <a:t>27.05.2022</a:t>
             </a:fld>
             <a:endParaRPr lang="nb-NO" altLang="nb-NO"/>
           </a:p>
@@ -3975,7 +4150,7 @@
               <a:pPr>
                 <a:defRPr/>
               </a:pPr>
-              <a:t>26.05.2022</a:t>
+              <a:t>27.05.2022</a:t>
             </a:fld>
             <a:endParaRPr lang="nb-NO" altLang="nb-NO"/>
           </a:p>
@@ -4407,7 +4582,7 @@
               <a:pPr>
                 <a:defRPr/>
               </a:pPr>
-              <a:t>26.05.2022</a:t>
+              <a:t>27.05.2022</a:t>
             </a:fld>
             <a:endParaRPr lang="nb-NO" altLang="nb-NO"/>
           </a:p>
@@ -4530,7 +4705,7 @@
               <a:pPr>
                 <a:defRPr/>
               </a:pPr>
-              <a:t>26.05.2022</a:t>
+              <a:t>27.05.2022</a:t>
             </a:fld>
             <a:endParaRPr lang="nb-NO" altLang="nb-NO"/>
           </a:p>
@@ -4630,7 +4805,7 @@
               <a:pPr>
                 <a:defRPr/>
               </a:pPr>
-              <a:t>26.05.2022</a:t>
+              <a:t>27.05.2022</a:t>
             </a:fld>
             <a:endParaRPr lang="nb-NO" altLang="nb-NO"/>
           </a:p>
@@ -4912,7 +5087,7 @@
               <a:pPr>
                 <a:defRPr/>
               </a:pPr>
-              <a:t>26.05.2022</a:t>
+              <a:t>27.05.2022</a:t>
             </a:fld>
             <a:endParaRPr lang="nb-NO" altLang="nb-NO"/>
           </a:p>
@@ -5175,7 +5350,7 @@
               <a:pPr>
                 <a:defRPr/>
               </a:pPr>
-              <a:t>26.05.2022</a:t>
+              <a:t>27.05.2022</a:t>
             </a:fld>
             <a:endParaRPr lang="nb-NO" altLang="nb-NO"/>
           </a:p>
@@ -5448,7 +5623,7 @@
               <a:pPr>
                 <a:defRPr/>
               </a:pPr>
-              <a:t>26.05.2022</a:t>
+              <a:t>27.05.2022</a:t>
             </a:fld>
             <a:endParaRPr lang="nb-NO" altLang="nb-NO"/>
           </a:p>
@@ -6006,15 +6181,10 @@
             <a:spLocks noGrp="1" noChangeArrowheads="1"/>
           </p:cNvSpPr>
           <p:nvPr>
-            <p:ph type="ctrTitle"/>
-          </p:nvPr>
-        </p:nvSpPr>
-        <p:spPr>
-          <a:xfrm>
-            <a:off x="323528" y="1849388"/>
-            <a:ext cx="7543800" cy="795784"/>
-          </a:xfrm>
-        </p:spPr>
+            <p:ph type="ctrTitle" sz="quarter"/>
+          </p:nvPr>
+        </p:nvSpPr>
+        <p:spPr/>
         <p:txBody>
           <a:bodyPr/>
           <a:lstStyle/>
@@ -6026,7 +6196,15 @@
             </a:pPr>
             <a:r>
               <a:rPr lang="en-AU" altLang="nb-NO" sz="2000" b="0" i="1" dirty="0"/>
-              <a:t>Tony Tan, PhD Candidate</a:t>
+              <a:t>Rolf Olsen, Astrid Sands</a:t>
+            </a:r>
+            <a:r>
+              <a:rPr lang="nb-NO" altLang="nb-NO" sz="2000" b="0" i="1" dirty="0"/>
+              <a:t>ør, </a:t>
+            </a:r>
+            <a:r>
+              <a:rPr lang="en-AU" altLang="nb-NO" sz="2000" b="0" i="1" dirty="0"/>
+              <a:t>Tony Tan</a:t>
             </a:r>
           </a:p>
         </p:txBody>
@@ -6038,15 +6216,10 @@
             <a:spLocks noGrp="1" noChangeArrowheads="1"/>
           </p:cNvSpPr>
           <p:nvPr>
-            <p:ph type="subTitle" idx="1"/>
-          </p:nvPr>
-        </p:nvSpPr>
-        <p:spPr>
-          <a:xfrm>
-            <a:off x="323528" y="2837160"/>
-            <a:ext cx="8568952" cy="1460500"/>
-          </a:xfrm>
-        </p:spPr>
+            <p:ph type="subTitle" sz="quarter" idx="1"/>
+          </p:nvPr>
+        </p:nvSpPr>
+        <p:spPr/>
         <p:txBody>
           <a:bodyPr/>
           <a:lstStyle/>
@@ -6058,7 +6231,7 @@
             </a:pPr>
             <a:r>
               <a:rPr lang="en-GB" altLang="nb-NO" sz="2400" b="1" dirty="0"/>
-              <a:t>Fairness in grading across subjects:</a:t>
+              <a:t>Fairness in Grading Across Subjects:</a:t>
             </a:r>
           </a:p>
           <a:p>
@@ -6169,321 +6342,97 @@
       </p:grpSpPr>
       <p:sp>
         <p:nvSpPr>
-          <p:cNvPr id="8" name="Text Box 14"/>
-          <p:cNvSpPr txBox="1">
-            <a:spLocks noChangeArrowheads="1"/>
-          </p:cNvSpPr>
-          <p:nvPr/>
-        </p:nvSpPr>
-        <p:spPr bwMode="auto">
-          <a:xfrm>
-            <a:off x="683568" y="697260"/>
-            <a:ext cx="7920880" cy="2712987"/>
-          </a:xfrm>
-          <a:prstGeom prst="rect">
-            <a:avLst/>
-          </a:prstGeom>
-          <a:noFill/>
-          <a:ln>
-            <a:noFill/>
-          </a:ln>
-          <a:extLst>
-            <a:ext uri="{909E8E84-426E-40DD-AFC4-6F175D3DCCD1}">
-              <a14:hiddenFill xmlns:a14="http://schemas.microsoft.com/office/drawing/2010/main">
-                <a:solidFill>
-                  <a:srgbClr val="FFFFFF"/>
-                </a:solidFill>
-              </a14:hiddenFill>
-            </a:ext>
-            <a:ext uri="{91240B29-F687-4F45-9708-019B960494DF}">
-              <a14:hiddenLine xmlns:a14="http://schemas.microsoft.com/office/drawing/2010/main" w="9525">
-                <a:solidFill>
-                  <a:srgbClr val="000000"/>
-                </a:solidFill>
-                <a:miter lim="800000"/>
-                <a:headEnd/>
-                <a:tailEnd/>
-              </a14:hiddenLine>
-            </a:ext>
-          </a:extLst>
-        </p:spPr>
+          <p:cNvPr id="2" name="Title 1">
+            <a:extLst>
+              <a:ext uri="{FF2B5EF4-FFF2-40B4-BE49-F238E27FC236}">
+                <a16:creationId xmlns:a16="http://schemas.microsoft.com/office/drawing/2014/main" id="{FB2B9F7C-0CAA-DD88-FC7E-449C54190A06}"/>
+              </a:ext>
+            </a:extLst>
+          </p:cNvPr>
+          <p:cNvSpPr>
+            <a:spLocks noGrp="1"/>
+          </p:cNvSpPr>
+          <p:nvPr>
+            <p:ph type="title"/>
+          </p:nvPr>
+        </p:nvSpPr>
+        <p:spPr/>
         <p:txBody>
-          <a:bodyPr wrap="square">
-            <a:spAutoFit/>
-          </a:bodyPr>
-          <a:lstStyle>
-            <a:lvl1pPr eaLnBrk="0" hangingPunct="0">
-              <a:spcBef>
-                <a:spcPct val="20000"/>
-              </a:spcBef>
-              <a:buChar char="•"/>
-              <a:defRPr sz="3200">
-                <a:solidFill>
-                  <a:schemeClr val="tx1"/>
-                </a:solidFill>
-                <a:latin typeface="Arial" charset="0"/>
-              </a:defRPr>
-            </a:lvl1pPr>
-            <a:lvl2pPr marL="742950" indent="-285750" eaLnBrk="0" hangingPunct="0">
-              <a:spcBef>
-                <a:spcPct val="20000"/>
-              </a:spcBef>
-              <a:buChar char="–"/>
-              <a:defRPr sz="2800">
-                <a:solidFill>
-                  <a:schemeClr val="tx1"/>
-                </a:solidFill>
-                <a:latin typeface="Arial" charset="0"/>
-              </a:defRPr>
-            </a:lvl2pPr>
-            <a:lvl3pPr marL="1143000" indent="-228600" eaLnBrk="0" hangingPunct="0">
-              <a:spcBef>
-                <a:spcPct val="20000"/>
-              </a:spcBef>
-              <a:buChar char="•"/>
-              <a:defRPr sz="2400">
-                <a:solidFill>
-                  <a:schemeClr val="tx1"/>
-                </a:solidFill>
-                <a:latin typeface="Arial" charset="0"/>
-              </a:defRPr>
-            </a:lvl3pPr>
-            <a:lvl4pPr marL="1600200" indent="-228600" eaLnBrk="0" hangingPunct="0">
-              <a:spcBef>
-                <a:spcPct val="20000"/>
-              </a:spcBef>
-              <a:buChar char="–"/>
-              <a:defRPr sz="2000">
-                <a:solidFill>
-                  <a:schemeClr val="tx1"/>
-                </a:solidFill>
-                <a:latin typeface="Arial" charset="0"/>
-              </a:defRPr>
-            </a:lvl4pPr>
-            <a:lvl5pPr marL="2057400" indent="-228600" eaLnBrk="0" hangingPunct="0">
-              <a:spcBef>
-                <a:spcPct val="20000"/>
-              </a:spcBef>
-              <a:buChar char="»"/>
-              <a:defRPr sz="2000">
-                <a:solidFill>
-                  <a:schemeClr val="tx1"/>
-                </a:solidFill>
-                <a:latin typeface="Arial" charset="0"/>
-              </a:defRPr>
-            </a:lvl5pPr>
-            <a:lvl6pPr marL="2514600" indent="-228600" eaLnBrk="0" fontAlgn="base" hangingPunct="0">
-              <a:spcBef>
-                <a:spcPct val="20000"/>
-              </a:spcBef>
-              <a:spcAft>
-                <a:spcPct val="0"/>
-              </a:spcAft>
-              <a:buChar char="»"/>
-              <a:defRPr sz="2000">
-                <a:solidFill>
-                  <a:schemeClr val="tx1"/>
-                </a:solidFill>
-                <a:latin typeface="Arial" charset="0"/>
-              </a:defRPr>
-            </a:lvl6pPr>
-            <a:lvl7pPr marL="2971800" indent="-228600" eaLnBrk="0" fontAlgn="base" hangingPunct="0">
-              <a:spcBef>
-                <a:spcPct val="20000"/>
-              </a:spcBef>
-              <a:spcAft>
-                <a:spcPct val="0"/>
-              </a:spcAft>
-              <a:buChar char="»"/>
-              <a:defRPr sz="2000">
-                <a:solidFill>
-                  <a:schemeClr val="tx1"/>
-                </a:solidFill>
-                <a:latin typeface="Arial" charset="0"/>
-              </a:defRPr>
-            </a:lvl7pPr>
-            <a:lvl8pPr marL="3429000" indent="-228600" eaLnBrk="0" fontAlgn="base" hangingPunct="0">
-              <a:spcBef>
-                <a:spcPct val="20000"/>
-              </a:spcBef>
-              <a:spcAft>
-                <a:spcPct val="0"/>
-              </a:spcAft>
-              <a:buChar char="»"/>
-              <a:defRPr sz="2000">
-                <a:solidFill>
-                  <a:schemeClr val="tx1"/>
-                </a:solidFill>
-                <a:latin typeface="Arial" charset="0"/>
-              </a:defRPr>
-            </a:lvl8pPr>
-            <a:lvl9pPr marL="3886200" indent="-228600" eaLnBrk="0" fontAlgn="base" hangingPunct="0">
-              <a:spcBef>
-                <a:spcPct val="20000"/>
-              </a:spcBef>
-              <a:spcAft>
-                <a:spcPct val="0"/>
-              </a:spcAft>
-              <a:buChar char="»"/>
-              <a:defRPr sz="2000">
-                <a:solidFill>
-                  <a:schemeClr val="tx1"/>
-                </a:solidFill>
-                <a:latin typeface="Arial" charset="0"/>
-              </a:defRPr>
-            </a:lvl9pPr>
-          </a:lstStyle>
-          <a:p>
-            <a:pPr eaLnBrk="1" hangingPunct="1">
-              <a:lnSpc>
-                <a:spcPct val="150000"/>
-              </a:lnSpc>
-              <a:spcBef>
-                <a:spcPct val="0"/>
-              </a:spcBef>
-              <a:buNone/>
-            </a:pPr>
-            <a:r>
-              <a:rPr lang="en-AU" altLang="de-DE" sz="2400" b="1" dirty="0"/>
+          <a:bodyPr/>
+          <a:lstStyle/>
+          <a:p>
+            <a:r>
+              <a:rPr lang="en-AU" dirty="0"/>
               <a:t>Motivation</a:t>
             </a:r>
-            <a:endParaRPr lang="en-US" sz="800" dirty="0">
-              <a:effectLst/>
-              <a:latin typeface="+mn-lt"/>
-              <a:ea typeface="Calibri" panose="020F0502020204030204" pitchFamily="34" charset="0"/>
-            </a:endParaRPr>
-          </a:p>
-          <a:p>
-            <a:pPr marL="342900" indent="-342900" eaLnBrk="1" hangingPunct="1">
-              <a:lnSpc>
-                <a:spcPct val="150000"/>
-              </a:lnSpc>
-              <a:spcBef>
-                <a:spcPct val="0"/>
-              </a:spcBef>
-              <a:buFont typeface="Arial" panose="020B0604020202020204" pitchFamily="34" charset="0"/>
-              <a:buChar char="•"/>
-            </a:pPr>
-            <a:r>
-              <a:rPr lang="en-US" sz="2000" dirty="0">
-                <a:latin typeface="+mn-lt"/>
-                <a:ea typeface="Calibri" panose="020F0502020204030204" pitchFamily="34" charset="0"/>
-              </a:rPr>
+          </a:p>
+        </p:txBody>
+      </p:sp>
+      <p:sp>
+        <p:nvSpPr>
+          <p:cNvPr id="3" name="Content Placeholder 2">
+            <a:extLst>
+              <a:ext uri="{FF2B5EF4-FFF2-40B4-BE49-F238E27FC236}">
+                <a16:creationId xmlns:a16="http://schemas.microsoft.com/office/drawing/2014/main" id="{F431B0FC-A8B5-C3CE-553B-81C8BDC134D4}"/>
+              </a:ext>
+            </a:extLst>
+          </p:cNvPr>
+          <p:cNvSpPr>
+            <a:spLocks noGrp="1"/>
+          </p:cNvSpPr>
+          <p:nvPr>
+            <p:ph idx="1"/>
+          </p:nvPr>
+        </p:nvSpPr>
+        <p:spPr/>
+        <p:txBody>
+          <a:bodyPr/>
+          <a:lstStyle/>
+          <a:p>
+            <a:r>
+              <a:rPr lang="en-AU" dirty="0"/>
               <a:t>Completing </a:t>
             </a:r>
             <a:r>
-              <a:rPr lang="nb-NO" sz="2000" i="1" dirty="0">
-                <a:latin typeface="+mn-lt"/>
-                <a:ea typeface="Calibri" panose="020F0502020204030204" pitchFamily="34" charset="0"/>
-              </a:rPr>
+              <a:rPr lang="en-AU" i="1" dirty="0" err="1"/>
               <a:t>grunnskole</a:t>
             </a:r>
             <a:r>
-              <a:rPr lang="en-US" sz="2000" dirty="0">
-                <a:latin typeface="+mn-lt"/>
-                <a:ea typeface="Calibri" panose="020F0502020204030204" pitchFamily="34" charset="0"/>
-              </a:rPr>
+              <a:rPr lang="en-AU" dirty="0"/>
               <a:t>: High-stake</a:t>
             </a:r>
-            <a:endParaRPr lang="en-US" sz="2000" dirty="0">
-              <a:effectLst/>
-              <a:latin typeface="+mn-lt"/>
-              <a:ea typeface="Calibri" panose="020F0502020204030204" pitchFamily="34" charset="0"/>
-            </a:endParaRPr>
-          </a:p>
-          <a:p>
-            <a:pPr marL="342900" indent="-342900" eaLnBrk="1" hangingPunct="1">
-              <a:lnSpc>
-                <a:spcPct val="150000"/>
-              </a:lnSpc>
-              <a:spcBef>
-                <a:spcPct val="0"/>
-              </a:spcBef>
-              <a:buFont typeface="Arial" panose="020B0604020202020204" pitchFamily="34" charset="0"/>
-              <a:buChar char="•"/>
-            </a:pPr>
-            <a:r>
-              <a:rPr lang="en-AU" sz="2000" dirty="0">
-                <a:latin typeface="+mn-lt"/>
-                <a:ea typeface="Calibri" panose="020F0502020204030204" pitchFamily="34" charset="0"/>
-              </a:rPr>
+          </a:p>
+          <a:p>
+            <a:r>
+              <a:rPr lang="en-AU" dirty="0"/>
               <a:t>Inter-subject difficulty in </a:t>
             </a:r>
             <a:r>
-              <a:rPr lang="nb-NO" sz="2000" i="1" dirty="0">
-                <a:latin typeface="+mn-lt"/>
-                <a:ea typeface="Calibri" panose="020F0502020204030204" pitchFamily="34" charset="0"/>
-              </a:rPr>
+              <a:rPr lang="en-AU" i="1" dirty="0" err="1"/>
               <a:t>grunnskolepoeng</a:t>
             </a:r>
             <a:r>
-              <a:rPr lang="en-AU" sz="2000" dirty="0">
-                <a:latin typeface="+mn-lt"/>
-                <a:ea typeface="Calibri" panose="020F0502020204030204" pitchFamily="34" charset="0"/>
-              </a:rPr>
+              <a:rPr lang="en-AU" dirty="0"/>
               <a:t> (GPA):</a:t>
             </a:r>
           </a:p>
           <a:p>
-            <a:pPr marL="1085850" lvl="1" indent="-342900" eaLnBrk="1" hangingPunct="1">
-              <a:lnSpc>
-                <a:spcPct val="150000"/>
-              </a:lnSpc>
-              <a:spcBef>
-                <a:spcPct val="0"/>
-              </a:spcBef>
-              <a:buFont typeface="Arial" panose="020B0604020202020204" pitchFamily="34" charset="0"/>
-              <a:buChar char="•"/>
-            </a:pPr>
-            <a:r>
-              <a:rPr lang="en-AU" sz="1600" dirty="0">
-                <a:effectLst/>
-                <a:latin typeface="+mn-lt"/>
-                <a:ea typeface="Calibri" panose="020F0502020204030204" pitchFamily="34" charset="0"/>
-              </a:rPr>
+            <a:pPr lvl="1"/>
+            <a:r>
+              <a:rPr lang="en-AU" dirty="0"/>
               <a:t>Fairness</a:t>
             </a:r>
           </a:p>
           <a:p>
-            <a:pPr marL="1085850" lvl="1" indent="-342900" eaLnBrk="1" hangingPunct="1">
-              <a:lnSpc>
-                <a:spcPct val="150000"/>
-              </a:lnSpc>
-              <a:spcBef>
-                <a:spcPct val="0"/>
-              </a:spcBef>
-              <a:buFont typeface="Arial" panose="020B0604020202020204" pitchFamily="34" charset="0"/>
-              <a:buChar char="•"/>
-            </a:pPr>
-            <a:r>
-              <a:rPr lang="en-AU" sz="1600" dirty="0">
-                <a:latin typeface="+mn-lt"/>
-                <a:ea typeface="Calibri" panose="020F0502020204030204" pitchFamily="34" charset="0"/>
-              </a:rPr>
+            <a:pPr lvl="1"/>
+            <a:r>
+              <a:rPr lang="en-AU" dirty="0"/>
               <a:t>Validity</a:t>
             </a:r>
-            <a:endParaRPr lang="en-AU" sz="1600" dirty="0">
-              <a:effectLst/>
-              <a:latin typeface="+mn-lt"/>
-              <a:ea typeface="Calibri" panose="020F0502020204030204" pitchFamily="34" charset="0"/>
-            </a:endParaRPr>
-          </a:p>
-          <a:p>
-            <a:pPr marL="342900" indent="-342900" eaLnBrk="1" hangingPunct="1">
-              <a:lnSpc>
-                <a:spcPct val="150000"/>
-              </a:lnSpc>
-              <a:spcBef>
-                <a:spcPct val="0"/>
-              </a:spcBef>
-              <a:buFont typeface="Arial" panose="020B0604020202020204" pitchFamily="34" charset="0"/>
-              <a:buChar char="•"/>
-            </a:pPr>
-            <a:r>
-              <a:rPr lang="en-AU" sz="2000" dirty="0">
-                <a:latin typeface="+mn-lt"/>
-                <a:ea typeface="Calibri" panose="020F0502020204030204" pitchFamily="34" charset="0"/>
-              </a:rPr>
+          </a:p>
+          <a:p>
+            <a:r>
+              <a:rPr lang="en-AU" dirty="0"/>
               <a:t>Prior studies</a:t>
             </a:r>
           </a:p>
@@ -6492,7 +6441,7 @@
     </p:spTree>
     <p:extLst>
       <p:ext uri="{BB962C8B-B14F-4D97-AF65-F5344CB8AC3E}">
-        <p14:creationId xmlns:p14="http://schemas.microsoft.com/office/powerpoint/2010/main" val="1191495648"/>
+        <p14:creationId xmlns:p14="http://schemas.microsoft.com/office/powerpoint/2010/main" val="1982006016"/>
       </p:ext>
     </p:extLst>
   </p:cSld>
@@ -6519,405 +6468,153 @@
           <a:chExt cx="0" cy="0"/>
         </a:xfrm>
       </p:grpSpPr>
+      <p:sp>
+        <p:nvSpPr>
+          <p:cNvPr id="2" name="Title 1">
+            <a:extLst>
+              <a:ext uri="{FF2B5EF4-FFF2-40B4-BE49-F238E27FC236}">
+                <a16:creationId xmlns:a16="http://schemas.microsoft.com/office/drawing/2014/main" id="{F474AE05-6607-FB09-38C2-1322AE7CF1F0}"/>
+              </a:ext>
+            </a:extLst>
+          </p:cNvPr>
+          <p:cNvSpPr>
+            <a:spLocks noGrp="1"/>
+          </p:cNvSpPr>
+          <p:nvPr>
+            <p:ph type="title"/>
+          </p:nvPr>
+        </p:nvSpPr>
+        <p:spPr/>
+        <p:txBody>
+          <a:bodyPr/>
+          <a:lstStyle/>
+          <a:p>
+            <a:r>
+              <a:rPr lang="en-AU" dirty="0"/>
+              <a:t>GPA</a:t>
+            </a:r>
+          </a:p>
+        </p:txBody>
+      </p:sp>
       <mc:AlternateContent xmlns:mc="http://schemas.openxmlformats.org/markup-compatibility/2006">
         <mc:Choice xmlns:a14="http://schemas.microsoft.com/office/drawing/2010/main" Requires="a14">
           <p:sp>
             <p:nvSpPr>
-              <p:cNvPr id="8" name="Text Box 14"/>
-              <p:cNvSpPr txBox="1">
-                <a:spLocks noChangeArrowheads="1"/>
+              <p:cNvPr id="3" name="Content Placeholder 2">
+                <a:extLst>
+                  <a:ext uri="{FF2B5EF4-FFF2-40B4-BE49-F238E27FC236}">
+                    <a16:creationId xmlns:a16="http://schemas.microsoft.com/office/drawing/2014/main" id="{EFEDA3C5-DFEE-1A6C-1933-78023E43BF0E}"/>
+                  </a:ext>
+                </a:extLst>
+              </p:cNvPr>
+              <p:cNvSpPr>
+                <a:spLocks noGrp="1"/>
               </p:cNvSpPr>
-              <p:nvPr/>
+              <p:nvPr>
+                <p:ph idx="1"/>
+              </p:nvPr>
             </p:nvSpPr>
-            <p:spPr bwMode="auto">
-              <a:xfrm>
-                <a:off x="683568" y="697260"/>
-                <a:ext cx="7920880" cy="4656083"/>
-              </a:xfrm>
-              <a:prstGeom prst="rect">
-                <a:avLst/>
-              </a:prstGeom>
-              <a:noFill/>
-              <a:ln>
-                <a:noFill/>
-              </a:ln>
-              <a:extLst>
-                <a:ext uri="{909E8E84-426E-40DD-AFC4-6F175D3DCCD1}">
-                  <a14:hiddenFill>
-                    <a:solidFill>
-                      <a:srgbClr val="FFFFFF"/>
-                    </a:solidFill>
-                  </a14:hiddenFill>
-                </a:ext>
-                <a:ext uri="{91240B29-F687-4F45-9708-019B960494DF}">
-                  <a14:hiddenLine w="9525">
-                    <a:solidFill>
-                      <a:srgbClr val="000000"/>
-                    </a:solidFill>
-                    <a:miter lim="800000"/>
-                    <a:headEnd/>
-                    <a:tailEnd/>
-                  </a14:hiddenLine>
-                </a:ext>
-              </a:extLst>
-            </p:spPr>
+            <p:spPr/>
             <p:txBody>
-              <a:bodyPr wrap="square">
-                <a:spAutoFit/>
-              </a:bodyPr>
-              <a:lstStyle>
-                <a:lvl1pPr eaLnBrk="0" hangingPunct="0">
-                  <a:spcBef>
-                    <a:spcPct val="20000"/>
-                  </a:spcBef>
-                  <a:buChar char="•"/>
-                  <a:defRPr sz="3200">
-                    <a:solidFill>
-                      <a:schemeClr val="tx1"/>
-                    </a:solidFill>
-                    <a:latin typeface="Arial" charset="0"/>
-                  </a:defRPr>
-                </a:lvl1pPr>
-                <a:lvl2pPr marL="742950" indent="-285750" eaLnBrk="0" hangingPunct="0">
-                  <a:spcBef>
-                    <a:spcPct val="20000"/>
-                  </a:spcBef>
-                  <a:buChar char="–"/>
-                  <a:defRPr sz="2800">
-                    <a:solidFill>
-                      <a:schemeClr val="tx1"/>
-                    </a:solidFill>
-                    <a:latin typeface="Arial" charset="0"/>
-                  </a:defRPr>
-                </a:lvl2pPr>
-                <a:lvl3pPr marL="1143000" indent="-228600" eaLnBrk="0" hangingPunct="0">
-                  <a:spcBef>
-                    <a:spcPct val="20000"/>
-                  </a:spcBef>
-                  <a:buChar char="•"/>
-                  <a:defRPr sz="2400">
-                    <a:solidFill>
-                      <a:schemeClr val="tx1"/>
-                    </a:solidFill>
-                    <a:latin typeface="Arial" charset="0"/>
-                  </a:defRPr>
-                </a:lvl3pPr>
-                <a:lvl4pPr marL="1600200" indent="-228600" eaLnBrk="0" hangingPunct="0">
-                  <a:spcBef>
-                    <a:spcPct val="20000"/>
-                  </a:spcBef>
-                  <a:buChar char="–"/>
-                  <a:defRPr sz="2000">
-                    <a:solidFill>
-                      <a:schemeClr val="tx1"/>
-                    </a:solidFill>
-                    <a:latin typeface="Arial" charset="0"/>
-                  </a:defRPr>
-                </a:lvl4pPr>
-                <a:lvl5pPr marL="2057400" indent="-228600" eaLnBrk="0" hangingPunct="0">
-                  <a:spcBef>
-                    <a:spcPct val="20000"/>
-                  </a:spcBef>
-                  <a:buChar char="»"/>
-                  <a:defRPr sz="2000">
-                    <a:solidFill>
-                      <a:schemeClr val="tx1"/>
-                    </a:solidFill>
-                    <a:latin typeface="Arial" charset="0"/>
-                  </a:defRPr>
-                </a:lvl5pPr>
-                <a:lvl6pPr marL="2514600" indent="-228600" eaLnBrk="0" fontAlgn="base" hangingPunct="0">
-                  <a:spcBef>
-                    <a:spcPct val="20000"/>
-                  </a:spcBef>
-                  <a:spcAft>
-                    <a:spcPct val="0"/>
-                  </a:spcAft>
-                  <a:buChar char="»"/>
-                  <a:defRPr sz="2000">
-                    <a:solidFill>
-                      <a:schemeClr val="tx1"/>
-                    </a:solidFill>
-                    <a:latin typeface="Arial" charset="0"/>
-                  </a:defRPr>
-                </a:lvl6pPr>
-                <a:lvl7pPr marL="2971800" indent="-228600" eaLnBrk="0" fontAlgn="base" hangingPunct="0">
-                  <a:spcBef>
-                    <a:spcPct val="20000"/>
-                  </a:spcBef>
-                  <a:spcAft>
-                    <a:spcPct val="0"/>
-                  </a:spcAft>
-                  <a:buChar char="»"/>
-                  <a:defRPr sz="2000">
-                    <a:solidFill>
-                      <a:schemeClr val="tx1"/>
-                    </a:solidFill>
-                    <a:latin typeface="Arial" charset="0"/>
-                  </a:defRPr>
-                </a:lvl7pPr>
-                <a:lvl8pPr marL="3429000" indent="-228600" eaLnBrk="0" fontAlgn="base" hangingPunct="0">
-                  <a:spcBef>
-                    <a:spcPct val="20000"/>
-                  </a:spcBef>
-                  <a:spcAft>
-                    <a:spcPct val="0"/>
-                  </a:spcAft>
-                  <a:buChar char="»"/>
-                  <a:defRPr sz="2000">
-                    <a:solidFill>
-                      <a:schemeClr val="tx1"/>
-                    </a:solidFill>
-                    <a:latin typeface="Arial" charset="0"/>
-                  </a:defRPr>
-                </a:lvl8pPr>
-                <a:lvl9pPr marL="3886200" indent="-228600" eaLnBrk="0" fontAlgn="base" hangingPunct="0">
-                  <a:spcBef>
-                    <a:spcPct val="20000"/>
-                  </a:spcBef>
-                  <a:spcAft>
-                    <a:spcPct val="0"/>
-                  </a:spcAft>
-                  <a:buChar char="»"/>
-                  <a:defRPr sz="2000">
-                    <a:solidFill>
-                      <a:schemeClr val="tx1"/>
-                    </a:solidFill>
-                    <a:latin typeface="Arial" charset="0"/>
-                  </a:defRPr>
-                </a:lvl9pPr>
-              </a:lstStyle>
+              <a:bodyPr/>
+              <a:lstStyle/>
               <a:p>
-                <a:pPr eaLnBrk="1" hangingPunct="1">
-                  <a:lnSpc>
-                    <a:spcPct val="150000"/>
-                  </a:lnSpc>
-                  <a:spcBef>
-                    <a:spcPct val="0"/>
-                  </a:spcBef>
-                  <a:buNone/>
-                </a:pPr>
                 <a:r>
-                  <a:rPr lang="en-AU" altLang="de-DE" sz="2400" b="1" dirty="0"/>
-                  <a:t>GPA</a:t>
-                </a:r>
-                <a:endParaRPr lang="en-US" sz="800" dirty="0">
-                  <a:effectLst/>
-                  <a:latin typeface="+mn-lt"/>
-                  <a:ea typeface="Calibri" panose="020F0502020204030204" pitchFamily="34" charset="0"/>
-                </a:endParaRPr>
-              </a:p>
-              <a:p>
-                <a:pPr marL="342900" indent="-342900" eaLnBrk="1" hangingPunct="1">
-                  <a:lnSpc>
-                    <a:spcPct val="150000"/>
-                  </a:lnSpc>
-                  <a:spcBef>
-                    <a:spcPct val="0"/>
-                  </a:spcBef>
-                  <a:buFont typeface="Arial" panose="020B0604020202020204" pitchFamily="34" charset="0"/>
-                  <a:buChar char="•"/>
-                </a:pPr>
-                <a:r>
-                  <a:rPr lang="en-AU" sz="2000" dirty="0">
-                    <a:effectLst/>
-                    <a:latin typeface="+mn-lt"/>
-                    <a:ea typeface="Calibri" panose="020F0502020204030204" pitchFamily="34" charset="0"/>
-                  </a:rPr>
+                  <a:rPr lang="en-AU" dirty="0"/>
                   <a:t>Components</a:t>
                 </a:r>
               </a:p>
               <a:p>
-                <a:pPr marL="1085850" lvl="1" indent="-342900" eaLnBrk="1" hangingPunct="1">
-                  <a:lnSpc>
-                    <a:spcPct val="150000"/>
-                  </a:lnSpc>
-                  <a:spcBef>
-                    <a:spcPct val="0"/>
-                  </a:spcBef>
-                  <a:buFont typeface="Arial" panose="020B0604020202020204" pitchFamily="34" charset="0"/>
-                  <a:buChar char="•"/>
-                </a:pPr>
+                <a:pPr lvl="1"/>
                 <a:r>
-                  <a:rPr lang="en-AU" sz="1600" dirty="0">
-                    <a:effectLst/>
-                    <a:latin typeface="+mn-lt"/>
-                    <a:ea typeface="Calibri" panose="020F0502020204030204" pitchFamily="34" charset="0"/>
-                  </a:rPr>
+                  <a:rPr lang="en-AU" dirty="0"/>
                   <a:t>Teacher-assigned grades (</a:t>
                 </a:r>
                 <a:r>
-                  <a:rPr lang="en-AU" sz="1600" i="1" dirty="0" err="1">
-                    <a:effectLst/>
-                    <a:latin typeface="+mn-lt"/>
-                    <a:ea typeface="Calibri" panose="020F0502020204030204" pitchFamily="34" charset="0"/>
-                  </a:rPr>
+                  <a:rPr lang="en-AU" i="1" dirty="0" err="1"/>
                   <a:t>standpunktkarakter</a:t>
                 </a:r>
                 <a:r>
-                  <a:rPr lang="en-AU" sz="1600" dirty="0">
-                    <a:effectLst/>
-                    <a:latin typeface="+mn-lt"/>
-                    <a:ea typeface="Calibri" panose="020F0502020204030204" pitchFamily="34" charset="0"/>
-                  </a:rPr>
-                  <a:t>, STP):</a:t>
+                  <a:rPr lang="en-AU" dirty="0"/>
+                  <a:t>, </a:t>
+                </a:r>
+                <a:r>
+                  <a:rPr lang="en-AU" i="1" dirty="0"/>
+                  <a:t>STP</a:t>
+                </a:r>
+                <a:r>
+                  <a:rPr lang="en-AU" dirty="0"/>
+                  <a:t>):</a:t>
                 </a:r>
               </a:p>
               <a:p>
-                <a:pPr marL="1485900" lvl="2" indent="-342900" eaLnBrk="1" hangingPunct="1">
-                  <a:lnSpc>
-                    <a:spcPct val="150000"/>
-                  </a:lnSpc>
-                  <a:spcBef>
-                    <a:spcPct val="0"/>
-                  </a:spcBef>
-                  <a:buFont typeface="Arial" panose="020B0604020202020204" pitchFamily="34" charset="0"/>
-                  <a:buChar char="•"/>
-                </a:pPr>
+                <a:pPr lvl="2"/>
                 <a:r>
-                  <a:rPr lang="en-AU" sz="1200" dirty="0">
-                    <a:latin typeface="+mn-lt"/>
-                    <a:ea typeface="Calibri" panose="020F0502020204030204" pitchFamily="34" charset="0"/>
-                  </a:rPr>
+                  <a:rPr lang="en-AU" dirty="0"/>
                   <a:t>13 compulsory subjects + electives</a:t>
                 </a:r>
-                <a:endParaRPr lang="en-AU" sz="1200" dirty="0">
-                  <a:effectLst/>
-                  <a:latin typeface="+mn-lt"/>
-                  <a:ea typeface="Calibri" panose="020F0502020204030204" pitchFamily="34" charset="0"/>
-                </a:endParaRPr>
               </a:p>
               <a:p>
-                <a:pPr marL="1085850" lvl="1" indent="-342900" eaLnBrk="1" hangingPunct="1">
-                  <a:lnSpc>
-                    <a:spcPct val="150000"/>
-                  </a:lnSpc>
-                  <a:spcBef>
-                    <a:spcPct val="0"/>
-                  </a:spcBef>
-                  <a:buFont typeface="Arial" panose="020B0604020202020204" pitchFamily="34" charset="0"/>
-                  <a:buChar char="•"/>
-                </a:pPr>
+                <a:pPr lvl="1"/>
                 <a:r>
-                  <a:rPr lang="en-AU" sz="1600" dirty="0">
-                    <a:latin typeface="+mn-lt"/>
-                    <a:ea typeface="Calibri" panose="020F0502020204030204" pitchFamily="34" charset="0"/>
-                  </a:rPr>
+                  <a:rPr lang="en-AU" dirty="0"/>
                   <a:t>Exam grades:</a:t>
                 </a:r>
               </a:p>
               <a:p>
-                <a:pPr marL="1485900" lvl="2" indent="-342900" eaLnBrk="1" hangingPunct="1">
-                  <a:lnSpc>
-                    <a:spcPct val="150000"/>
-                  </a:lnSpc>
-                  <a:spcBef>
-                    <a:spcPct val="0"/>
-                  </a:spcBef>
-                  <a:buFont typeface="Arial" panose="020B0604020202020204" pitchFamily="34" charset="0"/>
-                  <a:buChar char="•"/>
-                </a:pPr>
+                <a:pPr lvl="2"/>
                 <a:r>
-                  <a:rPr lang="en-AU" sz="1200" dirty="0">
-                    <a:latin typeface="+mn-lt"/>
-                    <a:ea typeface="Calibri" panose="020F0502020204030204" pitchFamily="34" charset="0"/>
-                  </a:rPr>
-                  <a:t>written (SKR): Mathematics, Norwegian, English</a:t>
+                  <a:rPr lang="en-AU" dirty="0"/>
+                  <a:t>written (</a:t>
+                </a:r>
+                <a:r>
+                  <a:rPr lang="en-AU" i="1" dirty="0"/>
+                  <a:t>SKR</a:t>
+                </a:r>
+                <a:r>
+                  <a:rPr lang="en-AU" dirty="0"/>
+                  <a:t>): Mathematics, Norwegian, English</a:t>
                 </a:r>
               </a:p>
               <a:p>
-                <a:pPr marL="1485900" lvl="2" indent="-342900" eaLnBrk="1" hangingPunct="1">
-                  <a:lnSpc>
-                    <a:spcPct val="150000"/>
-                  </a:lnSpc>
-                  <a:spcBef>
-                    <a:spcPct val="0"/>
-                  </a:spcBef>
-                  <a:buFont typeface="Arial" panose="020B0604020202020204" pitchFamily="34" charset="0"/>
-                  <a:buChar char="•"/>
-                </a:pPr>
+                <a:pPr lvl="2"/>
                 <a:r>
-                  <a:rPr lang="en-AU" sz="1200" dirty="0">
-                    <a:latin typeface="+mn-lt"/>
-                    <a:ea typeface="Calibri" panose="020F0502020204030204" pitchFamily="34" charset="0"/>
-                  </a:rPr>
-                  <a:t>oral (MUN): Norwegian, English, others</a:t>
+                  <a:rPr lang="en-AU" dirty="0"/>
+                  <a:t>oral (</a:t>
+                </a:r>
+                <a:r>
+                  <a:rPr lang="en-AU" i="1" dirty="0"/>
+                  <a:t>MUN</a:t>
+                </a:r>
+                <a:r>
+                  <a:rPr lang="en-AU" dirty="0"/>
+                  <a:t>): Norwegian, English, others</a:t>
                 </a:r>
               </a:p>
               <a:p>
-                <a:pPr marL="342900" indent="-342900" eaLnBrk="1" hangingPunct="1">
-                  <a:lnSpc>
-                    <a:spcPct val="150000"/>
-                  </a:lnSpc>
-                  <a:spcBef>
-                    <a:spcPct val="0"/>
-                  </a:spcBef>
-                  <a:buFont typeface="Arial" panose="020B0604020202020204" pitchFamily="34" charset="0"/>
-                  <a:buChar char="•"/>
-                </a:pPr>
                 <a:r>
-                  <a:rPr lang="en-AU" sz="2000" dirty="0">
-                    <a:latin typeface="+mn-lt"/>
-                    <a:ea typeface="Calibri" panose="020F0502020204030204" pitchFamily="34" charset="0"/>
-                  </a:rPr>
+                  <a:rPr lang="en-AU" dirty="0"/>
                   <a:t>Sampling procedure</a:t>
                 </a:r>
               </a:p>
               <a:p>
-                <a:pPr marL="1085850" lvl="1" indent="-342900" eaLnBrk="1" hangingPunct="1">
-                  <a:lnSpc>
-                    <a:spcPct val="150000"/>
-                  </a:lnSpc>
-                  <a:spcBef>
-                    <a:spcPct val="0"/>
-                  </a:spcBef>
-                  <a:buFont typeface="Arial" panose="020B0604020202020204" pitchFamily="34" charset="0"/>
-                  <a:buChar char="•"/>
-                </a:pPr>
+                <a:pPr lvl="1"/>
                 <a:r>
-                  <a:rPr lang="en-AU" sz="1600" dirty="0">
-                    <a:latin typeface="+mn-lt"/>
-                    <a:ea typeface="Calibri" panose="020F0502020204030204" pitchFamily="34" charset="0"/>
-                  </a:rPr>
+                  <a:rPr lang="en-AU" dirty="0"/>
                   <a:t>Everyone: STP (100% sampling)</a:t>
                 </a:r>
               </a:p>
               <a:p>
-                <a:pPr marL="1085850" lvl="1" indent="-342900" eaLnBrk="1" hangingPunct="1">
-                  <a:lnSpc>
-                    <a:spcPct val="150000"/>
-                  </a:lnSpc>
-                  <a:spcBef>
-                    <a:spcPct val="0"/>
-                  </a:spcBef>
-                  <a:buFont typeface="Arial" panose="020B0604020202020204" pitchFamily="34" charset="0"/>
-                  <a:buChar char="•"/>
-                </a:pPr>
+                <a:pPr lvl="1"/>
                 <a:r>
-                  <a:rPr lang="en-AU" sz="1600" dirty="0">
-                    <a:latin typeface="+mn-lt"/>
-                    <a:ea typeface="Calibri" panose="020F0502020204030204" pitchFamily="34" charset="0"/>
-                  </a:rPr>
+                  <a:rPr lang="en-AU" dirty="0"/>
                   <a:t>Cohort divided equally: Mathematics, Norwegian, English (33%)</a:t>
                 </a:r>
               </a:p>
               <a:p>
-                <a:pPr marL="342900" indent="-342900" eaLnBrk="1" hangingPunct="1">
-                  <a:lnSpc>
-                    <a:spcPct val="150000"/>
-                  </a:lnSpc>
-                  <a:spcBef>
-                    <a:spcPct val="0"/>
-                  </a:spcBef>
-                  <a:buFont typeface="Arial" panose="020B0604020202020204" pitchFamily="34" charset="0"/>
-                  <a:buChar char="•"/>
-                </a:pPr>
                 <a:r>
-                  <a:rPr lang="en-AU" sz="2000" dirty="0">
-                    <a:latin typeface="+mn-lt"/>
-                    <a:ea typeface="Calibri" panose="020F0502020204030204" pitchFamily="34" charset="0"/>
-                  </a:rPr>
-                  <a:t>Formula:  </a:t>
+                  <a:rPr lang="en-AU" dirty="0"/>
+                  <a:t>Formula: </a:t>
                 </a:r>
                 <a14:m>
                   <m:oMath xmlns:m="http://schemas.openxmlformats.org/officeDocument/2006/math">
@@ -6925,15 +6622,14 @@
                       <m:rPr>
                         <m:nor/>
                       </m:rPr>
-                      <a:rPr lang="en-AU" sz="2000" b="0" i="0" smtClean="0">
-                        <a:latin typeface="+mn-lt"/>
+                      <a:rPr lang="en-AU" sz="1900" b="0" i="0" smtClean="0">
                         <a:ea typeface="Calibri" panose="020F0502020204030204" pitchFamily="34" charset="0"/>
                       </a:rPr>
                       <m:t>GPA</m:t>
                     </m:r>
                     <m:r>
-                      <a:rPr lang="en-AU" sz="2000" b="0" i="0" smtClean="0">
-                        <a:latin typeface="+mn-lt"/>
+                      <a:rPr lang="en-AU" sz="1900" b="0" i="0" smtClean="0">
+                        <a:latin typeface="Cambria Math" panose="02040503050406030204" pitchFamily="18" charset="0"/>
                         <a:ea typeface="Calibri" panose="020F0502020204030204" pitchFamily="34" charset="0"/>
                       </a:rPr>
                       <m:t>=</m:t>
@@ -6941,8 +6637,8 @@
                     <m:f>
                       <m:fPr>
                         <m:ctrlPr>
-                          <a:rPr lang="pt-BR" sz="2000" i="1" smtClean="0">
-                            <a:latin typeface="+mn-lt"/>
+                          <a:rPr lang="pt-BR" sz="1900" i="1" smtClean="0">
+                            <a:latin typeface="Cambria Math" panose="02040503050406030204" pitchFamily="18" charset="0"/>
                             <a:ea typeface="Calibri" panose="020F0502020204030204" pitchFamily="34" charset="0"/>
                           </a:rPr>
                         </m:ctrlPr>
@@ -6952,8 +6648,7 @@
                           <m:rPr>
                             <m:nor/>
                           </m:rPr>
-                          <a:rPr lang="en-AU" sz="2000" b="0" i="0" smtClean="0">
-                            <a:latin typeface="+mn-lt"/>
+                          <a:rPr lang="en-AU" sz="1900" b="0" i="0" smtClean="0">
                             <a:ea typeface="Calibri" panose="020F0502020204030204" pitchFamily="34" charset="0"/>
                           </a:rPr>
                           <m:t>unweighted</m:t>
@@ -6962,8 +6657,7 @@
                           <m:rPr>
                             <m:nor/>
                           </m:rPr>
-                          <a:rPr lang="en-AU" sz="2000" b="0" i="0" smtClean="0">
-                            <a:latin typeface="+mn-lt"/>
+                          <a:rPr lang="en-AU" sz="1900" b="0" i="0" smtClean="0">
                             <a:ea typeface="Calibri" panose="020F0502020204030204" pitchFamily="34" charset="0"/>
                           </a:rPr>
                           <m:t> </m:t>
@@ -6972,8 +6666,7 @@
                           <m:rPr>
                             <m:nor/>
                           </m:rPr>
-                          <a:rPr lang="en-AU" sz="2000" b="0" i="0" smtClean="0">
-                            <a:latin typeface="+mn-lt"/>
+                          <a:rPr lang="en-AU" sz="1900" b="0" i="0" smtClean="0">
                             <a:ea typeface="Calibri" panose="020F0502020204030204" pitchFamily="34" charset="0"/>
                           </a:rPr>
                           <m:t>sum</m:t>
@@ -6984,8 +6677,7 @@
                           <m:rPr>
                             <m:nor/>
                           </m:rPr>
-                          <a:rPr lang="en-AU" sz="2000" b="0" i="0" smtClean="0">
-                            <a:latin typeface="+mn-lt"/>
+                          <a:rPr lang="en-AU" sz="1900" b="0" i="0" smtClean="0">
                             <a:ea typeface="Calibri" panose="020F0502020204030204" pitchFamily="34" charset="0"/>
                           </a:rPr>
                           <m:t>number</m:t>
@@ -6994,8 +6686,7 @@
                           <m:rPr>
                             <m:nor/>
                           </m:rPr>
-                          <a:rPr lang="en-AU" sz="2000" b="0" i="0" smtClean="0">
-                            <a:latin typeface="+mn-lt"/>
+                          <a:rPr lang="en-AU" sz="1900" b="0" i="0" smtClean="0">
                             <a:ea typeface="Calibri" panose="020F0502020204030204" pitchFamily="34" charset="0"/>
                           </a:rPr>
                           <m:t> </m:t>
@@ -7004,8 +6695,7 @@
                           <m:rPr>
                             <m:nor/>
                           </m:rPr>
-                          <a:rPr lang="en-AU" sz="2000" b="0" i="0" smtClean="0">
-                            <a:latin typeface="+mn-lt"/>
+                          <a:rPr lang="en-AU" sz="1900" b="0" i="0" smtClean="0">
                             <a:ea typeface="Calibri" panose="020F0502020204030204" pitchFamily="34" charset="0"/>
                           </a:rPr>
                           <m:t>of</m:t>
@@ -7014,8 +6704,7 @@
                           <m:rPr>
                             <m:nor/>
                           </m:rPr>
-                          <a:rPr lang="en-AU" sz="2000" b="0" i="0" smtClean="0">
-                            <a:latin typeface="+mn-lt"/>
+                          <a:rPr lang="en-AU" sz="1900" b="0" i="0" smtClean="0">
                             <a:ea typeface="Calibri" panose="020F0502020204030204" pitchFamily="34" charset="0"/>
                           </a:rPr>
                           <m:t> </m:t>
@@ -7024,8 +6713,7 @@
                           <m:rPr>
                             <m:nor/>
                           </m:rPr>
-                          <a:rPr lang="en-AU" sz="2000" b="0" i="0" smtClean="0">
-                            <a:latin typeface="+mn-lt"/>
+                          <a:rPr lang="en-AU" sz="1900" b="0" i="0" smtClean="0">
                             <a:ea typeface="Calibri" panose="020F0502020204030204" pitchFamily="34" charset="0"/>
                           </a:rPr>
                           <m:t>subjects</m:t>
@@ -7033,8 +6721,8 @@
                       </m:den>
                     </m:f>
                     <m:r>
-                      <a:rPr lang="pt-BR" sz="2000" i="1" smtClean="0">
-                        <a:latin typeface="+mn-lt"/>
+                      <a:rPr lang="pt-BR" sz="1900" i="1" smtClean="0">
+                        <a:latin typeface="Cambria Math" panose="02040503050406030204" pitchFamily="18" charset="0"/>
                         <a:ea typeface="Cambria Math" panose="02040503050406030204" pitchFamily="18" charset="0"/>
                       </a:rPr>
                       <m:t>×</m:t>
@@ -7043,8 +6731,7 @@
                       <m:rPr>
                         <m:nor/>
                       </m:rPr>
-                      <a:rPr lang="en-AU" sz="2000" b="0" i="0" smtClean="0">
-                        <a:latin typeface="+mn-lt"/>
+                      <a:rPr lang="en-AU" sz="1900" b="0" i="0" smtClean="0">
                         <a:ea typeface="Cambria Math" panose="02040503050406030204" pitchFamily="18" charset="0"/>
                       </a:rPr>
                       <m:t>10</m:t>
@@ -7052,20 +6739,13 @@
                   </m:oMath>
                 </a14:m>
                 <a:r>
-                  <a:rPr lang="en-US" sz="2000" dirty="0">
-                    <a:latin typeface="+mn-lt"/>
-                  </a:rPr>
+                  <a:rPr lang="en-US" sz="1900" dirty="0"/>
                   <a:t> </a:t>
                 </a:r>
                 <a:r>
-                  <a:rPr lang="en-US" sz="1600" dirty="0">
-                    <a:latin typeface="+mn-lt"/>
-                  </a:rPr>
+                  <a:rPr lang="en-AU" sz="1900" dirty="0"/>
                   <a:t>(rounded to 2 decimals)</a:t>
                 </a:r>
-                <a:endParaRPr lang="en-US" sz="2000" dirty="0">
-                  <a:latin typeface="+mn-lt"/>
-                </a:endParaRPr>
               </a:p>
             </p:txBody>
           </p:sp>
@@ -7073,48 +6753,27 @@
         <mc:Fallback>
           <p:sp>
             <p:nvSpPr>
-              <p:cNvPr id="8" name="Text Box 14"/>
-              <p:cNvSpPr txBox="1">
-                <a:spLocks noRot="1" noChangeAspect="1" noMove="1" noResize="1" noEditPoints="1" noAdjustHandles="1" noChangeArrowheads="1" noChangeShapeType="1" noTextEdit="1"/>
+              <p:cNvPr id="3" name="Content Placeholder 2">
+                <a:extLst>
+                  <a:ext uri="{FF2B5EF4-FFF2-40B4-BE49-F238E27FC236}">
+                    <a16:creationId xmlns:a16="http://schemas.microsoft.com/office/drawing/2014/main" id="{EFEDA3C5-DFEE-1A6C-1933-78023E43BF0E}"/>
+                  </a:ext>
+                </a:extLst>
+              </p:cNvPr>
+              <p:cNvSpPr>
+                <a:spLocks noGrp="1" noRot="1" noChangeAspect="1" noMove="1" noResize="1" noEditPoints="1" noAdjustHandles="1" noChangeArrowheads="1" noChangeShapeType="1" noTextEdit="1"/>
               </p:cNvSpPr>
-              <p:nvPr/>
+              <p:nvPr>
+                <p:ph idx="1"/>
+              </p:nvPr>
             </p:nvSpPr>
-            <p:spPr bwMode="auto">
-              <a:xfrm>
-                <a:off x="683568" y="697260"/>
-                <a:ext cx="7920880" cy="4656083"/>
-              </a:xfrm>
-              <a:prstGeom prst="rect">
-                <a:avLst/>
-              </a:prstGeom>
+            <p:spPr>
               <a:blipFill>
                 <a:blip r:embed="rId3"/>
                 <a:stretch>
-                  <a:fillRect l="-1155"/>
+                  <a:fillRect l="-1154" t="-1246" b="-9075"/>
                 </a:stretch>
               </a:blipFill>
-              <a:ln>
-                <a:noFill/>
-              </a:ln>
-              <a:extLst>
-                <a:ext uri="{909E8E84-426E-40DD-AFC4-6F175D3DCCD1}">
-                  <a14:hiddenFill xmlns:a14="http://schemas.microsoft.com/office/drawing/2010/main">
-                    <a:solidFill>
-                      <a:srgbClr val="FFFFFF"/>
-                    </a:solidFill>
-                  </a14:hiddenFill>
-                </a:ext>
-                <a:ext uri="{91240B29-F687-4F45-9708-019B960494DF}">
-                  <a14:hiddenLine xmlns:a14="http://schemas.microsoft.com/office/drawing/2010/main" w="9525">
-                    <a:solidFill>
-                      <a:srgbClr val="000000"/>
-                    </a:solidFill>
-                    <a:miter lim="800000"/>
-                    <a:headEnd/>
-                    <a:tailEnd/>
-                  </a14:hiddenLine>
-                </a:ext>
-              </a:extLst>
             </p:spPr>
             <p:txBody>
               <a:bodyPr/>
@@ -7134,7 +6793,7 @@
     </p:spTree>
     <p:extLst>
       <p:ext uri="{BB962C8B-B14F-4D97-AF65-F5344CB8AC3E}">
-        <p14:creationId xmlns:p14="http://schemas.microsoft.com/office/powerpoint/2010/main" val="3637471088"/>
+        <p14:creationId xmlns:p14="http://schemas.microsoft.com/office/powerpoint/2010/main" val="3850539486"/>
       </p:ext>
     </p:extLst>
   </p:cSld>
@@ -7182,8 +6841,8 @@
         </p:blipFill>
         <p:spPr>
           <a:xfrm>
-            <a:off x="5796136" y="2583160"/>
-            <a:ext cx="3131840" cy="3131840"/>
+            <a:off x="5580112" y="2497460"/>
+            <a:ext cx="3059832" cy="3059832"/>
           </a:xfrm>
           <a:prstGeom prst="rect">
             <a:avLst/>
@@ -7192,420 +6851,130 @@
       </p:pic>
       <p:sp>
         <p:nvSpPr>
-          <p:cNvPr id="8" name="Text Box 14"/>
-          <p:cNvSpPr txBox="1">
-            <a:spLocks noChangeArrowheads="1"/>
-          </p:cNvSpPr>
-          <p:nvPr/>
-        </p:nvSpPr>
-        <p:spPr bwMode="auto">
-          <a:xfrm>
-            <a:off x="683568" y="697260"/>
-            <a:ext cx="7920880" cy="4213141"/>
-          </a:xfrm>
-          <a:prstGeom prst="rect">
-            <a:avLst/>
-          </a:prstGeom>
-          <a:noFill/>
-          <a:ln>
-            <a:noFill/>
-          </a:ln>
-          <a:extLst>
-            <a:ext uri="{909E8E84-426E-40DD-AFC4-6F175D3DCCD1}">
-              <a14:hiddenFill xmlns:a14="http://schemas.microsoft.com/office/drawing/2010/main">
-                <a:solidFill>
-                  <a:srgbClr val="FFFFFF"/>
-                </a:solidFill>
-              </a14:hiddenFill>
-            </a:ext>
-            <a:ext uri="{91240B29-F687-4F45-9708-019B960494DF}">
-              <a14:hiddenLine xmlns:a14="http://schemas.microsoft.com/office/drawing/2010/main" w="9525">
-                <a:solidFill>
-                  <a:srgbClr val="000000"/>
-                </a:solidFill>
-                <a:miter lim="800000"/>
-                <a:headEnd/>
-                <a:tailEnd/>
-              </a14:hiddenLine>
-            </a:ext>
-          </a:extLst>
-        </p:spPr>
+          <p:cNvPr id="4" name="Content Placeholder 3">
+            <a:extLst>
+              <a:ext uri="{FF2B5EF4-FFF2-40B4-BE49-F238E27FC236}">
+                <a16:creationId xmlns:a16="http://schemas.microsoft.com/office/drawing/2014/main" id="{A506D670-7C6B-9A17-BC7B-55F1A6C2190C}"/>
+              </a:ext>
+            </a:extLst>
+          </p:cNvPr>
+          <p:cNvSpPr>
+            <a:spLocks noGrp="1"/>
+          </p:cNvSpPr>
+          <p:nvPr>
+            <p:ph idx="1"/>
+          </p:nvPr>
+        </p:nvSpPr>
+        <p:spPr/>
         <p:txBody>
-          <a:bodyPr wrap="square">
-            <a:spAutoFit/>
-          </a:bodyPr>
-          <a:lstStyle>
-            <a:lvl1pPr eaLnBrk="0" hangingPunct="0">
-              <a:spcBef>
-                <a:spcPct val="20000"/>
-              </a:spcBef>
-              <a:buChar char="•"/>
-              <a:defRPr sz="3200">
-                <a:solidFill>
-                  <a:schemeClr val="tx1"/>
-                </a:solidFill>
-                <a:latin typeface="Arial" charset="0"/>
-              </a:defRPr>
-            </a:lvl1pPr>
-            <a:lvl2pPr marL="742950" indent="-285750" eaLnBrk="0" hangingPunct="0">
-              <a:spcBef>
-                <a:spcPct val="20000"/>
-              </a:spcBef>
-              <a:buChar char="–"/>
-              <a:defRPr sz="2800">
-                <a:solidFill>
-                  <a:schemeClr val="tx1"/>
-                </a:solidFill>
-                <a:latin typeface="Arial" charset="0"/>
-              </a:defRPr>
-            </a:lvl2pPr>
-            <a:lvl3pPr marL="1143000" indent="-228600" eaLnBrk="0" hangingPunct="0">
-              <a:spcBef>
-                <a:spcPct val="20000"/>
-              </a:spcBef>
-              <a:buChar char="•"/>
-              <a:defRPr sz="2400">
-                <a:solidFill>
-                  <a:schemeClr val="tx1"/>
-                </a:solidFill>
-                <a:latin typeface="Arial" charset="0"/>
-              </a:defRPr>
-            </a:lvl3pPr>
-            <a:lvl4pPr marL="1600200" indent="-228600" eaLnBrk="0" hangingPunct="0">
-              <a:spcBef>
-                <a:spcPct val="20000"/>
-              </a:spcBef>
-              <a:buChar char="–"/>
-              <a:defRPr sz="2000">
-                <a:solidFill>
-                  <a:schemeClr val="tx1"/>
-                </a:solidFill>
-                <a:latin typeface="Arial" charset="0"/>
-              </a:defRPr>
-            </a:lvl4pPr>
-            <a:lvl5pPr marL="2057400" indent="-228600" eaLnBrk="0" hangingPunct="0">
-              <a:spcBef>
-                <a:spcPct val="20000"/>
-              </a:spcBef>
-              <a:buChar char="»"/>
-              <a:defRPr sz="2000">
-                <a:solidFill>
-                  <a:schemeClr val="tx1"/>
-                </a:solidFill>
-                <a:latin typeface="Arial" charset="0"/>
-              </a:defRPr>
-            </a:lvl5pPr>
-            <a:lvl6pPr marL="2514600" indent="-228600" eaLnBrk="0" fontAlgn="base" hangingPunct="0">
-              <a:spcBef>
-                <a:spcPct val="20000"/>
-              </a:spcBef>
-              <a:spcAft>
-                <a:spcPct val="0"/>
-              </a:spcAft>
-              <a:buChar char="»"/>
-              <a:defRPr sz="2000">
-                <a:solidFill>
-                  <a:schemeClr val="tx1"/>
-                </a:solidFill>
-                <a:latin typeface="Arial" charset="0"/>
-              </a:defRPr>
-            </a:lvl6pPr>
-            <a:lvl7pPr marL="2971800" indent="-228600" eaLnBrk="0" fontAlgn="base" hangingPunct="0">
-              <a:spcBef>
-                <a:spcPct val="20000"/>
-              </a:spcBef>
-              <a:spcAft>
-                <a:spcPct val="0"/>
-              </a:spcAft>
-              <a:buChar char="»"/>
-              <a:defRPr sz="2000">
-                <a:solidFill>
-                  <a:schemeClr val="tx1"/>
-                </a:solidFill>
-                <a:latin typeface="Arial" charset="0"/>
-              </a:defRPr>
-            </a:lvl7pPr>
-            <a:lvl8pPr marL="3429000" indent="-228600" eaLnBrk="0" fontAlgn="base" hangingPunct="0">
-              <a:spcBef>
-                <a:spcPct val="20000"/>
-              </a:spcBef>
-              <a:spcAft>
-                <a:spcPct val="0"/>
-              </a:spcAft>
-              <a:buChar char="»"/>
-              <a:defRPr sz="2000">
-                <a:solidFill>
-                  <a:schemeClr val="tx1"/>
-                </a:solidFill>
-                <a:latin typeface="Arial" charset="0"/>
-              </a:defRPr>
-            </a:lvl8pPr>
-            <a:lvl9pPr marL="3886200" indent="-228600" eaLnBrk="0" fontAlgn="base" hangingPunct="0">
-              <a:spcBef>
-                <a:spcPct val="20000"/>
-              </a:spcBef>
-              <a:spcAft>
-                <a:spcPct val="0"/>
-              </a:spcAft>
-              <a:buChar char="»"/>
-              <a:defRPr sz="2000">
-                <a:solidFill>
-                  <a:schemeClr val="tx1"/>
-                </a:solidFill>
-                <a:latin typeface="Arial" charset="0"/>
-              </a:defRPr>
-            </a:lvl9pPr>
-          </a:lstStyle>
-          <a:p>
-            <a:pPr eaLnBrk="1" hangingPunct="1">
-              <a:lnSpc>
-                <a:spcPct val="150000"/>
-              </a:lnSpc>
-              <a:spcBef>
-                <a:spcPct val="0"/>
-              </a:spcBef>
-              <a:buNone/>
-            </a:pPr>
-            <a:r>
-              <a:rPr lang="en-AU" altLang="de-DE" sz="2400" b="1" dirty="0"/>
+          <a:bodyPr/>
+          <a:lstStyle/>
+          <a:p>
+            <a:r>
+              <a:rPr lang="en-AU" dirty="0"/>
+              <a:t>Sample</a:t>
+            </a:r>
+          </a:p>
+          <a:p>
+            <a:pPr lvl="1"/>
+            <a:r>
+              <a:rPr lang="en-AU" dirty="0"/>
+              <a:t>Norwegian register: entire Year 10 population</a:t>
+            </a:r>
+          </a:p>
+          <a:p>
+            <a:pPr lvl="1"/>
+            <a:r>
+              <a:rPr lang="en-AU" dirty="0"/>
+              <a:t>Graduation year 2019</a:t>
+            </a:r>
+          </a:p>
+          <a:p>
+            <a:pPr lvl="1"/>
+            <a:r>
+              <a:rPr lang="en-AU" dirty="0"/>
+              <a:t>Retain if valid GPA (N = 60,618)</a:t>
+            </a:r>
+          </a:p>
+          <a:p>
+            <a:pPr lvl="1"/>
+            <a:r>
+              <a:rPr lang="en-AU" dirty="0"/>
+              <a:t>Exclude “</a:t>
+            </a:r>
+            <a:r>
+              <a:rPr lang="en-AU" dirty="0" err="1"/>
+              <a:t>Sidem</a:t>
+            </a:r>
+            <a:r>
+              <a:rPr lang="nb-NO" dirty="0"/>
+              <a:t>ål</a:t>
+            </a:r>
+            <a:r>
+              <a:rPr lang="en-AU" dirty="0"/>
+              <a:t>”</a:t>
+            </a:r>
+          </a:p>
+          <a:p>
+            <a:pPr lvl="2"/>
+            <a:r>
+              <a:rPr lang="en-AU" dirty="0"/>
+              <a:t>STP = 12, SKR = 3, MUN = 2</a:t>
+            </a:r>
+          </a:p>
+          <a:p>
+            <a:r>
+              <a:rPr lang="en-AU" dirty="0"/>
+              <a:t>Model: Partial credit model (PCM)</a:t>
+            </a:r>
+          </a:p>
+          <a:p>
+            <a:pPr lvl="1"/>
+            <a:r>
+              <a:rPr lang="en-AU" dirty="0"/>
+              <a:t>“Difficulty parameter (b)”:</a:t>
+            </a:r>
+          </a:p>
+          <a:p>
+            <a:pPr lvl="2"/>
+            <a:r>
+              <a:rPr lang="en-AU" dirty="0"/>
+              <a:t>where the curves cross</a:t>
+            </a:r>
+          </a:p>
+          <a:p>
+            <a:pPr lvl="2"/>
+            <a:r>
+              <a:rPr lang="en-AU" dirty="0"/>
+              <a:t>switching points to the next grade</a:t>
+            </a:r>
+          </a:p>
+        </p:txBody>
+      </p:sp>
+      <p:sp>
+        <p:nvSpPr>
+          <p:cNvPr id="5" name="Title 4">
+            <a:extLst>
+              <a:ext uri="{FF2B5EF4-FFF2-40B4-BE49-F238E27FC236}">
+                <a16:creationId xmlns:a16="http://schemas.microsoft.com/office/drawing/2014/main" id="{CC90BD71-77E0-EDD9-EB92-D6CA72B11082}"/>
+              </a:ext>
+            </a:extLst>
+          </p:cNvPr>
+          <p:cNvSpPr>
+            <a:spLocks noGrp="1"/>
+          </p:cNvSpPr>
+          <p:nvPr>
+            <p:ph type="title"/>
+          </p:nvPr>
+        </p:nvSpPr>
+        <p:spPr/>
+        <p:txBody>
+          <a:bodyPr/>
+          <a:lstStyle/>
+          <a:p>
+            <a:r>
+              <a:rPr lang="en-AU" dirty="0"/>
               <a:t>Current Study</a:t>
-            </a:r>
-          </a:p>
-          <a:p>
-            <a:pPr marL="342900" indent="-342900" eaLnBrk="1" hangingPunct="1">
-              <a:lnSpc>
-                <a:spcPct val="150000"/>
-              </a:lnSpc>
-              <a:spcBef>
-                <a:spcPct val="0"/>
-              </a:spcBef>
-              <a:buFont typeface="Arial" panose="020B0604020202020204" pitchFamily="34" charset="0"/>
-              <a:buChar char="•"/>
-            </a:pPr>
-            <a:r>
-              <a:rPr lang="en-AU" sz="2000" dirty="0">
-                <a:latin typeface="+mn-lt"/>
-              </a:rPr>
-              <a:t>Sample</a:t>
-            </a:r>
-          </a:p>
-          <a:p>
-            <a:pPr marL="1085850" lvl="1" indent="-342900" eaLnBrk="1" hangingPunct="1">
-              <a:lnSpc>
-                <a:spcPct val="150000"/>
-              </a:lnSpc>
-              <a:spcBef>
-                <a:spcPct val="0"/>
-              </a:spcBef>
-              <a:buFont typeface="Arial" panose="020B0604020202020204" pitchFamily="34" charset="0"/>
-              <a:buChar char="•"/>
-            </a:pPr>
-            <a:r>
-              <a:rPr lang="en-AU" sz="1600" dirty="0">
-                <a:latin typeface="+mn-lt"/>
-              </a:rPr>
-              <a:t>Norwegian register: entire Year 10 </a:t>
-            </a:r>
-            <a:r>
-              <a:rPr lang="en-AU" sz="1600" dirty="0" err="1">
-                <a:latin typeface="+mn-lt"/>
-              </a:rPr>
-              <a:t>populationn</a:t>
-            </a:r>
-            <a:endParaRPr lang="en-AU" sz="1600" dirty="0">
-              <a:latin typeface="+mn-lt"/>
-            </a:endParaRPr>
-          </a:p>
-          <a:p>
-            <a:pPr marL="1085850" lvl="1" indent="-342900" eaLnBrk="1" hangingPunct="1">
-              <a:lnSpc>
-                <a:spcPct val="150000"/>
-              </a:lnSpc>
-              <a:spcBef>
-                <a:spcPct val="0"/>
-              </a:spcBef>
-              <a:buFont typeface="Arial" panose="020B0604020202020204" pitchFamily="34" charset="0"/>
-              <a:buChar char="•"/>
-            </a:pPr>
-            <a:r>
-              <a:rPr lang="en-AU" sz="1600" dirty="0">
-                <a:latin typeface="+mn-lt"/>
-              </a:rPr>
-              <a:t>Administrative year 2019 (</a:t>
-            </a:r>
-            <a:r>
-              <a:rPr lang="en-AU" sz="1600" dirty="0" err="1">
-                <a:latin typeface="+mn-lt"/>
-              </a:rPr>
-              <a:t>avgangsdato</a:t>
-            </a:r>
-            <a:r>
-              <a:rPr lang="en-AU" sz="1600" dirty="0">
-                <a:latin typeface="+mn-lt"/>
-              </a:rPr>
-              <a:t> = 201906)</a:t>
-            </a:r>
-          </a:p>
-          <a:p>
-            <a:pPr marL="1085850" lvl="1" indent="-342900" eaLnBrk="1" hangingPunct="1">
-              <a:lnSpc>
-                <a:spcPct val="150000"/>
-              </a:lnSpc>
-              <a:spcBef>
-                <a:spcPct val="0"/>
-              </a:spcBef>
-              <a:buFont typeface="Arial" panose="020B0604020202020204" pitchFamily="34" charset="0"/>
-              <a:buChar char="•"/>
-            </a:pPr>
-            <a:r>
-              <a:rPr lang="en-AU" sz="1600" dirty="0">
-                <a:latin typeface="+mn-lt"/>
-              </a:rPr>
-              <a:t>Retain if valid GPA (</a:t>
-            </a:r>
-            <a:r>
-              <a:rPr lang="en-AU" sz="1600" i="1" dirty="0">
-                <a:latin typeface="+mn-lt"/>
-              </a:rPr>
-              <a:t>N</a:t>
-            </a:r>
-            <a:r>
-              <a:rPr lang="en-AU" sz="1600" dirty="0">
-                <a:latin typeface="+mn-lt"/>
-              </a:rPr>
-              <a:t> = 60,618)</a:t>
-            </a:r>
-          </a:p>
-          <a:p>
-            <a:pPr marL="1085850" lvl="1" indent="-342900" eaLnBrk="1" hangingPunct="1">
-              <a:lnSpc>
-                <a:spcPct val="150000"/>
-              </a:lnSpc>
-              <a:spcBef>
-                <a:spcPct val="0"/>
-              </a:spcBef>
-              <a:buFont typeface="Arial" panose="020B0604020202020204" pitchFamily="34" charset="0"/>
-              <a:buChar char="•"/>
-            </a:pPr>
-            <a:r>
-              <a:rPr lang="en-AU" sz="1600" dirty="0">
-                <a:latin typeface="+mn-lt"/>
-              </a:rPr>
-              <a:t>Exclude “Norwegian as a Second Language”</a:t>
-            </a:r>
-          </a:p>
-          <a:p>
-            <a:pPr marL="1485900" lvl="2" indent="-342900" eaLnBrk="1" hangingPunct="1">
-              <a:lnSpc>
-                <a:spcPct val="150000"/>
-              </a:lnSpc>
-              <a:spcBef>
-                <a:spcPct val="0"/>
-              </a:spcBef>
-              <a:buFont typeface="Arial" panose="020B0604020202020204" pitchFamily="34" charset="0"/>
-              <a:buChar char="•"/>
-            </a:pPr>
-            <a:r>
-              <a:rPr lang="en-AU" sz="1200" dirty="0">
-                <a:latin typeface="+mn-lt"/>
-              </a:rPr>
-              <a:t>STP = 12, SKR = 3, MUN = 2</a:t>
-            </a:r>
-          </a:p>
-          <a:p>
-            <a:pPr marL="342900" indent="-342900" eaLnBrk="1" hangingPunct="1">
-              <a:lnSpc>
-                <a:spcPct val="150000"/>
-              </a:lnSpc>
-              <a:spcBef>
-                <a:spcPct val="0"/>
-              </a:spcBef>
-              <a:buFont typeface="Arial" panose="020B0604020202020204" pitchFamily="34" charset="0"/>
-              <a:buChar char="•"/>
-            </a:pPr>
-            <a:r>
-              <a:rPr lang="en-US" sz="2000" dirty="0">
-                <a:latin typeface="+mn-lt"/>
-              </a:rPr>
-              <a:t>Model: Partial credit model (PCM)</a:t>
-            </a:r>
-          </a:p>
-          <a:p>
-            <a:pPr marL="1085850" lvl="1" indent="-342900" eaLnBrk="1" hangingPunct="1">
-              <a:lnSpc>
-                <a:spcPct val="150000"/>
-              </a:lnSpc>
-              <a:spcBef>
-                <a:spcPct val="0"/>
-              </a:spcBef>
-              <a:buFont typeface="Arial" panose="020B0604020202020204" pitchFamily="34" charset="0"/>
-              <a:buChar char="•"/>
-            </a:pPr>
-            <a:r>
-              <a:rPr lang="en-US" sz="1600" dirty="0">
-                <a:latin typeface="+mn-lt"/>
-              </a:rPr>
-              <a:t>“Difficulty parameter (</a:t>
-            </a:r>
-            <a:r>
-              <a:rPr lang="en-US" sz="1600" i="1" dirty="0">
-                <a:latin typeface="+mn-lt"/>
-              </a:rPr>
-              <a:t>b</a:t>
-            </a:r>
-            <a:r>
-              <a:rPr lang="en-US" sz="1600" dirty="0">
-                <a:latin typeface="+mn-lt"/>
-              </a:rPr>
-              <a:t>)</a:t>
-            </a:r>
-            <a:r>
-              <a:rPr lang="en-US" sz="1600" i="1" dirty="0">
-                <a:latin typeface="+mn-lt"/>
-              </a:rPr>
-              <a:t>”</a:t>
-            </a:r>
-            <a:r>
-              <a:rPr lang="en-US" sz="1600" dirty="0">
-                <a:latin typeface="+mn-lt"/>
-              </a:rPr>
-              <a:t>:</a:t>
-            </a:r>
-          </a:p>
-          <a:p>
-            <a:pPr marL="1485900" lvl="2" indent="-342900" eaLnBrk="1" hangingPunct="1">
-              <a:lnSpc>
-                <a:spcPct val="150000"/>
-              </a:lnSpc>
-              <a:spcBef>
-                <a:spcPct val="0"/>
-              </a:spcBef>
-              <a:buFont typeface="Arial" panose="020B0604020202020204" pitchFamily="34" charset="0"/>
-              <a:buChar char="•"/>
-            </a:pPr>
-            <a:r>
-              <a:rPr lang="en-US" sz="1200" dirty="0">
-                <a:latin typeface="+mn-lt"/>
-              </a:rPr>
-              <a:t>where the curves cross</a:t>
-            </a:r>
-          </a:p>
-          <a:p>
-            <a:pPr marL="1485900" lvl="2" indent="-342900" eaLnBrk="1" hangingPunct="1">
-              <a:lnSpc>
-                <a:spcPct val="150000"/>
-              </a:lnSpc>
-              <a:spcBef>
-                <a:spcPct val="0"/>
-              </a:spcBef>
-              <a:buFont typeface="Arial" panose="020B0604020202020204" pitchFamily="34" charset="0"/>
-              <a:buChar char="•"/>
-            </a:pPr>
-            <a:r>
-              <a:rPr lang="en-US" sz="1200" dirty="0">
-                <a:latin typeface="+mn-lt"/>
-              </a:rPr>
-              <a:t>switching points to the next grade</a:t>
             </a:r>
           </a:p>
         </p:txBody>
@@ -7613,7 +6982,7 @@
     </p:spTree>
     <p:extLst>
       <p:ext uri="{BB962C8B-B14F-4D97-AF65-F5344CB8AC3E}">
-        <p14:creationId xmlns:p14="http://schemas.microsoft.com/office/powerpoint/2010/main" val="495801709"/>
+        <p14:creationId xmlns:p14="http://schemas.microsoft.com/office/powerpoint/2010/main" val="1605007714"/>
       </p:ext>
     </p:extLst>
   </p:cSld>
@@ -7642,193 +7011,63 @@
       </p:grpSpPr>
       <p:sp>
         <p:nvSpPr>
-          <p:cNvPr id="8" name="Text Box 14"/>
-          <p:cNvSpPr txBox="1">
-            <a:spLocks noChangeArrowheads="1"/>
-          </p:cNvSpPr>
-          <p:nvPr/>
-        </p:nvSpPr>
-        <p:spPr bwMode="auto">
-          <a:xfrm>
-            <a:off x="683568" y="697260"/>
-            <a:ext cx="7920880" cy="577850"/>
-          </a:xfrm>
-          <a:prstGeom prst="rect">
-            <a:avLst/>
-          </a:prstGeom>
-          <a:noFill/>
-          <a:ln>
-            <a:noFill/>
-          </a:ln>
-          <a:extLst>
-            <a:ext uri="{909E8E84-426E-40DD-AFC4-6F175D3DCCD1}">
-              <a14:hiddenFill xmlns:a14="http://schemas.microsoft.com/office/drawing/2010/main">
-                <a:solidFill>
-                  <a:srgbClr val="FFFFFF"/>
-                </a:solidFill>
-              </a14:hiddenFill>
-            </a:ext>
-            <a:ext uri="{91240B29-F687-4F45-9708-019B960494DF}">
-              <a14:hiddenLine xmlns:a14="http://schemas.microsoft.com/office/drawing/2010/main" w="9525">
-                <a:solidFill>
-                  <a:srgbClr val="000000"/>
-                </a:solidFill>
-                <a:miter lim="800000"/>
-                <a:headEnd/>
-                <a:tailEnd/>
-              </a14:hiddenLine>
-            </a:ext>
-          </a:extLst>
-        </p:spPr>
+          <p:cNvPr id="13" name="Title 12">
+            <a:extLst>
+              <a:ext uri="{FF2B5EF4-FFF2-40B4-BE49-F238E27FC236}">
+                <a16:creationId xmlns:a16="http://schemas.microsoft.com/office/drawing/2014/main" id="{596C72A5-373E-A8B2-7C0E-BCE742994136}"/>
+              </a:ext>
+            </a:extLst>
+          </p:cNvPr>
+          <p:cNvSpPr>
+            <a:spLocks noGrp="1"/>
+          </p:cNvSpPr>
+          <p:nvPr>
+            <p:ph type="title"/>
+          </p:nvPr>
+        </p:nvSpPr>
+        <p:spPr/>
         <p:txBody>
-          <a:bodyPr wrap="square">
-            <a:spAutoFit/>
-          </a:bodyPr>
-          <a:lstStyle>
-            <a:lvl1pPr eaLnBrk="0" hangingPunct="0">
-              <a:spcBef>
-                <a:spcPct val="20000"/>
-              </a:spcBef>
-              <a:buChar char="•"/>
-              <a:defRPr sz="3200">
-                <a:solidFill>
-                  <a:schemeClr val="tx1"/>
-                </a:solidFill>
-                <a:latin typeface="Arial" charset="0"/>
-              </a:defRPr>
-            </a:lvl1pPr>
-            <a:lvl2pPr marL="742950" indent="-285750" eaLnBrk="0" hangingPunct="0">
-              <a:spcBef>
-                <a:spcPct val="20000"/>
-              </a:spcBef>
-              <a:buChar char="–"/>
-              <a:defRPr sz="2800">
-                <a:solidFill>
-                  <a:schemeClr val="tx1"/>
-                </a:solidFill>
-                <a:latin typeface="Arial" charset="0"/>
-              </a:defRPr>
-            </a:lvl2pPr>
-            <a:lvl3pPr marL="1143000" indent="-228600" eaLnBrk="0" hangingPunct="0">
-              <a:spcBef>
-                <a:spcPct val="20000"/>
-              </a:spcBef>
-              <a:buChar char="•"/>
-              <a:defRPr sz="2400">
-                <a:solidFill>
-                  <a:schemeClr val="tx1"/>
-                </a:solidFill>
-                <a:latin typeface="Arial" charset="0"/>
-              </a:defRPr>
-            </a:lvl3pPr>
-            <a:lvl4pPr marL="1600200" indent="-228600" eaLnBrk="0" hangingPunct="0">
-              <a:spcBef>
-                <a:spcPct val="20000"/>
-              </a:spcBef>
-              <a:buChar char="–"/>
-              <a:defRPr sz="2000">
-                <a:solidFill>
-                  <a:schemeClr val="tx1"/>
-                </a:solidFill>
-                <a:latin typeface="Arial" charset="0"/>
-              </a:defRPr>
-            </a:lvl4pPr>
-            <a:lvl5pPr marL="2057400" indent="-228600" eaLnBrk="0" hangingPunct="0">
-              <a:spcBef>
-                <a:spcPct val="20000"/>
-              </a:spcBef>
-              <a:buChar char="»"/>
-              <a:defRPr sz="2000">
-                <a:solidFill>
-                  <a:schemeClr val="tx1"/>
-                </a:solidFill>
-                <a:latin typeface="Arial" charset="0"/>
-              </a:defRPr>
-            </a:lvl5pPr>
-            <a:lvl6pPr marL="2514600" indent="-228600" eaLnBrk="0" fontAlgn="base" hangingPunct="0">
-              <a:spcBef>
-                <a:spcPct val="20000"/>
-              </a:spcBef>
-              <a:spcAft>
-                <a:spcPct val="0"/>
-              </a:spcAft>
-              <a:buChar char="»"/>
-              <a:defRPr sz="2000">
-                <a:solidFill>
-                  <a:schemeClr val="tx1"/>
-                </a:solidFill>
-                <a:latin typeface="Arial" charset="0"/>
-              </a:defRPr>
-            </a:lvl6pPr>
-            <a:lvl7pPr marL="2971800" indent="-228600" eaLnBrk="0" fontAlgn="base" hangingPunct="0">
-              <a:spcBef>
-                <a:spcPct val="20000"/>
-              </a:spcBef>
-              <a:spcAft>
-                <a:spcPct val="0"/>
-              </a:spcAft>
-              <a:buChar char="»"/>
-              <a:defRPr sz="2000">
-                <a:solidFill>
-                  <a:schemeClr val="tx1"/>
-                </a:solidFill>
-                <a:latin typeface="Arial" charset="0"/>
-              </a:defRPr>
-            </a:lvl7pPr>
-            <a:lvl8pPr marL="3429000" indent="-228600" eaLnBrk="0" fontAlgn="base" hangingPunct="0">
-              <a:spcBef>
-                <a:spcPct val="20000"/>
-              </a:spcBef>
-              <a:spcAft>
-                <a:spcPct val="0"/>
-              </a:spcAft>
-              <a:buChar char="»"/>
-              <a:defRPr sz="2000">
-                <a:solidFill>
-                  <a:schemeClr val="tx1"/>
-                </a:solidFill>
-                <a:latin typeface="Arial" charset="0"/>
-              </a:defRPr>
-            </a:lvl8pPr>
-            <a:lvl9pPr marL="3886200" indent="-228600" eaLnBrk="0" fontAlgn="base" hangingPunct="0">
-              <a:spcBef>
-                <a:spcPct val="20000"/>
-              </a:spcBef>
-              <a:spcAft>
-                <a:spcPct val="0"/>
-              </a:spcAft>
-              <a:buChar char="»"/>
-              <a:defRPr sz="2000">
-                <a:solidFill>
-                  <a:schemeClr val="tx1"/>
-                </a:solidFill>
-                <a:latin typeface="Arial" charset="0"/>
-              </a:defRPr>
-            </a:lvl9pPr>
-          </a:lstStyle>
-          <a:p>
-            <a:pPr eaLnBrk="1" hangingPunct="1">
-              <a:lnSpc>
-                <a:spcPct val="150000"/>
-              </a:lnSpc>
-              <a:spcBef>
-                <a:spcPct val="0"/>
-              </a:spcBef>
-              <a:buNone/>
-            </a:pPr>
-            <a:r>
-              <a:rPr lang="en-AU" altLang="de-DE" sz="2400" b="1" dirty="0"/>
-              <a:t>Preliminary Results</a:t>
-            </a:r>
+          <a:bodyPr/>
+          <a:lstStyle/>
+          <a:p>
+            <a:r>
+              <a:rPr lang="en-AU" dirty="0"/>
+              <a:t>Preliminary Results: Teacher-assigned Grades</a:t>
+            </a:r>
+          </a:p>
+        </p:txBody>
+      </p:sp>
+      <p:sp>
+        <p:nvSpPr>
+          <p:cNvPr id="14" name="Content Placeholder 13">
+            <a:extLst>
+              <a:ext uri="{FF2B5EF4-FFF2-40B4-BE49-F238E27FC236}">
+                <a16:creationId xmlns:a16="http://schemas.microsoft.com/office/drawing/2014/main" id="{AFD6D16A-4E57-A938-0084-A783EA8DCFFE}"/>
+              </a:ext>
+            </a:extLst>
+          </p:cNvPr>
+          <p:cNvSpPr>
+            <a:spLocks noGrp="1"/>
+          </p:cNvSpPr>
+          <p:nvPr>
+            <p:ph sz="half" idx="1"/>
+          </p:nvPr>
+        </p:nvSpPr>
+        <p:spPr/>
+        <p:txBody>
+          <a:bodyPr/>
+          <a:lstStyle/>
+          <a:p>
+            <a:endParaRPr lang="en-AU"/>
           </a:p>
         </p:txBody>
       </p:sp>
       <p:pic>
         <p:nvPicPr>
-          <p:cNvPr id="10" name="Content Placeholder 9">
+          <p:cNvPr id="6" name="Content Placeholder 5">
             <a:extLst>
               <a:ext uri="{FF2B5EF4-FFF2-40B4-BE49-F238E27FC236}">
-                <a16:creationId xmlns:a16="http://schemas.microsoft.com/office/drawing/2014/main" id="{699BA3DB-F06F-AEB2-A441-95D96A6CBFB7}"/>
+                <a16:creationId xmlns:a16="http://schemas.microsoft.com/office/drawing/2014/main" id="{41D3A632-9B1C-6C27-558E-676DF45ABD53}"/>
               </a:ext>
             </a:extLst>
           </p:cNvPr>
@@ -7836,18 +7075,19 @@
             <a:picLocks noGrp="1" noChangeAspect="1"/>
           </p:cNvPicPr>
           <p:nvPr>
-            <p:ph idx="1"/>
+            <p:ph sz="half" idx="2"/>
           </p:nvPr>
         </p:nvPicPr>
         <p:blipFill>
           <a:blip r:embed="rId3"/>
-          <a:srcRect/>
-          <a:stretch/>
+          <a:stretch>
+            <a:fillRect/>
+          </a:stretch>
         </p:blipFill>
         <p:spPr>
           <a:xfrm>
-            <a:off x="1243644" y="1218189"/>
-            <a:ext cx="6656711" cy="4477484"/>
+            <a:off x="5501089" y="1651000"/>
+            <a:ext cx="2599522" cy="3429000"/>
           </a:xfrm>
         </p:spPr>
       </p:pic>
@@ -7883,214 +7123,239 @@
       </p:grpSpPr>
       <p:sp>
         <p:nvSpPr>
-          <p:cNvPr id="8" name="Text Box 14"/>
-          <p:cNvSpPr txBox="1">
-            <a:spLocks noChangeArrowheads="1"/>
-          </p:cNvSpPr>
-          <p:nvPr/>
-        </p:nvSpPr>
-        <p:spPr bwMode="auto">
+          <p:cNvPr id="7" name="Title 6">
+            <a:extLst>
+              <a:ext uri="{FF2B5EF4-FFF2-40B4-BE49-F238E27FC236}">
+                <a16:creationId xmlns:a16="http://schemas.microsoft.com/office/drawing/2014/main" id="{C0255B06-5590-4B9F-613B-E134C3A75773}"/>
+              </a:ext>
+            </a:extLst>
+          </p:cNvPr>
+          <p:cNvSpPr>
+            <a:spLocks noGrp="1"/>
+          </p:cNvSpPr>
+          <p:nvPr>
+            <p:ph type="title"/>
+          </p:nvPr>
+        </p:nvSpPr>
+        <p:spPr/>
+        <p:txBody>
+          <a:bodyPr/>
+          <a:lstStyle/>
+          <a:p>
+            <a:r>
+              <a:rPr lang="en-AU" dirty="0"/>
+              <a:t>Preliminary Results: Exam Grades</a:t>
+            </a:r>
+          </a:p>
+        </p:txBody>
+      </p:sp>
+      <p:pic>
+        <p:nvPicPr>
+          <p:cNvPr id="13" name="Content Placeholder 12">
+            <a:extLst>
+              <a:ext uri="{FF2B5EF4-FFF2-40B4-BE49-F238E27FC236}">
+                <a16:creationId xmlns:a16="http://schemas.microsoft.com/office/drawing/2014/main" id="{6ED86689-E400-A73C-AA17-17E92F6F1C9C}"/>
+              </a:ext>
+            </a:extLst>
+          </p:cNvPr>
+          <p:cNvPicPr>
+            <a:picLocks noGrp="1" noChangeAspect="1"/>
+          </p:cNvPicPr>
+          <p:nvPr>
+            <p:ph sz="half" idx="2"/>
+          </p:nvPr>
+        </p:nvPicPr>
+        <p:blipFill>
+          <a:blip r:embed="rId3"/>
+          <a:stretch>
+            <a:fillRect/>
+          </a:stretch>
+        </p:blipFill>
+        <p:spPr>
           <a:xfrm>
-            <a:off x="683568" y="697260"/>
-            <a:ext cx="7920880" cy="1050993"/>
+            <a:off x="5323344" y="1651000"/>
+            <a:ext cx="2955012" cy="3429000"/>
           </a:xfrm>
-          <a:prstGeom prst="rect">
-            <a:avLst/>
-          </a:prstGeom>
-          <a:noFill/>
-          <a:ln>
-            <a:noFill/>
-          </a:ln>
-          <a:extLst>
-            <a:ext uri="{909E8E84-426E-40DD-AFC4-6F175D3DCCD1}">
-              <a14:hiddenFill xmlns:a14="http://schemas.microsoft.com/office/drawing/2010/main">
-                <a:solidFill>
-                  <a:srgbClr val="FFFFFF"/>
-                </a:solidFill>
-              </a14:hiddenFill>
-            </a:ext>
-            <a:ext uri="{91240B29-F687-4F45-9708-019B960494DF}">
-              <a14:hiddenLine xmlns:a14="http://schemas.microsoft.com/office/drawing/2010/main" w="9525">
-                <a:solidFill>
-                  <a:srgbClr val="000000"/>
-                </a:solidFill>
-                <a:miter lim="800000"/>
-                <a:headEnd/>
-                <a:tailEnd/>
-              </a14:hiddenLine>
-            </a:ext>
-          </a:extLst>
         </p:spPr>
+      </p:pic>
+      <p:sp>
+        <p:nvSpPr>
+          <p:cNvPr id="14" name="Content Placeholder 13">
+            <a:extLst>
+              <a:ext uri="{FF2B5EF4-FFF2-40B4-BE49-F238E27FC236}">
+                <a16:creationId xmlns:a16="http://schemas.microsoft.com/office/drawing/2014/main" id="{D0A56B8D-631C-A3A9-60A0-9D47EE00067A}"/>
+              </a:ext>
+            </a:extLst>
+          </p:cNvPr>
+          <p:cNvSpPr>
+            <a:spLocks noGrp="1"/>
+          </p:cNvSpPr>
+          <p:nvPr>
+            <p:ph sz="half" idx="1"/>
+          </p:nvPr>
+        </p:nvSpPr>
+        <p:spPr/>
         <p:txBody>
-          <a:bodyPr wrap="square">
-            <a:spAutoFit/>
-          </a:bodyPr>
-          <a:lstStyle>
-            <a:lvl1pPr eaLnBrk="0" hangingPunct="0">
-              <a:spcBef>
-                <a:spcPct val="20000"/>
-              </a:spcBef>
-              <a:buChar char="•"/>
-              <a:defRPr sz="3200">
-                <a:solidFill>
-                  <a:schemeClr val="tx1"/>
-                </a:solidFill>
-                <a:latin typeface="Arial" charset="0"/>
-              </a:defRPr>
-            </a:lvl1pPr>
-            <a:lvl2pPr marL="742950" indent="-285750" eaLnBrk="0" hangingPunct="0">
-              <a:spcBef>
-                <a:spcPct val="20000"/>
-              </a:spcBef>
-              <a:buChar char="–"/>
-              <a:defRPr sz="2800">
-                <a:solidFill>
-                  <a:schemeClr val="tx1"/>
-                </a:solidFill>
-                <a:latin typeface="Arial" charset="0"/>
-              </a:defRPr>
-            </a:lvl2pPr>
-            <a:lvl3pPr marL="1143000" indent="-228600" eaLnBrk="0" hangingPunct="0">
-              <a:spcBef>
-                <a:spcPct val="20000"/>
-              </a:spcBef>
-              <a:buChar char="•"/>
-              <a:defRPr sz="2400">
-                <a:solidFill>
-                  <a:schemeClr val="tx1"/>
-                </a:solidFill>
-                <a:latin typeface="Arial" charset="0"/>
-              </a:defRPr>
-            </a:lvl3pPr>
-            <a:lvl4pPr marL="1600200" indent="-228600" eaLnBrk="0" hangingPunct="0">
-              <a:spcBef>
-                <a:spcPct val="20000"/>
-              </a:spcBef>
-              <a:buChar char="–"/>
-              <a:defRPr sz="2000">
-                <a:solidFill>
-                  <a:schemeClr val="tx1"/>
-                </a:solidFill>
-                <a:latin typeface="Arial" charset="0"/>
-              </a:defRPr>
-            </a:lvl4pPr>
-            <a:lvl5pPr marL="2057400" indent="-228600" eaLnBrk="0" hangingPunct="0">
-              <a:spcBef>
-                <a:spcPct val="20000"/>
-              </a:spcBef>
-              <a:buChar char="»"/>
-              <a:defRPr sz="2000">
-                <a:solidFill>
-                  <a:schemeClr val="tx1"/>
-                </a:solidFill>
-                <a:latin typeface="Arial" charset="0"/>
-              </a:defRPr>
-            </a:lvl5pPr>
-            <a:lvl6pPr marL="2514600" indent="-228600" eaLnBrk="0" fontAlgn="base" hangingPunct="0">
-              <a:spcBef>
-                <a:spcPct val="20000"/>
-              </a:spcBef>
-              <a:spcAft>
-                <a:spcPct val="0"/>
-              </a:spcAft>
-              <a:buChar char="»"/>
-              <a:defRPr sz="2000">
-                <a:solidFill>
-                  <a:schemeClr val="tx1"/>
-                </a:solidFill>
-                <a:latin typeface="Arial" charset="0"/>
-              </a:defRPr>
-            </a:lvl6pPr>
-            <a:lvl7pPr marL="2971800" indent="-228600" eaLnBrk="0" fontAlgn="base" hangingPunct="0">
-              <a:spcBef>
-                <a:spcPct val="20000"/>
-              </a:spcBef>
-              <a:spcAft>
-                <a:spcPct val="0"/>
-              </a:spcAft>
-              <a:buChar char="»"/>
-              <a:defRPr sz="2000">
-                <a:solidFill>
-                  <a:schemeClr val="tx1"/>
-                </a:solidFill>
-                <a:latin typeface="Arial" charset="0"/>
-              </a:defRPr>
-            </a:lvl7pPr>
-            <a:lvl8pPr marL="3429000" indent="-228600" eaLnBrk="0" fontAlgn="base" hangingPunct="0">
-              <a:spcBef>
-                <a:spcPct val="20000"/>
-              </a:spcBef>
-              <a:spcAft>
-                <a:spcPct val="0"/>
-              </a:spcAft>
-              <a:buChar char="»"/>
-              <a:defRPr sz="2000">
-                <a:solidFill>
-                  <a:schemeClr val="tx1"/>
-                </a:solidFill>
-                <a:latin typeface="Arial" charset="0"/>
-              </a:defRPr>
-            </a:lvl8pPr>
-            <a:lvl9pPr marL="3886200" indent="-228600" eaLnBrk="0" fontAlgn="base" hangingPunct="0">
-              <a:spcBef>
-                <a:spcPct val="20000"/>
-              </a:spcBef>
-              <a:spcAft>
-                <a:spcPct val="0"/>
-              </a:spcAft>
-              <a:buChar char="»"/>
-              <a:defRPr sz="2000">
-                <a:solidFill>
-                  <a:schemeClr val="tx1"/>
-                </a:solidFill>
-                <a:latin typeface="Arial" charset="0"/>
-              </a:defRPr>
-            </a:lvl9pPr>
-          </a:lstStyle>
-          <a:p>
-            <a:pPr eaLnBrk="1" hangingPunct="1">
-              <a:lnSpc>
-                <a:spcPct val="150000"/>
-              </a:lnSpc>
-              <a:spcBef>
-                <a:spcPct val="0"/>
-              </a:spcBef>
-              <a:buNone/>
-            </a:pPr>
-            <a:r>
-              <a:rPr lang="en-AU" sz="2400" b="1" dirty="0">
-                <a:latin typeface="+mn-lt"/>
-                <a:ea typeface="Calibri" panose="020F0502020204030204" pitchFamily="34" charset="0"/>
-              </a:rPr>
-              <a:t>Looking Forward</a:t>
-            </a:r>
-            <a:endParaRPr lang="en-US" sz="800" dirty="0">
-              <a:effectLst/>
-              <a:latin typeface="+mn-lt"/>
-              <a:ea typeface="Calibri" panose="020F0502020204030204" pitchFamily="34" charset="0"/>
-            </a:endParaRPr>
-          </a:p>
-          <a:p>
-            <a:pPr marL="342900" indent="-342900" eaLnBrk="1" hangingPunct="1">
-              <a:lnSpc>
-                <a:spcPct val="150000"/>
-              </a:lnSpc>
-              <a:spcBef>
-                <a:spcPct val="0"/>
-              </a:spcBef>
-              <a:buFont typeface="Arial" panose="020B0604020202020204" pitchFamily="34" charset="0"/>
-              <a:buChar char="•"/>
-            </a:pPr>
-            <a:endParaRPr lang="en-US" sz="2000" dirty="0">
-              <a:latin typeface="+mn-lt"/>
-            </a:endParaRPr>
+          <a:bodyPr/>
+          <a:lstStyle/>
+          <a:p>
+            <a:endParaRPr lang="en-AU"/>
           </a:p>
         </p:txBody>
       </p:sp>
     </p:spTree>
     <p:extLst>
       <p:ext uri="{BB962C8B-B14F-4D97-AF65-F5344CB8AC3E}">
-        <p14:creationId xmlns:p14="http://schemas.microsoft.com/office/powerpoint/2010/main" val="335187301"/>
+        <p14:creationId xmlns:p14="http://schemas.microsoft.com/office/powerpoint/2010/main" val="2119848009"/>
+      </p:ext>
+    </p:extLst>
+  </p:cSld>
+  <p:clrMapOvr>
+    <a:masterClrMapping/>
+  </p:clrMapOvr>
+</p:sld>
+</file>
+
+<file path=ppt/slides/slide7.xml><?xml version="1.0" encoding="utf-8"?>
+<p:sld xmlns:a="http://schemas.openxmlformats.org/drawingml/2006/main" xmlns:r="http://schemas.openxmlformats.org/officeDocument/2006/relationships" xmlns:p="http://schemas.openxmlformats.org/presentationml/2006/main">
+  <p:cSld>
+    <p:spTree>
+      <p:nvGrpSpPr>
+        <p:cNvPr id="1" name=""/>
+        <p:cNvGrpSpPr/>
+        <p:nvPr/>
+      </p:nvGrpSpPr>
+      <p:grpSpPr>
+        <a:xfrm>
+          <a:off x="0" y="0"/>
+          <a:ext cx="0" cy="0"/>
+          <a:chOff x="0" y="0"/>
+          <a:chExt cx="0" cy="0"/>
+        </a:xfrm>
+      </p:grpSpPr>
+      <p:sp>
+        <p:nvSpPr>
+          <p:cNvPr id="5" name="Title 4">
+            <a:extLst>
+              <a:ext uri="{FF2B5EF4-FFF2-40B4-BE49-F238E27FC236}">
+                <a16:creationId xmlns:a16="http://schemas.microsoft.com/office/drawing/2014/main" id="{CDBFC944-97E6-44A7-BEEC-D30304AD5363}"/>
+              </a:ext>
+            </a:extLst>
+          </p:cNvPr>
+          <p:cNvSpPr>
+            <a:spLocks noGrp="1"/>
+          </p:cNvSpPr>
+          <p:nvPr>
+            <p:ph type="title"/>
+          </p:nvPr>
+        </p:nvSpPr>
+        <p:spPr/>
+        <p:txBody>
+          <a:bodyPr/>
+          <a:lstStyle/>
+          <a:p>
+            <a:r>
+              <a:rPr lang="en-AU" dirty="0"/>
+              <a:t>Looking Forward</a:t>
+            </a:r>
+          </a:p>
+        </p:txBody>
+      </p:sp>
+      <p:sp>
+        <p:nvSpPr>
+          <p:cNvPr id="6" name="Content Placeholder 5">
+            <a:extLst>
+              <a:ext uri="{FF2B5EF4-FFF2-40B4-BE49-F238E27FC236}">
+                <a16:creationId xmlns:a16="http://schemas.microsoft.com/office/drawing/2014/main" id="{1EEF9192-6302-15A2-11A1-83498910B73A}"/>
+              </a:ext>
+            </a:extLst>
+          </p:cNvPr>
+          <p:cNvSpPr>
+            <a:spLocks noGrp="1"/>
+          </p:cNvSpPr>
+          <p:nvPr>
+            <p:ph idx="1"/>
+          </p:nvPr>
+        </p:nvSpPr>
+        <p:spPr/>
+        <p:txBody>
+          <a:bodyPr/>
+          <a:lstStyle/>
+          <a:p>
+            <a:r>
+              <a:rPr lang="en-GB" dirty="0"/>
+              <a:t>Research Question:</a:t>
+            </a:r>
+          </a:p>
+          <a:p>
+            <a:pPr lvl="1"/>
+            <a:r>
+              <a:rPr lang="en-GB" dirty="0"/>
+              <a:t>“Do GPA subjects differ in difficulties?”</a:t>
+            </a:r>
+          </a:p>
+          <a:p>
+            <a:r>
+              <a:rPr lang="en-GB" dirty="0"/>
+              <a:t>Preliminary Answer:</a:t>
+            </a:r>
+          </a:p>
+          <a:p>
+            <a:pPr lvl="1"/>
+            <a:r>
+              <a:rPr lang="en-GB" dirty="0"/>
+              <a:t>“Yes, but it depends.”</a:t>
+            </a:r>
+          </a:p>
+          <a:p>
+            <a:r>
+              <a:rPr lang="en-GB" dirty="0"/>
+              <a:t>Possible extensions:</a:t>
+            </a:r>
+          </a:p>
+          <a:p>
+            <a:pPr lvl="1"/>
+            <a:r>
+              <a:rPr lang="en-GB" dirty="0"/>
+              <a:t>Do these patterns remain consistent across</a:t>
+            </a:r>
+          </a:p>
+          <a:p>
+            <a:pPr lvl="2"/>
+            <a:r>
+              <a:rPr lang="en-GB" dirty="0"/>
+              <a:t>School locations (urban vs rural)</a:t>
+            </a:r>
+          </a:p>
+          <a:p>
+            <a:pPr lvl="2"/>
+            <a:r>
+              <a:rPr lang="en-GB" dirty="0"/>
+              <a:t>Students’ sexes</a:t>
+            </a:r>
+          </a:p>
+          <a:p>
+            <a:pPr lvl="2"/>
+            <a:r>
+              <a:rPr lang="en-GB" dirty="0"/>
+              <a:t>Parental socio-economic status</a:t>
+            </a:r>
+          </a:p>
+          <a:p>
+            <a:r>
+              <a:rPr lang="en-GB" dirty="0"/>
+              <a:t>“Who carry the heaviest burden of grade difficulty differentials?”</a:t>
+            </a:r>
+          </a:p>
+          <a:p>
+            <a:endParaRPr lang="en-AU" dirty="0"/>
+          </a:p>
+        </p:txBody>
+      </p:sp>
+    </p:spTree>
+    <p:extLst>
+      <p:ext uri="{BB962C8B-B14F-4D97-AF65-F5344CB8AC3E}">
+        <p14:creationId xmlns:p14="http://schemas.microsoft.com/office/powerpoint/2010/main" val="3346587038"/>
       </p:ext>
     </p:extLst>
   </p:cSld>

</xml_diff>

<commit_message>
Add Rolf's presentation feedback
</commit_message>
<xml_diff>
--- a/Teaching/NERA_2022/Tony.pptx
+++ b/Teaching/NERA_2022/Tony.pptx
@@ -294,7 +294,7 @@
               <a:pPr>
                 <a:defRPr/>
               </a:pPr>
-              <a:t>27.05.2022</a:t>
+              <a:t>29.05.2022</a:t>
             </a:fld>
             <a:endParaRPr lang="nb-NO" altLang="nb-NO"/>
           </a:p>
@@ -913,8 +913,17 @@
                 <a:latin typeface="FiraCode Nerd Font" panose="020B0809050000020004" pitchFamily="49" charset="0"/>
                 <a:ea typeface="FiraCode Nerd Font" panose="020B0809050000020004" pitchFamily="49" charset="0"/>
               </a:rPr>
-              <a:t>My name is Tony. I am a first-year PhD candidate under Rolf’s supervision.</a:t>
-            </a:r>
+              <a:t>My name is Tony. I am a first-year PhD candidate under Rolf and Astrid’s supervision.</a:t>
+            </a:r>
+          </a:p>
+          <a:p>
+            <a:endParaRPr lang="en-AU" sz="1200" kern="1200" dirty="0">
+              <a:solidFill>
+                <a:schemeClr val="tx1"/>
+              </a:solidFill>
+              <a:latin typeface="FiraCode Nerd Font" panose="020B0809050000020004" pitchFamily="49" charset="0"/>
+              <a:ea typeface="FiraCode Nerd Font" panose="020B0809050000020004" pitchFamily="49" charset="0"/>
+            </a:endParaRPr>
           </a:p>
           <a:p>
             <a:r>
@@ -1094,7 +1103,7 @@
                 <a:latin typeface="FiraCode Nerd Font" panose="020B0809050000020004" pitchFamily="49" charset="0"/>
                 <a:ea typeface="FiraCode Nerd Font" panose="020B0809050000020004" pitchFamily="49" charset="0"/>
               </a:rPr>
-              <a:t>Ensuring each component entering GPA computation is comparable in difficulties is, therefore, important not only for upholding assessment fairness, but also for enhancing measurement validity.</a:t>
+              <a:t>Understanding whether and how subject difficulties vary by student background or across different settings is important for both fairness and validity purposes.</a:t>
             </a:r>
           </a:p>
           <a:p>
@@ -1111,8 +1120,15 @@
                 <a:latin typeface="FiraCode Nerd Font" panose="020B0809050000020004" pitchFamily="49" charset="0"/>
                 <a:ea typeface="FiraCode Nerd Font" panose="020B0809050000020004" pitchFamily="49" charset="0"/>
               </a:rPr>
-              <a:t>Surprisingly scarce studies, however, have been devoted into answering this fundamental question in the Nordic context, leaving both fairness and validity as untested assumptions.</a:t>
-            </a:r>
+              <a:t>Surprisingly few studies, however, have tried to answer this fundamental question in the Nordic context.</a:t>
+            </a:r>
+          </a:p>
+          <a:p>
+            <a:pPr eaLnBrk="1" hangingPunct="1"/>
+            <a:endParaRPr lang="en-AU" altLang="nb-NO" sz="1000" noProof="0" dirty="0">
+              <a:latin typeface="FiraCode Nerd Font" panose="020B0809050000020004" pitchFamily="49" charset="0"/>
+              <a:ea typeface="FiraCode Nerd Font" panose="020B0809050000020004" pitchFamily="49" charset="0"/>
+            </a:endParaRPr>
           </a:p>
           <a:p>
             <a:pPr eaLnBrk="1" hangingPunct="1"/>
@@ -1121,21 +1137,7 @@
                 <a:latin typeface="FiraCode Nerd Font" panose="020B0809050000020004" pitchFamily="49" charset="0"/>
                 <a:ea typeface="FiraCode Nerd Font" panose="020B0809050000020004" pitchFamily="49" charset="0"/>
               </a:rPr>
-              <a:t>Such concern is only exacerbated by reports from neighbouring countries, such as the UK and the Netherlands, with evidence challenging the </a:t>
-            </a:r>
-            <a:r>
-              <a:rPr lang="en-AU" altLang="nb-NO" sz="1000" noProof="0" dirty="0" err="1">
-                <a:latin typeface="FiraCode Nerd Font" panose="020B0809050000020004" pitchFamily="49" charset="0"/>
-                <a:ea typeface="FiraCode Nerd Font" panose="020B0809050000020004" pitchFamily="49" charset="0"/>
-              </a:rPr>
-              <a:t>equi</a:t>
-            </a:r>
-            <a:r>
-              <a:rPr lang="en-AU" altLang="nb-NO" sz="1000" noProof="0" dirty="0">
-                <a:latin typeface="FiraCode Nerd Font" panose="020B0809050000020004" pitchFamily="49" charset="0"/>
-                <a:ea typeface="FiraCode Nerd Font" panose="020B0809050000020004" pitchFamily="49" charset="0"/>
-              </a:rPr>
-              <a:t>-difficulty assumption.</a:t>
+              <a:t>Studies that have looked into this questions in different countries, such as the UK and the Netherlands, find evidence challenge the assumption that subject have equal difficulty.</a:t>
             </a:r>
           </a:p>
           <a:p>
@@ -1293,7 +1295,7 @@
                 <a:latin typeface="FiraCode Nerd Font" panose="020B0809050000020004" pitchFamily="49" charset="0"/>
                 <a:ea typeface="FiraCode Nerd Font" panose="020B0809050000020004" pitchFamily="49" charset="0"/>
               </a:rPr>
-              <a:t>Students receive grades from their teachers on 13 compulsory subjects, such as Norwegian, English, mathematics, natural sciences and social sciences, etc, as well as from a wide selection of electives.</a:t>
+              <a:t>Students receive grades from their teachers on 13 compulsory subjects, such as Norwegian, English, mathematics, natural sciences and social sciences, etc, as well as one grade from electives.</a:t>
             </a:r>
           </a:p>
           <a:p>
@@ -1323,7 +1325,7 @@
                 <a:latin typeface="FiraCode Nerd Font" panose="020B0809050000020004" pitchFamily="49" charset="0"/>
                 <a:ea typeface="FiraCode Nerd Font" panose="020B0809050000020004" pitchFamily="49" charset="0"/>
               </a:rPr>
-              <a:t>	the oral form covers Norwegian, English, as well as other subjects.</a:t>
+              <a:t>	the oral form covers the same subjects as written, as well as other subjects.</a:t>
             </a:r>
           </a:p>
           <a:p>
@@ -1340,8 +1342,15 @@
                 <a:latin typeface="FiraCode Nerd Font" panose="020B0809050000020004" pitchFamily="49" charset="0"/>
                 <a:ea typeface="FiraCode Nerd Font" panose="020B0809050000020004" pitchFamily="49" charset="0"/>
               </a:rPr>
-              <a:t>While every student receives teacher-assigned grades (that is, 100% sampling), the student cohort is divided evenly between participating in mathematics, Norwegian and English tests, giving exam grades a 33% sampling probability.</a:t>
-            </a:r>
+              <a:t>At the end of Year 10, students are drawn to take one written and one oral exam.</a:t>
+            </a:r>
+          </a:p>
+          <a:p>
+            <a:pPr eaLnBrk="1" hangingPunct="1"/>
+            <a:endParaRPr lang="en-AU" altLang="nb-NO" sz="1000" noProof="0" dirty="0">
+              <a:latin typeface="FiraCode Nerd Font" panose="020B0809050000020004" pitchFamily="49" charset="0"/>
+              <a:ea typeface="FiraCode Nerd Font" panose="020B0809050000020004" pitchFamily="49" charset="0"/>
+            </a:endParaRPr>
           </a:p>
           <a:p>
             <a:pPr eaLnBrk="1" hangingPunct="1"/>
@@ -1350,7 +1359,7 @@
                 <a:latin typeface="FiraCode Nerd Font" panose="020B0809050000020004" pitchFamily="49" charset="0"/>
                 <a:ea typeface="FiraCode Nerd Font" panose="020B0809050000020004" pitchFamily="49" charset="0"/>
               </a:rPr>
-              <a:t>Although 2/3 of the exam grades are missing for each exam subject, such situation can be safely modelled under missing completely at random (MCAR) assumptions due to random assignment.</a:t>
+              <a:t>Although 2/3 of the written exam grades are missing for each exam subject, this can be safely modelled under the missing completely at random (MCAR) assumptions due to random assignment. This is a particularly attractive feature of Rasch models</a:t>
             </a:r>
           </a:p>
           <a:p>
@@ -2197,7 +2206,7 @@
                 <a:latin typeface="FiraCode Nerd Font" panose="020B0809050000020004" pitchFamily="49" charset="0"/>
                 <a:ea typeface="FiraCode Nerd Font" panose="020B0809050000020004" pitchFamily="49" charset="0"/>
               </a:rPr>
-              <a:t>This slide presents visual summaries of the “b” parameters derived from PCMs.</a:t>
+              <a:t>This following two slides present visual summaries of the “b” parameters derived from PCMs.</a:t>
             </a:r>
           </a:p>
           <a:p>
@@ -2228,17 +2237,7 @@
                 <a:latin typeface="FiraCode Nerd Font" panose="020B0809050000020004" pitchFamily="49" charset="0"/>
                 <a:ea typeface="FiraCode Nerd Font" panose="020B0809050000020004" pitchFamily="49" charset="0"/>
               </a:rPr>
-              <a:t>, teacher-assigned grades) are grouped on the left panel, in descending order.</a:t>
-            </a:r>
-          </a:p>
-          <a:p>
-            <a:pPr eaLnBrk="1" hangingPunct="1"/>
-            <a:r>
-              <a:rPr lang="en-AU" altLang="nb-NO" sz="1200" noProof="0" dirty="0">
-                <a:latin typeface="FiraCode Nerd Font" panose="020B0809050000020004" pitchFamily="49" charset="0"/>
-                <a:ea typeface="FiraCode Nerd Font" panose="020B0809050000020004" pitchFamily="49" charset="0"/>
-              </a:rPr>
-              <a:t>For the purpose of enhancing comparability, difficulty parameters of the exam grades are presented in pairs with their teacher-assigned counterparts in the right panel.</a:t>
+              <a:t>, teacher-assigned grades) are presented first.</a:t>
             </a:r>
           </a:p>
           <a:p>
@@ -2255,18 +2254,15 @@
                 <a:latin typeface="FiraCode Nerd Font" panose="020B0809050000020004" pitchFamily="49" charset="0"/>
                 <a:ea typeface="FiraCode Nerd Font" panose="020B0809050000020004" pitchFamily="49" charset="0"/>
               </a:rPr>
-              <a:t>Let’s first of all examine the teacher-assigned grades:</a:t>
+              <a:t>With the exception of Written Norwegian, the b_5 line on the top is relative flat, while the b_4, b_3, down to b_1 lines are increasingly downward-sloping.</a:t>
             </a:r>
           </a:p>
           <a:p>
             <a:pPr eaLnBrk="1" hangingPunct="1"/>
-            <a:r>
-              <a:rPr lang="en-AU" altLang="nb-NO" sz="1200" noProof="0" dirty="0">
-                <a:latin typeface="FiraCode Nerd Font" panose="020B0809050000020004" pitchFamily="49" charset="0"/>
-                <a:ea typeface="FiraCode Nerd Font" panose="020B0809050000020004" pitchFamily="49" charset="0"/>
-              </a:rPr>
-              <a:t>The b_5 line on the top is relative flat, while the b_4, b_3, down to b_1 lines are increasingly downward-sloping.</a:t>
-            </a:r>
+            <a:endParaRPr lang="en-AU" altLang="nb-NO" sz="1200" noProof="0" dirty="0">
+              <a:latin typeface="FiraCode Nerd Font" panose="020B0809050000020004" pitchFamily="49" charset="0"/>
+              <a:ea typeface="FiraCode Nerd Font" panose="020B0809050000020004" pitchFamily="49" charset="0"/>
+            </a:endParaRPr>
           </a:p>
           <a:p>
             <a:pPr eaLnBrk="1" hangingPunct="1"/>
@@ -2290,6 +2286,13 @@
           </a:p>
           <a:p>
             <a:pPr eaLnBrk="1" hangingPunct="1"/>
+            <a:endParaRPr lang="en-AU" altLang="nb-NO" sz="1200" noProof="0" dirty="0">
+              <a:latin typeface="FiraCode Nerd Font" panose="020B0809050000020004" pitchFamily="49" charset="0"/>
+              <a:ea typeface="FiraCode Nerd Font" panose="020B0809050000020004" pitchFamily="49" charset="0"/>
+            </a:endParaRPr>
+          </a:p>
+          <a:p>
+            <a:pPr eaLnBrk="1" hangingPunct="1"/>
             <a:r>
               <a:rPr lang="en-AU" altLang="nb-NO" sz="1200" noProof="0" dirty="0">
                 <a:latin typeface="FiraCode Nerd Font" panose="020B0809050000020004" pitchFamily="49" charset="0"/>
@@ -2300,90 +2303,10 @@
           </a:p>
           <a:p>
             <a:pPr eaLnBrk="1" hangingPunct="1"/>
-            <a:r>
-              <a:rPr lang="en-AU" altLang="nb-NO" sz="1200" noProof="0" dirty="0">
-                <a:latin typeface="FiraCode Nerd Font" panose="020B0809050000020004" pitchFamily="49" charset="0"/>
-                <a:ea typeface="FiraCode Nerd Font" panose="020B0809050000020004" pitchFamily="49" charset="0"/>
-              </a:rPr>
-              <a:t>Such differences, however, were minimum among the top grades 5 and 6.</a:t>
-            </a:r>
-          </a:p>
-          <a:p>
-            <a:pPr eaLnBrk="1" hangingPunct="1"/>
             <a:endParaRPr lang="en-AU" altLang="nb-NO" sz="1200" noProof="0" dirty="0">
               <a:latin typeface="FiraCode Nerd Font" panose="020B0809050000020004" pitchFamily="49" charset="0"/>
               <a:ea typeface="FiraCode Nerd Font" panose="020B0809050000020004" pitchFamily="49" charset="0"/>
             </a:endParaRPr>
-          </a:p>
-          <a:p>
-            <a:pPr eaLnBrk="1" hangingPunct="1"/>
-            <a:r>
-              <a:rPr lang="en-AU" altLang="nb-NO" sz="1200" noProof="0" dirty="0">
-                <a:latin typeface="FiraCode Nerd Font" panose="020B0809050000020004" pitchFamily="49" charset="0"/>
-                <a:ea typeface="FiraCode Nerd Font" panose="020B0809050000020004" pitchFamily="49" charset="0"/>
-              </a:rPr>
-              <a:t>From the right panel, differences between teacher- and examiner-assigned marks also showed interesting patterns.</a:t>
-            </a:r>
-          </a:p>
-          <a:p>
-            <a:pPr eaLnBrk="1" hangingPunct="1"/>
-            <a:r>
-              <a:rPr lang="en-AU" altLang="nb-NO" sz="1200" noProof="0" dirty="0">
-                <a:latin typeface="FiraCode Nerd Font" panose="020B0809050000020004" pitchFamily="49" charset="0"/>
-                <a:ea typeface="FiraCode Nerd Font" panose="020B0809050000020004" pitchFamily="49" charset="0"/>
-              </a:rPr>
-              <a:t>It is first of all noticeable that written exams all had upward-sloping curves, while oral exams had downward-sloping ones.</a:t>
-            </a:r>
-          </a:p>
-          <a:p>
-            <a:pPr eaLnBrk="1" hangingPunct="1"/>
-            <a:r>
-              <a:rPr lang="en-AU" altLang="nb-NO" sz="1200" noProof="0" dirty="0">
-                <a:latin typeface="FiraCode Nerd Font" panose="020B0809050000020004" pitchFamily="49" charset="0"/>
-                <a:ea typeface="FiraCode Nerd Font" panose="020B0809050000020004" pitchFamily="49" charset="0"/>
-              </a:rPr>
-              <a:t>On the surface, this pattern suggests that examiners were stricter than teachers in marking written tests, but more lenient in oral exams.</a:t>
-            </a:r>
-          </a:p>
-          <a:p>
-            <a:pPr eaLnBrk="1" hangingPunct="1"/>
-            <a:r>
-              <a:rPr lang="en-AU" altLang="nb-NO" sz="1200" noProof="0" dirty="0">
-                <a:latin typeface="FiraCode Nerd Font" panose="020B0809050000020004" pitchFamily="49" charset="0"/>
-                <a:ea typeface="FiraCode Nerd Font" panose="020B0809050000020004" pitchFamily="49" charset="0"/>
-              </a:rPr>
-              <a:t>The second strand of the answer to the research question therefore can be:</a:t>
-            </a:r>
-          </a:p>
-          <a:p>
-            <a:pPr eaLnBrk="1" hangingPunct="1"/>
-            <a:r>
-              <a:rPr lang="en-AU" altLang="nb-NO" sz="1200" noProof="0" dirty="0">
-                <a:latin typeface="FiraCode Nerd Font" panose="020B0809050000020004" pitchFamily="49" charset="0"/>
-                <a:ea typeface="FiraCode Nerd Font" panose="020B0809050000020004" pitchFamily="49" charset="0"/>
-              </a:rPr>
-              <a:t>	“Yes, exam grades differ from teacher-assigned grades, depending on the form of examination.”</a:t>
-            </a:r>
-          </a:p>
-          <a:p>
-            <a:pPr eaLnBrk="1" hangingPunct="1"/>
-            <a:r>
-              <a:rPr lang="en-AU" altLang="nb-NO" sz="1200" noProof="0" dirty="0">
-                <a:latin typeface="FiraCode Nerd Font" panose="020B0809050000020004" pitchFamily="49" charset="0"/>
-                <a:ea typeface="FiraCode Nerd Font" panose="020B0809050000020004" pitchFamily="49" charset="0"/>
-              </a:rPr>
-              <a:t>Contrary to the previous observation form the left panel, slopes in the right panel were the steepest on the top end, suggesting larger disagreement between teachers and examiners for awarding grade 5s and 6s while disagreement remained minimum for lower grades.</a:t>
-            </a:r>
-          </a:p>
-          <a:p>
-            <a:pPr eaLnBrk="1" hangingPunct="1"/>
-            <a:r>
-              <a:rPr lang="en-AU" altLang="nb-NO" sz="1200" noProof="0" dirty="0">
-                <a:latin typeface="FiraCode Nerd Font" panose="020B0809050000020004" pitchFamily="49" charset="0"/>
-                <a:ea typeface="FiraCode Nerd Font" panose="020B0809050000020004" pitchFamily="49" charset="0"/>
-              </a:rPr>
-              <a:t>Amongst the 5 exams, Written Norwegian stood out as the subject with the largest teacher-examiner disagreement.</a:t>
-            </a:r>
           </a:p>
         </p:txBody>
       </p:sp>
@@ -2644,13 +2567,179 @@
           <a:bodyPr/>
           <a:lstStyle/>
           <a:p>
-            <a:pPr eaLnBrk="1" hangingPunct="1"/>
+            <a:pPr marL="0" marR="0" lvl="0" indent="0" algn="l" defTabSz="914400" rtl="0" eaLnBrk="1" fontAlgn="base" latinLnBrk="0" hangingPunct="1">
+              <a:lnSpc>
+                <a:spcPct val="100000"/>
+              </a:lnSpc>
+              <a:spcBef>
+                <a:spcPct val="30000"/>
+              </a:spcBef>
+              <a:spcAft>
+                <a:spcPct val="0"/>
+              </a:spcAft>
+              <a:buClrTx/>
+              <a:buSzTx/>
+              <a:buFontTx/>
+              <a:buNone/>
+              <a:tabLst/>
+              <a:defRPr/>
+            </a:pPr>
             <a:r>
               <a:rPr lang="en-AU" altLang="nb-NO" sz="1200" noProof="0" dirty="0">
                 <a:latin typeface="FiraCode Nerd Font" panose="020B0809050000020004" pitchFamily="49" charset="0"/>
                 <a:ea typeface="FiraCode Nerd Font" panose="020B0809050000020004" pitchFamily="49" charset="0"/>
               </a:rPr>
-              <a:t>This slide presents visual summaries of the “b” parameters derived from PCMs.</a:t>
+              <a:t>Now to exam grades.</a:t>
+            </a:r>
+          </a:p>
+          <a:p>
+            <a:pPr marL="0" marR="0" lvl="0" indent="0" algn="l" defTabSz="914400" rtl="0" eaLnBrk="1" fontAlgn="base" latinLnBrk="0" hangingPunct="1">
+              <a:lnSpc>
+                <a:spcPct val="100000"/>
+              </a:lnSpc>
+              <a:spcBef>
+                <a:spcPct val="30000"/>
+              </a:spcBef>
+              <a:spcAft>
+                <a:spcPct val="0"/>
+              </a:spcAft>
+              <a:buClrTx/>
+              <a:buSzTx/>
+              <a:buFontTx/>
+              <a:buNone/>
+              <a:tabLst/>
+              <a:defRPr/>
+            </a:pPr>
+            <a:endParaRPr lang="en-AU" altLang="nb-NO" sz="1200" noProof="0" dirty="0">
+              <a:latin typeface="FiraCode Nerd Font" panose="020B0809050000020004" pitchFamily="49" charset="0"/>
+              <a:ea typeface="FiraCode Nerd Font" panose="020B0809050000020004" pitchFamily="49" charset="0"/>
+            </a:endParaRPr>
+          </a:p>
+          <a:p>
+            <a:pPr marL="0" marR="0" lvl="0" indent="0" algn="l" defTabSz="914400" rtl="0" eaLnBrk="1" fontAlgn="base" latinLnBrk="0" hangingPunct="1">
+              <a:lnSpc>
+                <a:spcPct val="100000"/>
+              </a:lnSpc>
+              <a:spcBef>
+                <a:spcPct val="30000"/>
+              </a:spcBef>
+              <a:spcAft>
+                <a:spcPct val="0"/>
+              </a:spcAft>
+              <a:buClrTx/>
+              <a:buSzTx/>
+              <a:buFontTx/>
+              <a:buNone/>
+              <a:tabLst/>
+              <a:defRPr/>
+            </a:pPr>
+            <a:r>
+              <a:rPr lang="en-AU" altLang="nb-NO" sz="1200" noProof="0" dirty="0">
+                <a:latin typeface="FiraCode Nerd Font" panose="020B0809050000020004" pitchFamily="49" charset="0"/>
+                <a:ea typeface="FiraCode Nerd Font" panose="020B0809050000020004" pitchFamily="49" charset="0"/>
+              </a:rPr>
+              <a:t>All three written exams (mathematics, English, and Norwegian) were included in this study.</a:t>
+            </a:r>
+          </a:p>
+          <a:p>
+            <a:pPr marL="0" marR="0" lvl="0" indent="0" algn="l" defTabSz="914400" rtl="0" eaLnBrk="1" fontAlgn="base" latinLnBrk="0" hangingPunct="1">
+              <a:lnSpc>
+                <a:spcPct val="100000"/>
+              </a:lnSpc>
+              <a:spcBef>
+                <a:spcPct val="30000"/>
+              </a:spcBef>
+              <a:spcAft>
+                <a:spcPct val="0"/>
+              </a:spcAft>
+              <a:buClrTx/>
+              <a:buSzTx/>
+              <a:buFontTx/>
+              <a:buNone/>
+              <a:tabLst/>
+              <a:defRPr/>
+            </a:pPr>
+            <a:r>
+              <a:rPr lang="en-AU" altLang="nb-NO" sz="1200" noProof="0" dirty="0">
+                <a:latin typeface="FiraCode Nerd Font" panose="020B0809050000020004" pitchFamily="49" charset="0"/>
+                <a:ea typeface="FiraCode Nerd Font" panose="020B0809050000020004" pitchFamily="49" charset="0"/>
+              </a:rPr>
+              <a:t>In order to match teacher-assigned grades, oral English and oral Norwegian were also included in this analysis.</a:t>
+            </a:r>
+          </a:p>
+          <a:p>
+            <a:pPr marL="0" marR="0" lvl="0" indent="0" algn="l" defTabSz="914400" rtl="0" eaLnBrk="1" fontAlgn="base" latinLnBrk="0" hangingPunct="1">
+              <a:lnSpc>
+                <a:spcPct val="100000"/>
+              </a:lnSpc>
+              <a:spcBef>
+                <a:spcPct val="30000"/>
+              </a:spcBef>
+              <a:spcAft>
+                <a:spcPct val="0"/>
+              </a:spcAft>
+              <a:buClrTx/>
+              <a:buSzTx/>
+              <a:buFontTx/>
+              <a:buNone/>
+              <a:tabLst/>
+              <a:defRPr/>
+            </a:pPr>
+            <a:r>
+              <a:rPr lang="en-AU" altLang="nb-NO" sz="1200" noProof="0" dirty="0">
+                <a:latin typeface="FiraCode Nerd Font" panose="020B0809050000020004" pitchFamily="49" charset="0"/>
+                <a:ea typeface="FiraCode Nerd Font" panose="020B0809050000020004" pitchFamily="49" charset="0"/>
+              </a:rPr>
+              <a:t>	Since oral exams have substantially less observations than teacher-assigned grades due to “planned missingness”, the 95% Cis for oral parameters are wider.</a:t>
+            </a:r>
+          </a:p>
+          <a:p>
+            <a:pPr marL="0" marR="0" lvl="0" indent="0" algn="l" defTabSz="914400" rtl="0" eaLnBrk="1" fontAlgn="base" latinLnBrk="0" hangingPunct="1">
+              <a:lnSpc>
+                <a:spcPct val="100000"/>
+              </a:lnSpc>
+              <a:spcBef>
+                <a:spcPct val="30000"/>
+              </a:spcBef>
+              <a:spcAft>
+                <a:spcPct val="0"/>
+              </a:spcAft>
+              <a:buClrTx/>
+              <a:buSzTx/>
+              <a:buFontTx/>
+              <a:buNone/>
+              <a:tabLst/>
+              <a:defRPr/>
+            </a:pPr>
+            <a:endParaRPr lang="en-AU" altLang="nb-NO" sz="1200" noProof="0" dirty="0">
+              <a:latin typeface="FiraCode Nerd Font" panose="020B0809050000020004" pitchFamily="49" charset="0"/>
+              <a:ea typeface="FiraCode Nerd Font" panose="020B0809050000020004" pitchFamily="49" charset="0"/>
+            </a:endParaRPr>
+          </a:p>
+          <a:p>
+            <a:pPr marL="0" marR="0" lvl="0" indent="0" algn="l" defTabSz="914400" rtl="0" eaLnBrk="1" fontAlgn="base" latinLnBrk="0" hangingPunct="1">
+              <a:lnSpc>
+                <a:spcPct val="100000"/>
+              </a:lnSpc>
+              <a:spcBef>
+                <a:spcPct val="30000"/>
+              </a:spcBef>
+              <a:spcAft>
+                <a:spcPct val="0"/>
+              </a:spcAft>
+              <a:buClrTx/>
+              <a:buSzTx/>
+              <a:buFontTx/>
+              <a:buNone/>
+              <a:tabLst/>
+              <a:defRPr/>
+            </a:pPr>
+            <a:r>
+              <a:rPr lang="en-AU" altLang="nb-NO" sz="1200" noProof="0" dirty="0">
+                <a:latin typeface="FiraCode Nerd Font" panose="020B0809050000020004" pitchFamily="49" charset="0"/>
+                <a:ea typeface="FiraCode Nerd Font" panose="020B0809050000020004" pitchFamily="49" charset="0"/>
+              </a:rPr>
+              <a:t>In this diagram, we re-produced teacher-assigned grades (left) to pair with exam grades (right) for comparison.</a:t>
             </a:r>
           </a:p>
           <a:p>
@@ -2667,31 +2756,17 @@
                 <a:latin typeface="FiraCode Nerd Font" panose="020B0809050000020004" pitchFamily="49" charset="0"/>
                 <a:ea typeface="FiraCode Nerd Font" panose="020B0809050000020004" pitchFamily="49" charset="0"/>
               </a:rPr>
-              <a:t>Difficulty parameters of the 12 compulsory subjects (</a:t>
-            </a:r>
-            <a:r>
-              <a:rPr lang="en-AU" altLang="nb-NO" sz="1200" noProof="0" dirty="0" err="1">
-                <a:latin typeface="FiraCode Nerd Font" panose="020B0809050000020004" pitchFamily="49" charset="0"/>
-                <a:ea typeface="FiraCode Nerd Font" panose="020B0809050000020004" pitchFamily="49" charset="0"/>
-              </a:rPr>
-              <a:t>ie</a:t>
-            </a:r>
+              <a:t>It is first of all noticeable that written exams all had upward-sloping curves, while oral exams had downward-sloping ones.</a:t>
+            </a:r>
+          </a:p>
+          <a:p>
+            <a:pPr eaLnBrk="1" hangingPunct="1"/>
             <a:r>
               <a:rPr lang="en-AU" altLang="nb-NO" sz="1200" noProof="0" dirty="0">
                 <a:latin typeface="FiraCode Nerd Font" panose="020B0809050000020004" pitchFamily="49" charset="0"/>
                 <a:ea typeface="FiraCode Nerd Font" panose="020B0809050000020004" pitchFamily="49" charset="0"/>
               </a:rPr>
-              <a:t>, teacher-assigned grades) are grouped on the left panel, in descending order.</a:t>
-            </a:r>
-          </a:p>
-          <a:p>
-            <a:pPr eaLnBrk="1" hangingPunct="1"/>
-            <a:r>
-              <a:rPr lang="en-AU" altLang="nb-NO" sz="1200" noProof="0" dirty="0">
-                <a:latin typeface="FiraCode Nerd Font" panose="020B0809050000020004" pitchFamily="49" charset="0"/>
-                <a:ea typeface="FiraCode Nerd Font" panose="020B0809050000020004" pitchFamily="49" charset="0"/>
-              </a:rPr>
-              <a:t>For the purpose of enhancing comparability, difficulty parameters of the exam grades are presented in pairs with their teacher-assigned counterparts in the right panel.</a:t>
+              <a:t>On the surface, this pattern suggests that examiners were stricter than teachers in marking written tests, but more lenient in oral exams.</a:t>
             </a:r>
           </a:p>
           <a:p>
@@ -2708,7 +2783,7 @@
                 <a:latin typeface="FiraCode Nerd Font" panose="020B0809050000020004" pitchFamily="49" charset="0"/>
                 <a:ea typeface="FiraCode Nerd Font" panose="020B0809050000020004" pitchFamily="49" charset="0"/>
               </a:rPr>
-              <a:t>Let’s first of all examine the teacher-assigned grades:</a:t>
+              <a:t>The second strand of the answer to the research question therefore can be:</a:t>
             </a:r>
           </a:p>
           <a:p>
@@ -2718,7 +2793,7 @@
                 <a:latin typeface="FiraCode Nerd Font" panose="020B0809050000020004" pitchFamily="49" charset="0"/>
                 <a:ea typeface="FiraCode Nerd Font" panose="020B0809050000020004" pitchFamily="49" charset="0"/>
               </a:rPr>
-              <a:t>The b_5 line on the top is relative flat, while the b_4, b_3, down to b_1 lines are increasingly downward-sloping.</a:t>
+              <a:t>	“Yes, exam grades differ from teacher-assigned grades, depending on the form of examination.”</a:t>
             </a:r>
           </a:p>
           <a:p>
@@ -2728,37 +2803,7 @@
                 <a:latin typeface="FiraCode Nerd Font" panose="020B0809050000020004" pitchFamily="49" charset="0"/>
                 <a:ea typeface="FiraCode Nerd Font" panose="020B0809050000020004" pitchFamily="49" charset="0"/>
               </a:rPr>
-              <a:t>This “fanning out“ effect suggests a partial answer to the research question:</a:t>
-            </a:r>
-          </a:p>
-          <a:p>
-            <a:pPr eaLnBrk="1" hangingPunct="1"/>
-            <a:r>
-              <a:rPr lang="en-AU" altLang="nb-NO" sz="1200" noProof="0" dirty="0">
-                <a:latin typeface="FiraCode Nerd Font" panose="020B0809050000020004" pitchFamily="49" charset="0"/>
-                <a:ea typeface="FiraCode Nerd Font" panose="020B0809050000020004" pitchFamily="49" charset="0"/>
-              </a:rPr>
-              <a:t>	“Yes, subjects difficulties did differ—more so for the lower grades.”</a:t>
-            </a:r>
-          </a:p>
-          <a:p>
-            <a:pPr eaLnBrk="1" hangingPunct="1"/>
-            <a:r>
-              <a:rPr lang="en-AU" altLang="nb-NO" sz="1200" noProof="0" dirty="0">
-                <a:latin typeface="FiraCode Nerd Font" panose="020B0809050000020004" pitchFamily="49" charset="0"/>
-                <a:ea typeface="FiraCode Nerd Font" panose="020B0809050000020004" pitchFamily="49" charset="0"/>
-              </a:rPr>
-              <a:t>In fact, a Grade 2 in the easiest subject (Food and Health) shared similar “b” parameter with a Grade 1 in the hardest subject (Mathematics).</a:t>
-            </a:r>
-          </a:p>
-          <a:p>
-            <a:pPr eaLnBrk="1" hangingPunct="1"/>
-            <a:r>
-              <a:rPr lang="en-AU" altLang="nb-NO" sz="1200" noProof="0" dirty="0">
-                <a:latin typeface="FiraCode Nerd Font" panose="020B0809050000020004" pitchFamily="49" charset="0"/>
-                <a:ea typeface="FiraCode Nerd Font" panose="020B0809050000020004" pitchFamily="49" charset="0"/>
-              </a:rPr>
-              <a:t>Such differences, however, were minimum among the top grades 5 and 6.</a:t>
+              <a:t>Contrary to the previous observation form the left panel, slopes in the right panel were the steepest on the top end, suggesting larger disagreement between teachers and examiners for awarding grade 5s and 6s while disagreement remained minimum for lower grades.</a:t>
             </a:r>
           </a:p>
           <a:p>
@@ -2767,66 +2812,6 @@
               <a:latin typeface="FiraCode Nerd Font" panose="020B0809050000020004" pitchFamily="49" charset="0"/>
               <a:ea typeface="FiraCode Nerd Font" panose="020B0809050000020004" pitchFamily="49" charset="0"/>
             </a:endParaRPr>
-          </a:p>
-          <a:p>
-            <a:pPr eaLnBrk="1" hangingPunct="1"/>
-            <a:r>
-              <a:rPr lang="en-AU" altLang="nb-NO" sz="1200" noProof="0" dirty="0">
-                <a:latin typeface="FiraCode Nerd Font" panose="020B0809050000020004" pitchFamily="49" charset="0"/>
-                <a:ea typeface="FiraCode Nerd Font" panose="020B0809050000020004" pitchFamily="49" charset="0"/>
-              </a:rPr>
-              <a:t>From the right panel, differences between teacher- and examiner-assigned marks also showed interesting patterns.</a:t>
-            </a:r>
-          </a:p>
-          <a:p>
-            <a:pPr eaLnBrk="1" hangingPunct="1"/>
-            <a:r>
-              <a:rPr lang="en-AU" altLang="nb-NO" sz="1200" noProof="0" dirty="0">
-                <a:latin typeface="FiraCode Nerd Font" panose="020B0809050000020004" pitchFamily="49" charset="0"/>
-                <a:ea typeface="FiraCode Nerd Font" panose="020B0809050000020004" pitchFamily="49" charset="0"/>
-              </a:rPr>
-              <a:t>It is first of all noticeable that written exams all had upward-sloping curves, while oral exams had downward-sloping ones.</a:t>
-            </a:r>
-          </a:p>
-          <a:p>
-            <a:pPr eaLnBrk="1" hangingPunct="1"/>
-            <a:r>
-              <a:rPr lang="en-AU" altLang="nb-NO" sz="1200" noProof="0" dirty="0">
-                <a:latin typeface="FiraCode Nerd Font" panose="020B0809050000020004" pitchFamily="49" charset="0"/>
-                <a:ea typeface="FiraCode Nerd Font" panose="020B0809050000020004" pitchFamily="49" charset="0"/>
-              </a:rPr>
-              <a:t>On the surface, this pattern suggests that examiners were stricter than teachers in marking written tests, but more lenient in oral exams.</a:t>
-            </a:r>
-          </a:p>
-          <a:p>
-            <a:pPr eaLnBrk="1" hangingPunct="1"/>
-            <a:r>
-              <a:rPr lang="en-AU" altLang="nb-NO" sz="1200" noProof="0" dirty="0">
-                <a:latin typeface="FiraCode Nerd Font" panose="020B0809050000020004" pitchFamily="49" charset="0"/>
-                <a:ea typeface="FiraCode Nerd Font" panose="020B0809050000020004" pitchFamily="49" charset="0"/>
-              </a:rPr>
-              <a:t>The second strand of the answer to the research question therefore can be:</a:t>
-            </a:r>
-          </a:p>
-          <a:p>
-            <a:pPr eaLnBrk="1" hangingPunct="1"/>
-            <a:r>
-              <a:rPr lang="en-AU" altLang="nb-NO" sz="1200" noProof="0" dirty="0">
-                <a:latin typeface="FiraCode Nerd Font" panose="020B0809050000020004" pitchFamily="49" charset="0"/>
-                <a:ea typeface="FiraCode Nerd Font" panose="020B0809050000020004" pitchFamily="49" charset="0"/>
-              </a:rPr>
-              <a:t>	“Yes, exam grades differ from teacher-assigned grades, depending on the form of examination.”</a:t>
-            </a:r>
-          </a:p>
-          <a:p>
-            <a:pPr eaLnBrk="1" hangingPunct="1"/>
-            <a:r>
-              <a:rPr lang="en-AU" altLang="nb-NO" sz="1200" noProof="0" dirty="0">
-                <a:latin typeface="FiraCode Nerd Font" panose="020B0809050000020004" pitchFamily="49" charset="0"/>
-                <a:ea typeface="FiraCode Nerd Font" panose="020B0809050000020004" pitchFamily="49" charset="0"/>
-              </a:rPr>
-              <a:t>Contrary to the previous observation form the left panel, slopes in the right panel were the steepest on the top end, suggesting larger disagreement between teachers and examiners for awarding grade 5s and 6s while disagreement remained minimum for lower grades.</a:t>
-            </a:r>
           </a:p>
           <a:p>
             <a:pPr eaLnBrk="1" hangingPunct="1"/>
@@ -2972,30 +2957,10 @@
           </a:p>
           <a:p>
             <a:pPr eaLnBrk="1" hangingPunct="1"/>
-            <a:r>
-              <a:rPr lang="en-AU" altLang="nb-NO" sz="1000" noProof="0" dirty="0">
-                <a:latin typeface="FiraCode Nerd Font" panose="020B0809050000020004" pitchFamily="49" charset="0"/>
-                <a:ea typeface="FiraCode Nerd Font" panose="020B0809050000020004" pitchFamily="49" charset="0"/>
-              </a:rPr>
-              <a:t>	This person-centric vs subject-centric interpretations demand vastly different policy responses.</a:t>
-            </a:r>
-          </a:p>
-          <a:p>
-            <a:pPr eaLnBrk="1" hangingPunct="1"/>
             <a:endParaRPr lang="en-AU" altLang="nb-NO" sz="1000" noProof="0" dirty="0">
               <a:latin typeface="FiraCode Nerd Font" panose="020B0809050000020004" pitchFamily="49" charset="0"/>
               <a:ea typeface="FiraCode Nerd Font" panose="020B0809050000020004" pitchFamily="49" charset="0"/>
             </a:endParaRPr>
-          </a:p>
-          <a:p>
-            <a:pPr eaLnBrk="1" hangingPunct="1"/>
-            <a:r>
-              <a:rPr lang="en-AU" altLang="nb-NO" sz="1000" noProof="0" dirty="0">
-                <a:latin typeface="FiraCode Nerd Font" panose="020B0809050000020004" pitchFamily="49" charset="0"/>
-                <a:ea typeface="FiraCode Nerd Font" panose="020B0809050000020004" pitchFamily="49" charset="0"/>
-              </a:rPr>
-              <a:t>These results are also aggregates at geography level, sex level and SES level.</a:t>
-            </a:r>
           </a:p>
           <a:p>
             <a:pPr eaLnBrk="1" hangingPunct="1"/>
@@ -3006,26 +2971,6 @@
               </a:rPr>
               <a:t>It would be fruitful to dissect these results to see whether grade difficulties diverge more severely for, say rural schools, females and the left tails of the SES distribution.</a:t>
             </a:r>
-          </a:p>
-          <a:p>
-            <a:pPr eaLnBrk="1" hangingPunct="1"/>
-            <a:endParaRPr lang="en-AU" altLang="nb-NO" sz="1000" noProof="0" dirty="0">
-              <a:latin typeface="FiraCode Nerd Font" panose="020B0809050000020004" pitchFamily="49" charset="0"/>
-              <a:ea typeface="FiraCode Nerd Font" panose="020B0809050000020004" pitchFamily="49" charset="0"/>
-            </a:endParaRPr>
-          </a:p>
-          <a:p>
-            <a:pPr eaLnBrk="1" hangingPunct="1"/>
-            <a:r>
-              <a:rPr lang="en-AU" altLang="nb-NO" sz="1000" noProof="0" dirty="0">
-                <a:latin typeface="FiraCode Nerd Font" panose="020B0809050000020004" pitchFamily="49" charset="0"/>
-                <a:ea typeface="FiraCode Nerd Font" panose="020B0809050000020004" pitchFamily="49" charset="0"/>
-              </a:rPr>
-              <a:t>Towards the overarching goal of promoting educational fairness, this study may lend itself towards identifying the most vulnerable, who carry the heaviest burden of grade difficulty differentials.</a:t>
-            </a:r>
-          </a:p>
-          <a:p>
-            <a:endParaRPr lang="en-AU" dirty="0"/>
           </a:p>
         </p:txBody>
       </p:sp>
@@ -3300,7 +3245,7 @@
               <a:pPr>
                 <a:defRPr/>
               </a:pPr>
-              <a:t>27.05.2022</a:t>
+              <a:t>29.05.2022</a:t>
             </a:fld>
             <a:endParaRPr lang="nb-NO" altLang="nb-NO"/>
           </a:p>
@@ -3485,7 +3430,7 @@
               <a:pPr>
                 <a:defRPr/>
               </a:pPr>
-              <a:t>27.05.2022</a:t>
+              <a:t>29.05.2022</a:t>
             </a:fld>
             <a:endParaRPr lang="nb-NO" altLang="nb-NO"/>
           </a:p>
@@ -3660,7 +3605,7 @@
               <a:pPr>
                 <a:defRPr/>
               </a:pPr>
-              <a:t>27.05.2022</a:t>
+              <a:t>29.05.2022</a:t>
             </a:fld>
             <a:endParaRPr lang="nb-NO" altLang="nb-NO"/>
           </a:p>
@@ -3857,7 +3802,7 @@
               <a:pPr>
                 <a:defRPr/>
               </a:pPr>
-              <a:t>27.05.2022</a:t>
+              <a:t>29.05.2022</a:t>
             </a:fld>
             <a:endParaRPr lang="nb-NO" altLang="nb-NO"/>
           </a:p>
@@ -4150,7 +4095,7 @@
               <a:pPr>
                 <a:defRPr/>
               </a:pPr>
-              <a:t>27.05.2022</a:t>
+              <a:t>29.05.2022</a:t>
             </a:fld>
             <a:endParaRPr lang="nb-NO" altLang="nb-NO"/>
           </a:p>
@@ -4582,7 +4527,7 @@
               <a:pPr>
                 <a:defRPr/>
               </a:pPr>
-              <a:t>27.05.2022</a:t>
+              <a:t>29.05.2022</a:t>
             </a:fld>
             <a:endParaRPr lang="nb-NO" altLang="nb-NO"/>
           </a:p>
@@ -4705,7 +4650,7 @@
               <a:pPr>
                 <a:defRPr/>
               </a:pPr>
-              <a:t>27.05.2022</a:t>
+              <a:t>29.05.2022</a:t>
             </a:fld>
             <a:endParaRPr lang="nb-NO" altLang="nb-NO"/>
           </a:p>
@@ -4805,7 +4750,7 @@
               <a:pPr>
                 <a:defRPr/>
               </a:pPr>
-              <a:t>27.05.2022</a:t>
+              <a:t>29.05.2022</a:t>
             </a:fld>
             <a:endParaRPr lang="nb-NO" altLang="nb-NO"/>
           </a:p>
@@ -5087,7 +5032,7 @@
               <a:pPr>
                 <a:defRPr/>
               </a:pPr>
-              <a:t>27.05.2022</a:t>
+              <a:t>29.05.2022</a:t>
             </a:fld>
             <a:endParaRPr lang="nb-NO" altLang="nb-NO"/>
           </a:p>
@@ -5350,7 +5295,7 @@
               <a:pPr>
                 <a:defRPr/>
               </a:pPr>
-              <a:t>27.05.2022</a:t>
+              <a:t>29.05.2022</a:t>
             </a:fld>
             <a:endParaRPr lang="nb-NO" altLang="nb-NO"/>
           </a:p>
@@ -5623,7 +5568,7 @@
               <a:pPr>
                 <a:defRPr/>
               </a:pPr>
-              <a:t>27.05.2022</a:t>
+              <a:t>29.05.2022</a:t>
             </a:fld>
             <a:endParaRPr lang="nb-NO" altLang="nb-NO"/>
           </a:p>
@@ -6588,34 +6533,34 @@
                 </a:r>
                 <a:r>
                   <a:rPr lang="en-AU" dirty="0"/>
-                  <a:t>): Norwegian, English, others</a:t>
+                  <a:t>): </a:t>
+                </a:r>
+                <a:r>
+                  <a:rPr lang="en-AU" dirty="0">
+                    <a:solidFill>
+                      <a:schemeClr val="bg1">
+                        <a:lumMod val="65000"/>
+                      </a:schemeClr>
+                    </a:solidFill>
+                  </a:rPr>
+                  <a:t>Mathematics,</a:t>
+                </a:r>
+                <a:r>
+                  <a:rPr lang="en-AU" dirty="0"/>
+                  <a:t> Norwegian, English</a:t>
+                </a:r>
+                <a:r>
+                  <a:rPr lang="en-AU" dirty="0">
+                    <a:solidFill>
+                      <a:schemeClr val="bg1">
+                        <a:lumMod val="65000"/>
+                      </a:schemeClr>
+                    </a:solidFill>
+                  </a:rPr>
+                  <a:t>, and others</a:t>
                 </a:r>
               </a:p>
               <a:p>
-                <a:r>
-                  <a:rPr lang="en-AU" dirty="0"/>
-                  <a:t>Sampling procedure</a:t>
-                </a:r>
-              </a:p>
-              <a:p>
-                <a:pPr lvl="1"/>
-                <a:r>
-                  <a:rPr lang="en-AU" dirty="0"/>
-                  <a:t>Everyone: STP (100% sampling)</a:t>
-                </a:r>
-              </a:p>
-              <a:p>
-                <a:pPr lvl="1"/>
-                <a:r>
-                  <a:rPr lang="en-AU" dirty="0"/>
-                  <a:t>Cohort divided equally: Mathematics, Norwegian, English (33%)</a:t>
-                </a:r>
-              </a:p>
-              <a:p>
-                <a:r>
-                  <a:rPr lang="en-AU" dirty="0"/>
-                  <a:t>Formula: </a:t>
-                </a:r>
                 <a14:m>
                   <m:oMath xmlns:m="http://schemas.openxmlformats.org/officeDocument/2006/math">
                     <m:r>
@@ -6771,7 +6716,7 @@
               <a:blipFill>
                 <a:blip r:embed="rId3"/>
                 <a:stretch>
-                  <a:fillRect l="-1154" t="-1246" b="-9075"/>
+                  <a:fillRect l="-1154" t="-1246"/>
                 </a:stretch>
               </a:blipFill>
             </p:spPr>
@@ -6841,116 +6786,258 @@
         </p:blipFill>
         <p:spPr>
           <a:xfrm>
-            <a:off x="5580112" y="2497460"/>
-            <a:ext cx="3059832" cy="3059832"/>
+            <a:off x="5535488" y="2281436"/>
+            <a:ext cx="3429000" cy="3429000"/>
           </a:xfrm>
           <a:prstGeom prst="rect">
             <a:avLst/>
           </a:prstGeom>
         </p:spPr>
       </p:pic>
-      <p:sp>
-        <p:nvSpPr>
-          <p:cNvPr id="4" name="Content Placeholder 3">
-            <a:extLst>
-              <a:ext uri="{FF2B5EF4-FFF2-40B4-BE49-F238E27FC236}">
-                <a16:creationId xmlns:a16="http://schemas.microsoft.com/office/drawing/2014/main" id="{A506D670-7C6B-9A17-BC7B-55F1A6C2190C}"/>
-              </a:ext>
-            </a:extLst>
-          </p:cNvPr>
-          <p:cNvSpPr>
-            <a:spLocks noGrp="1"/>
-          </p:cNvSpPr>
-          <p:nvPr>
-            <p:ph idx="1"/>
-          </p:nvPr>
-        </p:nvSpPr>
-        <p:spPr/>
-        <p:txBody>
-          <a:bodyPr/>
-          <a:lstStyle/>
-          <a:p>
-            <a:r>
-              <a:rPr lang="en-AU" dirty="0"/>
-              <a:t>Sample</a:t>
-            </a:r>
-          </a:p>
-          <a:p>
-            <a:pPr lvl="1"/>
-            <a:r>
-              <a:rPr lang="en-AU" dirty="0"/>
-              <a:t>Norwegian register: entire Year 10 population</a:t>
-            </a:r>
-          </a:p>
-          <a:p>
-            <a:pPr lvl="1"/>
-            <a:r>
-              <a:rPr lang="en-AU" dirty="0"/>
-              <a:t>Graduation year 2019</a:t>
-            </a:r>
-          </a:p>
-          <a:p>
-            <a:pPr lvl="1"/>
-            <a:r>
-              <a:rPr lang="en-AU" dirty="0"/>
-              <a:t>Retain if valid GPA (N = 60,618)</a:t>
-            </a:r>
-          </a:p>
-          <a:p>
-            <a:pPr lvl="1"/>
-            <a:r>
-              <a:rPr lang="en-AU" dirty="0"/>
-              <a:t>Exclude “</a:t>
-            </a:r>
-            <a:r>
-              <a:rPr lang="en-AU" dirty="0" err="1"/>
-              <a:t>Sidem</a:t>
-            </a:r>
-            <a:r>
-              <a:rPr lang="nb-NO" dirty="0"/>
-              <a:t>ål</a:t>
-            </a:r>
-            <a:r>
-              <a:rPr lang="en-AU" dirty="0"/>
-              <a:t>”</a:t>
-            </a:r>
-          </a:p>
-          <a:p>
-            <a:pPr lvl="2"/>
-            <a:r>
-              <a:rPr lang="en-AU" dirty="0"/>
-              <a:t>STP = 12, SKR = 3, MUN = 2</a:t>
-            </a:r>
-          </a:p>
-          <a:p>
-            <a:r>
-              <a:rPr lang="en-AU" dirty="0"/>
-              <a:t>Model: Partial credit model (PCM)</a:t>
-            </a:r>
-          </a:p>
-          <a:p>
-            <a:pPr lvl="1"/>
-            <a:r>
-              <a:rPr lang="en-AU" dirty="0"/>
-              <a:t>“Difficulty parameter (b)”:</a:t>
-            </a:r>
-          </a:p>
-          <a:p>
-            <a:pPr lvl="2"/>
-            <a:r>
-              <a:rPr lang="en-AU" dirty="0"/>
-              <a:t>where the curves cross</a:t>
-            </a:r>
-          </a:p>
-          <a:p>
-            <a:pPr lvl="2"/>
-            <a:r>
-              <a:rPr lang="en-AU" dirty="0"/>
-              <a:t>switching points to the next grade</a:t>
-            </a:r>
-          </a:p>
-        </p:txBody>
-      </p:sp>
+      <mc:AlternateContent xmlns:mc="http://schemas.openxmlformats.org/markup-compatibility/2006">
+        <mc:Choice xmlns:a14="http://schemas.microsoft.com/office/drawing/2010/main" Requires="a14">
+          <p:sp>
+            <p:nvSpPr>
+              <p:cNvPr id="4" name="Content Placeholder 3">
+                <a:extLst>
+                  <a:ext uri="{FF2B5EF4-FFF2-40B4-BE49-F238E27FC236}">
+                    <a16:creationId xmlns:a16="http://schemas.microsoft.com/office/drawing/2014/main" id="{A506D670-7C6B-9A17-BC7B-55F1A6C2190C}"/>
+                  </a:ext>
+                </a:extLst>
+              </p:cNvPr>
+              <p:cNvSpPr>
+                <a:spLocks noGrp="1"/>
+              </p:cNvSpPr>
+              <p:nvPr>
+                <p:ph idx="1"/>
+              </p:nvPr>
+            </p:nvSpPr>
+            <p:spPr/>
+            <p:txBody>
+              <a:bodyPr/>
+              <a:lstStyle/>
+              <a:p>
+                <a:r>
+                  <a:rPr lang="en-AU" dirty="0"/>
+                  <a:t>Population</a:t>
+                </a:r>
+              </a:p>
+              <a:p>
+                <a:pPr lvl="1"/>
+                <a:r>
+                  <a:rPr lang="en-AU" dirty="0"/>
+                  <a:t>Norwegian register: Entire Year 10 cohort</a:t>
+                </a:r>
+              </a:p>
+              <a:p>
+                <a:pPr lvl="1"/>
+                <a:r>
+                  <a:rPr lang="en-AU" dirty="0"/>
+                  <a:t>Graduation 2019</a:t>
+                </a:r>
+              </a:p>
+              <a:p>
+                <a:r>
+                  <a:rPr lang="en-AU" dirty="0"/>
+                  <a:t>Inclusion/Exclusion</a:t>
+                </a:r>
+              </a:p>
+              <a:p>
+                <a:pPr lvl="1"/>
+                <a:r>
+                  <a:rPr lang="en-AU" dirty="0"/>
+                  <a:t>Retain if valid GPA (</a:t>
+                </a:r>
+                <a14:m>
+                  <m:oMath xmlns:m="http://schemas.openxmlformats.org/officeDocument/2006/math">
+                    <m:r>
+                      <a:rPr lang="en-AU" b="0" i="1" smtClean="0">
+                        <a:latin typeface="Cambria Math" panose="02040503050406030204" pitchFamily="18" charset="0"/>
+                        <a:ea typeface="Cambria Math" panose="02040503050406030204" pitchFamily="18" charset="0"/>
+                      </a:rPr>
+                      <m:t>𝑁</m:t>
+                    </m:r>
+                    <m:r>
+                      <a:rPr lang="en-AU" b="0" i="1" smtClean="0">
+                        <a:latin typeface="Cambria Math" panose="02040503050406030204" pitchFamily="18" charset="0"/>
+                        <a:ea typeface="Cambria Math" panose="02040503050406030204" pitchFamily="18" charset="0"/>
+                      </a:rPr>
+                      <m:t>=60,618</m:t>
+                    </m:r>
+                  </m:oMath>
+                </a14:m>
+                <a:r>
+                  <a:rPr lang="en-AU" dirty="0"/>
+                  <a:t>)</a:t>
+                </a:r>
+              </a:p>
+              <a:p>
+                <a:pPr lvl="1"/>
+                <a:r>
+                  <a:rPr lang="en-AU" dirty="0"/>
+                  <a:t>Exclude “</a:t>
+                </a:r>
+                <a:r>
+                  <a:rPr lang="nb-NO" dirty="0"/>
+                  <a:t>Sidemål</a:t>
+                </a:r>
+                <a:r>
+                  <a:rPr lang="en-AU" dirty="0"/>
+                  <a:t>”:</a:t>
+                </a:r>
+              </a:p>
+              <a:p>
+                <a:pPr lvl="2"/>
+                <a:r>
+                  <a:rPr lang="en-AU" i="1" dirty="0"/>
+                  <a:t>STP</a:t>
+                </a:r>
+                <a:r>
+                  <a:rPr lang="en-AU" dirty="0"/>
+                  <a:t> = 12, </a:t>
+                </a:r>
+                <a:r>
+                  <a:rPr lang="en-AU" i="1" dirty="0"/>
+                  <a:t>SKR</a:t>
+                </a:r>
+                <a:r>
+                  <a:rPr lang="en-AU" dirty="0"/>
+                  <a:t> = 3, </a:t>
+                </a:r>
+                <a:r>
+                  <a:rPr lang="en-AU" i="1" dirty="0"/>
+                  <a:t>MUN</a:t>
+                </a:r>
+                <a:r>
+                  <a:rPr lang="en-AU" dirty="0"/>
+                  <a:t> = 2</a:t>
+                </a:r>
+              </a:p>
+              <a:p>
+                <a:r>
+                  <a:rPr lang="en-AU" dirty="0"/>
+                  <a:t>Partial Credit Model (PCM)</a:t>
+                </a:r>
+              </a:p>
+              <a:p>
+                <a:pPr lvl="1"/>
+                <a:r>
+                  <a:rPr lang="en-AU" dirty="0"/>
+                  <a:t>Difficulty parameter (</a:t>
+                </a:r>
+                <a14:m>
+                  <m:oMath xmlns:m="http://schemas.openxmlformats.org/officeDocument/2006/math">
+                    <m:sSub>
+                      <m:sSubPr>
+                        <m:ctrlPr>
+                          <a:rPr lang="en-AU" i="1" smtClean="0">
+                            <a:latin typeface="Cambria Math" panose="02040503050406030204" pitchFamily="18" charset="0"/>
+                            <a:ea typeface="Cambria Math" panose="02040503050406030204" pitchFamily="18" charset="0"/>
+                          </a:rPr>
+                        </m:ctrlPr>
+                      </m:sSubPr>
+                      <m:e>
+                        <m:r>
+                          <a:rPr lang="en-AU" b="0" i="1" smtClean="0">
+                            <a:latin typeface="Cambria Math" panose="02040503050406030204" pitchFamily="18" charset="0"/>
+                            <a:ea typeface="Cambria Math" panose="02040503050406030204" pitchFamily="18" charset="0"/>
+                          </a:rPr>
+                          <m:t>𝑏</m:t>
+                        </m:r>
+                      </m:e>
+                      <m:sub>
+                        <m:r>
+                          <a:rPr lang="en-AU" b="0" i="1" smtClean="0">
+                            <a:latin typeface="Cambria Math" panose="02040503050406030204" pitchFamily="18" charset="0"/>
+                            <a:ea typeface="Cambria Math" panose="02040503050406030204" pitchFamily="18" charset="0"/>
+                          </a:rPr>
+                          <m:t>1</m:t>
+                        </m:r>
+                      </m:sub>
+                    </m:sSub>
+                  </m:oMath>
+                </a14:m>
+                <a:r>
+                  <a:rPr lang="en-AU" dirty="0"/>
+                  <a:t> to </a:t>
+                </a:r>
+                <a14:m>
+                  <m:oMath xmlns:m="http://schemas.openxmlformats.org/officeDocument/2006/math">
+                    <m:sSub>
+                      <m:sSubPr>
+                        <m:ctrlPr>
+                          <a:rPr lang="en-AU" i="1">
+                            <a:latin typeface="Cambria Math" panose="02040503050406030204" pitchFamily="18" charset="0"/>
+                          </a:rPr>
+                        </m:ctrlPr>
+                      </m:sSubPr>
+                      <m:e>
+                        <m:r>
+                          <a:rPr lang="en-AU" i="1">
+                            <a:latin typeface="Cambria Math" panose="02040503050406030204" pitchFamily="18" charset="0"/>
+                          </a:rPr>
+                          <m:t>𝑏</m:t>
+                        </m:r>
+                      </m:e>
+                      <m:sub>
+                        <m:r>
+                          <a:rPr lang="en-AU" b="0" i="1" smtClean="0">
+                            <a:latin typeface="Cambria Math" panose="02040503050406030204" pitchFamily="18" charset="0"/>
+                          </a:rPr>
+                          <m:t>5</m:t>
+                        </m:r>
+                      </m:sub>
+                    </m:sSub>
+                  </m:oMath>
+                </a14:m>
+                <a:r>
+                  <a:rPr lang="en-AU" dirty="0"/>
+                  <a:t>)</a:t>
+                </a:r>
+              </a:p>
+            </p:txBody>
+          </p:sp>
+        </mc:Choice>
+        <mc:Fallback>
+          <p:sp>
+            <p:nvSpPr>
+              <p:cNvPr id="4" name="Content Placeholder 3">
+                <a:extLst>
+                  <a:ext uri="{FF2B5EF4-FFF2-40B4-BE49-F238E27FC236}">
+                    <a16:creationId xmlns:a16="http://schemas.microsoft.com/office/drawing/2014/main" id="{A506D670-7C6B-9A17-BC7B-55F1A6C2190C}"/>
+                  </a:ext>
+                </a:extLst>
+              </p:cNvPr>
+              <p:cNvSpPr>
+                <a:spLocks noGrp="1" noRot="1" noChangeAspect="1" noMove="1" noResize="1" noEditPoints="1" noAdjustHandles="1" noChangeArrowheads="1" noChangeShapeType="1" noTextEdit="1"/>
+              </p:cNvSpPr>
+              <p:nvPr>
+                <p:ph idx="1"/>
+              </p:nvPr>
+            </p:nvSpPr>
+            <p:spPr>
+              <a:blipFill>
+                <a:blip r:embed="rId4"/>
+                <a:stretch>
+                  <a:fillRect l="-1154" t="-1246"/>
+                </a:stretch>
+              </a:blipFill>
+            </p:spPr>
+            <p:txBody>
+              <a:bodyPr/>
+              <a:lstStyle/>
+              <a:p>
+                <a:r>
+                  <a:rPr lang="en-AU">
+                    <a:noFill/>
+                  </a:rPr>
+                  <a:t> </a:t>
+                </a:r>
+              </a:p>
+            </p:txBody>
+          </p:sp>
+        </mc:Fallback>
+      </mc:AlternateContent>
       <p:sp>
         <p:nvSpPr>
           <p:cNvPr id="5" name="Title 4">
@@ -7009,59 +7096,6 @@
           <a:chExt cx="0" cy="0"/>
         </a:xfrm>
       </p:grpSpPr>
-      <p:sp>
-        <p:nvSpPr>
-          <p:cNvPr id="13" name="Title 12">
-            <a:extLst>
-              <a:ext uri="{FF2B5EF4-FFF2-40B4-BE49-F238E27FC236}">
-                <a16:creationId xmlns:a16="http://schemas.microsoft.com/office/drawing/2014/main" id="{596C72A5-373E-A8B2-7C0E-BCE742994136}"/>
-              </a:ext>
-            </a:extLst>
-          </p:cNvPr>
-          <p:cNvSpPr>
-            <a:spLocks noGrp="1"/>
-          </p:cNvSpPr>
-          <p:nvPr>
-            <p:ph type="title"/>
-          </p:nvPr>
-        </p:nvSpPr>
-        <p:spPr/>
-        <p:txBody>
-          <a:bodyPr/>
-          <a:lstStyle/>
-          <a:p>
-            <a:r>
-              <a:rPr lang="en-AU" dirty="0"/>
-              <a:t>Preliminary Results: Teacher-assigned Grades</a:t>
-            </a:r>
-          </a:p>
-        </p:txBody>
-      </p:sp>
-      <p:sp>
-        <p:nvSpPr>
-          <p:cNvPr id="14" name="Content Placeholder 13">
-            <a:extLst>
-              <a:ext uri="{FF2B5EF4-FFF2-40B4-BE49-F238E27FC236}">
-                <a16:creationId xmlns:a16="http://schemas.microsoft.com/office/drawing/2014/main" id="{AFD6D16A-4E57-A938-0084-A783EA8DCFFE}"/>
-              </a:ext>
-            </a:extLst>
-          </p:cNvPr>
-          <p:cNvSpPr>
-            <a:spLocks noGrp="1"/>
-          </p:cNvSpPr>
-          <p:nvPr>
-            <p:ph sz="half" idx="1"/>
-          </p:nvPr>
-        </p:nvSpPr>
-        <p:spPr/>
-        <p:txBody>
-          <a:bodyPr/>
-          <a:lstStyle/>
-          <a:p>
-            <a:endParaRPr lang="en-AU"/>
-          </a:p>
-        </p:txBody>
-      </p:sp>
       <p:pic>
         <p:nvPicPr>
           <p:cNvPr id="6" name="Content Placeholder 5">
@@ -7080,17 +7114,136 @@
         </p:nvPicPr>
         <p:blipFill>
           <a:blip r:embed="rId3"/>
-          <a:stretch>
-            <a:fillRect/>
-          </a:stretch>
+          <a:srcRect/>
+          <a:stretch/>
         </p:blipFill>
         <p:spPr>
           <a:xfrm>
-            <a:off x="5501089" y="1651000"/>
-            <a:ext cx="2599522" cy="3429000"/>
+            <a:off x="4572001" y="1345877"/>
+            <a:ext cx="4248472" cy="4248472"/>
           </a:xfrm>
         </p:spPr>
       </p:pic>
+      <p:sp>
+        <p:nvSpPr>
+          <p:cNvPr id="13" name="Title 12">
+            <a:extLst>
+              <a:ext uri="{FF2B5EF4-FFF2-40B4-BE49-F238E27FC236}">
+                <a16:creationId xmlns:a16="http://schemas.microsoft.com/office/drawing/2014/main" id="{596C72A5-373E-A8B2-7C0E-BCE742994136}"/>
+              </a:ext>
+            </a:extLst>
+          </p:cNvPr>
+          <p:cNvSpPr>
+            <a:spLocks noGrp="1"/>
+          </p:cNvSpPr>
+          <p:nvPr>
+            <p:ph type="title"/>
+          </p:nvPr>
+        </p:nvSpPr>
+        <p:spPr/>
+        <p:txBody>
+          <a:bodyPr/>
+          <a:lstStyle/>
+          <a:p>
+            <a:r>
+              <a:rPr lang="en-AU" dirty="0"/>
+              <a:t>Preliminary Results 1</a:t>
+            </a:r>
+          </a:p>
+        </p:txBody>
+      </p:sp>
+      <p:sp>
+        <p:nvSpPr>
+          <p:cNvPr id="14" name="Content Placeholder 13">
+            <a:extLst>
+              <a:ext uri="{FF2B5EF4-FFF2-40B4-BE49-F238E27FC236}">
+                <a16:creationId xmlns:a16="http://schemas.microsoft.com/office/drawing/2014/main" id="{AFD6D16A-4E57-A938-0084-A783EA8DCFFE}"/>
+              </a:ext>
+            </a:extLst>
+          </p:cNvPr>
+          <p:cNvSpPr>
+            <a:spLocks noGrp="1"/>
+          </p:cNvSpPr>
+          <p:nvPr>
+            <p:ph sz="half" idx="1"/>
+          </p:nvPr>
+        </p:nvSpPr>
+        <p:spPr/>
+        <p:txBody>
+          <a:bodyPr/>
+          <a:lstStyle/>
+          <a:p>
+            <a:r>
+              <a:rPr lang="en-AU" dirty="0"/>
+              <a:t>Visual Patten</a:t>
+            </a:r>
+          </a:p>
+          <a:p>
+            <a:pPr lvl="1"/>
+            <a:r>
+              <a:rPr lang="en-AU" dirty="0"/>
+              <a:t>Top grade: relatively flat</a:t>
+            </a:r>
+            <a:r>
+              <a:rPr lang="en-AU" dirty="0">
+                <a:solidFill>
+                  <a:schemeClr val="bg1">
+                    <a:lumMod val="65000"/>
+                  </a:schemeClr>
+                </a:solidFill>
+              </a:rPr>
+              <a:t>*</a:t>
+            </a:r>
+          </a:p>
+          <a:p>
+            <a:pPr lvl="1"/>
+            <a:r>
+              <a:rPr lang="en-AU" dirty="0"/>
+              <a:t>Lower grades: increasingly downward-sloping</a:t>
+            </a:r>
+          </a:p>
+          <a:p>
+            <a:r>
+              <a:rPr lang="en-AU" dirty="0"/>
+              <a:t>“Fanning out”</a:t>
+            </a:r>
+          </a:p>
+          <a:p>
+            <a:r>
+              <a:rPr lang="en-AU" dirty="0"/>
+              <a:t>Easiest vs Hardest</a:t>
+            </a:r>
+          </a:p>
+          <a:p>
+            <a:pPr lvl="1"/>
+            <a:r>
+              <a:rPr lang="en-AU" dirty="0"/>
+              <a:t>Differ by 1 grade lower end</a:t>
+            </a:r>
+          </a:p>
+          <a:p>
+            <a:pPr marL="363538" lvl="1" indent="0">
+              <a:buNone/>
+            </a:pPr>
+            <a:endParaRPr lang="en-AU" sz="2200" dirty="0"/>
+          </a:p>
+          <a:p>
+            <a:pPr marL="176213" indent="-176213">
+              <a:buNone/>
+            </a:pPr>
+            <a:r>
+              <a:rPr lang="en-AU" sz="1900" dirty="0">
+                <a:solidFill>
+                  <a:schemeClr val="bg1">
+                    <a:lumMod val="65000"/>
+                  </a:schemeClr>
+                </a:solidFill>
+              </a:rPr>
+              <a:t>* Written Norwegian noticeably harder at top ends</a:t>
+            </a:r>
+          </a:p>
+        </p:txBody>
+      </p:sp>
     </p:spTree>
     <p:extLst>
       <p:ext uri="{BB962C8B-B14F-4D97-AF65-F5344CB8AC3E}">
@@ -7144,7 +7297,7 @@
           <a:p>
             <a:r>
               <a:rPr lang="en-AU" dirty="0"/>
-              <a:t>Preliminary Results: Exam Grades</a:t>
+              <a:t>Preliminary Results 2</a:t>
             </a:r>
           </a:p>
         </p:txBody>
@@ -7167,14 +7320,13 @@
         </p:nvPicPr>
         <p:blipFill>
           <a:blip r:embed="rId3"/>
-          <a:stretch>
-            <a:fillRect/>
-          </a:stretch>
+          <a:srcRect/>
+          <a:stretch/>
         </p:blipFill>
         <p:spPr>
           <a:xfrm>
-            <a:off x="5323344" y="1651000"/>
-            <a:ext cx="2955012" cy="3429000"/>
+            <a:off x="4572000" y="1345332"/>
+            <a:ext cx="4258385" cy="4258385"/>
           </a:xfrm>
         </p:spPr>
       </p:pic>
@@ -7199,7 +7351,63 @@
           <a:bodyPr/>
           <a:lstStyle/>
           <a:p>
-            <a:endParaRPr lang="en-AU"/>
+            <a:r>
+              <a:rPr lang="en-AU" dirty="0"/>
+              <a:t>Inclusion</a:t>
+            </a:r>
+          </a:p>
+          <a:p>
+            <a:pPr lvl="1"/>
+            <a:r>
+              <a:rPr lang="en-AU" dirty="0"/>
+              <a:t>Written: MATH, ENG, NOR</a:t>
+            </a:r>
+          </a:p>
+          <a:p>
+            <a:pPr lvl="1"/>
+            <a:r>
+              <a:rPr lang="en-AU" dirty="0"/>
+              <a:t>Oral: ENG, NOR</a:t>
+            </a:r>
+          </a:p>
+          <a:p>
+            <a:r>
+              <a:rPr lang="en-AU" dirty="0"/>
+              <a:t>Visual pattern</a:t>
+            </a:r>
+          </a:p>
+          <a:p>
+            <a:pPr lvl="1"/>
+            <a:r>
+              <a:rPr lang="en-AU" dirty="0"/>
+              <a:t>Written: upward-sloping</a:t>
+            </a:r>
+          </a:p>
+          <a:p>
+            <a:pPr lvl="1"/>
+            <a:r>
+              <a:rPr lang="en-AU" dirty="0"/>
+              <a:t>Oral: downward-sloping</a:t>
+            </a:r>
+          </a:p>
+          <a:p>
+            <a:r>
+              <a:rPr lang="en-AU" dirty="0"/>
+              <a:t>Strict vs lenient</a:t>
+            </a:r>
+          </a:p>
+          <a:p>
+            <a:r>
+              <a:rPr lang="en-AU" dirty="0"/>
+              <a:t>Written Norwegian</a:t>
+            </a:r>
+          </a:p>
+          <a:p>
+            <a:pPr lvl="1"/>
+            <a:r>
+              <a:rPr lang="en-AU" dirty="0"/>
+              <a:t>Largest teacher-examiner disagreement</a:t>
+            </a:r>
           </a:p>
         </p:txBody>
       </p:sp>
@@ -7346,9 +7554,6 @@
               <a:rPr lang="en-GB" dirty="0"/>
               <a:t>“Who carry the heaviest burden of grade difficulty differentials?”</a:t>
             </a:r>
-          </a:p>
-          <a:p>
-            <a:endParaRPr lang="en-AU" dirty="0"/>
           </a:p>
         </p:txBody>
       </p:sp>

</xml_diff>

<commit_message>
Clear all commit backlog before going to Iceland
</commit_message>
<xml_diff>
--- a/Teaching/NERA_2022/Tony.pptx
+++ b/Teaching/NERA_2022/Tony.pptx
@@ -294,7 +294,7 @@
               <a:pPr>
                 <a:defRPr/>
               </a:pPr>
-              <a:t>29.05.2022</a:t>
+              <a:t>30.05.2022</a:t>
             </a:fld>
             <a:endParaRPr lang="nb-NO" altLang="nb-NO"/>
           </a:p>
@@ -934,7 +934,7 @@
                 <a:latin typeface="FiraCode Nerd Font" panose="020B0809050000020004" pitchFamily="49" charset="0"/>
                 <a:ea typeface="FiraCode Nerd Font" panose="020B0809050000020004" pitchFamily="49" charset="0"/>
               </a:rPr>
-              <a:t>I wish to contribute to today’s session with some preliminary results from my first PhD project that asks whether GPA subjects differ in their difficulties.</a:t>
+              <a:t>I wish to contribute to today’s session with some preliminary results from my first PhD project that asks “whether GPA subjects differ in their difficulties”.</a:t>
             </a:r>
           </a:p>
         </p:txBody>
@@ -1031,7 +1031,7 @@
                 <a:latin typeface="FiraCode Nerd Font" panose="020B0809050000020004" pitchFamily="49" charset="0"/>
                 <a:ea typeface="FiraCode Nerd Font" panose="020B0809050000020004" pitchFamily="49" charset="0"/>
               </a:rPr>
-              <a:t>This question is important because assessment practices have significant impact on students’ lives, particularly when learners approach the end of their </a:t>
+              <a:t>This research question is important because assessment practices have significant impact on students’ lives, particularly when learners approach the end of their </a:t>
             </a:r>
             <a:r>
               <a:rPr lang="en-AU" altLang="nb-NO" sz="1000" noProof="0" dirty="0" err="1">
@@ -1076,7 +1076,7 @@
                 <a:latin typeface="FiraCode Nerd Font" panose="020B0809050000020004" pitchFamily="49" charset="0"/>
                 <a:ea typeface="FiraCode Nerd Font" panose="020B0809050000020004" pitchFamily="49" charset="0"/>
               </a:rPr>
-              <a:t>, a Norwegian term equivalent to grade point averages (GPA) in English.</a:t>
+              <a:t>, or, grade point averages (GPA) in English.</a:t>
             </a:r>
           </a:p>
           <a:p>
@@ -1099,11 +1099,32 @@
           <a:p>
             <a:pPr eaLnBrk="1" hangingPunct="1"/>
             <a:r>
+              <a:rPr lang="en-AU" altLang="nb-NO" sz="1000" noProof="0">
+                <a:latin typeface="FiraCode Nerd Font" panose="020B0809050000020004" pitchFamily="49" charset="0"/>
+                <a:ea typeface="FiraCode Nerd Font" panose="020B0809050000020004" pitchFamily="49" charset="0"/>
+              </a:rPr>
+              <a:t>Understanding whether, and how, </a:t>
+            </a:r>
+            <a:r>
               <a:rPr lang="en-AU" altLang="nb-NO" sz="1000" noProof="0" dirty="0">
                 <a:latin typeface="FiraCode Nerd Font" panose="020B0809050000020004" pitchFamily="49" charset="0"/>
                 <a:ea typeface="FiraCode Nerd Font" panose="020B0809050000020004" pitchFamily="49" charset="0"/>
               </a:rPr>
-              <a:t>Understanding whether and how subject difficulties vary by student background or across different settings is important for both fairness and validity purposes.</a:t>
+              <a:t>subject </a:t>
+            </a:r>
+            <a:r>
+              <a:rPr lang="en-AU" altLang="nb-NO" sz="1000" noProof="0">
+                <a:latin typeface="FiraCode Nerd Font" panose="020B0809050000020004" pitchFamily="49" charset="0"/>
+                <a:ea typeface="FiraCode Nerd Font" panose="020B0809050000020004" pitchFamily="49" charset="0"/>
+              </a:rPr>
+              <a:t>difficulties vary, </a:t>
+            </a:r>
+            <a:r>
+              <a:rPr lang="en-AU" altLang="nb-NO" sz="1000" noProof="0" dirty="0">
+                <a:latin typeface="FiraCode Nerd Font" panose="020B0809050000020004" pitchFamily="49" charset="0"/>
+                <a:ea typeface="FiraCode Nerd Font" panose="020B0809050000020004" pitchFamily="49" charset="0"/>
+              </a:rPr>
+              <a:t>by student background, or across different settings, is important for both fairness and validity purposes.</a:t>
             </a:r>
           </a:p>
           <a:p>
@@ -1154,7 +1175,7 @@
                 <a:latin typeface="FiraCode Nerd Font" panose="020B0809050000020004" pitchFamily="49" charset="0"/>
                 <a:ea typeface="FiraCode Nerd Font" panose="020B0809050000020004" pitchFamily="49" charset="0"/>
               </a:rPr>
-              <a:t>This study therefore wishes to contribute to the academic and policy debates by examining the inter-subject difficulties in Norway’s GPA computation.</a:t>
+              <a:t>This study therefore wishes to contribute to the academic and policy debates by examining the inter-subject difficulties in Norway’s GPA subjects.</a:t>
             </a:r>
           </a:p>
           <a:p>
@@ -1278,7 +1299,7 @@
                 <a:latin typeface="FiraCode Nerd Font" panose="020B0809050000020004" pitchFamily="49" charset="0"/>
                 <a:ea typeface="FiraCode Nerd Font" panose="020B0809050000020004" pitchFamily="49" charset="0"/>
               </a:rPr>
-              <a:t>Both teacher-assigned and exam grades are integers between 1 and 6, with 6 being the top grade.</a:t>
+              <a:t>Each subject ranges between 1 and 6, with 6 being the top grade.</a:t>
             </a:r>
           </a:p>
           <a:p>
@@ -1325,7 +1346,21 @@
                 <a:latin typeface="FiraCode Nerd Font" panose="020B0809050000020004" pitchFamily="49" charset="0"/>
                 <a:ea typeface="FiraCode Nerd Font" panose="020B0809050000020004" pitchFamily="49" charset="0"/>
               </a:rPr>
-              <a:t>	the oral form covers the same subjects as written, as well as other subjects.</a:t>
+              <a:t>	the oral form covers the same subjects as the </a:t>
+            </a:r>
+            <a:r>
+              <a:rPr lang="en-AU" altLang="nb-NO" sz="1000" noProof="0" dirty="0" err="1">
+                <a:latin typeface="FiraCode Nerd Font" panose="020B0809050000020004" pitchFamily="49" charset="0"/>
+                <a:ea typeface="FiraCode Nerd Font" panose="020B0809050000020004" pitchFamily="49" charset="0"/>
+              </a:rPr>
+              <a:t>writtens</a:t>
+            </a:r>
+            <a:r>
+              <a:rPr lang="en-AU" altLang="nb-NO" sz="1000" noProof="0" dirty="0">
+                <a:latin typeface="FiraCode Nerd Font" panose="020B0809050000020004" pitchFamily="49" charset="0"/>
+                <a:ea typeface="FiraCode Nerd Font" panose="020B0809050000020004" pitchFamily="49" charset="0"/>
+              </a:rPr>
+              <a:t>, as well as other subjects.</a:t>
             </a:r>
           </a:p>
           <a:p>
@@ -1359,7 +1394,7 @@
                 <a:latin typeface="FiraCode Nerd Font" panose="020B0809050000020004" pitchFamily="49" charset="0"/>
                 <a:ea typeface="FiraCode Nerd Font" panose="020B0809050000020004" pitchFamily="49" charset="0"/>
               </a:rPr>
-              <a:t>Although 2/3 of the written exam grades are missing for each exam subject, this can be safely modelled under the missing completely at random (MCAR) assumptions due to random assignment. This is a particularly attractive feature of Rasch models</a:t>
+              <a:t>Although 2/3 of the written exam grades are missing for each subject, this can be safely modelled under the missing completely at random (MCAR) assumptions due to random assignment. This is a particularly attractive feature of Rasch models.</a:t>
             </a:r>
           </a:p>
           <a:p>
@@ -1376,7 +1411,7 @@
                 <a:latin typeface="FiraCode Nerd Font" panose="020B0809050000020004" pitchFamily="49" charset="0"/>
                 <a:ea typeface="FiraCode Nerd Font" panose="020B0809050000020004" pitchFamily="49" charset="0"/>
               </a:rPr>
-              <a:t>GPA is then computed as the unweighted sum divided by the number of subjects (</a:t>
+              <a:t>GPA is then computed as the unweighted sum, divided by the number of subjects (</a:t>
             </a:r>
             <a:r>
               <a:rPr lang="en-AU" altLang="nb-NO" sz="1000" noProof="0" dirty="0" err="1">
@@ -1690,7 +1725,7 @@
                 <a:latin typeface="FiraCode Nerd Font" panose="020B0809050000020004" pitchFamily="49" charset="0"/>
                 <a:ea typeface="FiraCode Nerd Font" panose="020B0809050000020004" pitchFamily="49" charset="0"/>
               </a:rPr>
-              <a:t>With such background in mind, I may now describe the current study.</a:t>
+              <a:t>With such background in mind, I now describe the current study.</a:t>
             </a:r>
           </a:p>
           <a:p>
@@ -1734,7 +1769,7 @@
                 <a:latin typeface="FiraCode Nerd Font" panose="020B0809050000020004" pitchFamily="49" charset="0"/>
                 <a:ea typeface="FiraCode Nerd Font" panose="020B0809050000020004" pitchFamily="49" charset="0"/>
               </a:rPr>
-              <a:t>The targeted population is the Year 10 cohort in the administrative year 2019, whose academic records reached the government database in June 2019.</a:t>
+              <a:t>The targeted population is the Year 10 cohort graduating in 2019.</a:t>
             </a:r>
           </a:p>
           <a:p>
@@ -1751,7 +1786,56 @@
                 <a:latin typeface="FiraCode Nerd Font" panose="020B0809050000020004" pitchFamily="49" charset="0"/>
                 <a:ea typeface="FiraCode Nerd Font" panose="020B0809050000020004" pitchFamily="49" charset="0"/>
               </a:rPr>
-              <a:t>I excluded students without valid GPAs, and the subject “Norwegian as a Second Language” from my analyses, leading to a dataset of 60,618 observations and 12 teacher-assigned grades, 3 written- and 2 oral-exam grades.</a:t>
+              <a:t>I excluded students without valid GPAs (6.6% loss rate), and the subject “</a:t>
+            </a:r>
+            <a:r>
+              <a:rPr lang="nb-NO" altLang="nb-NO" sz="1200" noProof="0" dirty="0">
+                <a:latin typeface="FiraCode Nerd Font" panose="020B0809050000020004" pitchFamily="49" charset="0"/>
+                <a:ea typeface="FiraCode Nerd Font" panose="020B0809050000020004" pitchFamily="49" charset="0"/>
+              </a:rPr>
+              <a:t>Sidemål</a:t>
+            </a:r>
+            <a:r>
+              <a:rPr lang="zh-CN" altLang="en-US" sz="1200" noProof="0" dirty="0">
+                <a:latin typeface="FiraCode Nerd Font" panose="020B0809050000020004" pitchFamily="49" charset="0"/>
+                <a:ea typeface="FiraCode Nerd Font" panose="020B0809050000020004" pitchFamily="49" charset="0"/>
+              </a:rPr>
+              <a:t>”</a:t>
+            </a:r>
+            <a:r>
+              <a:rPr lang="nb-NO" altLang="nb-NO" sz="1200" noProof="0" dirty="0">
+                <a:latin typeface="FiraCode Nerd Font" panose="020B0809050000020004" pitchFamily="49" charset="0"/>
+                <a:ea typeface="FiraCode Nerd Font" panose="020B0809050000020004" pitchFamily="49" charset="0"/>
+              </a:rPr>
+              <a:t> </a:t>
+            </a:r>
+            <a:r>
+              <a:rPr lang="en-AU" altLang="nb-NO" sz="1200" noProof="0" dirty="0">
+                <a:latin typeface="FiraCode Nerd Font" panose="020B0809050000020004" pitchFamily="49" charset="0"/>
+                <a:ea typeface="FiraCode Nerd Font" panose="020B0809050000020004" pitchFamily="49" charset="0"/>
+              </a:rPr>
+              <a:t>from my analyses</a:t>
+            </a:r>
+            <a:r>
+              <a:rPr lang="zh-CN" altLang="en-US" sz="1200" noProof="0" dirty="0">
+                <a:latin typeface="FiraCode Nerd Font" panose="020B0809050000020004" pitchFamily="49" charset="0"/>
+                <a:ea typeface="FiraCode Nerd Font" panose="020B0809050000020004" pitchFamily="49" charset="0"/>
+              </a:rPr>
+              <a:t>。</a:t>
+            </a:r>
+            <a:endParaRPr lang="en-AU" altLang="zh-CN" sz="1200" noProof="0" dirty="0">
+              <a:latin typeface="FiraCode Nerd Font" panose="020B0809050000020004" pitchFamily="49" charset="0"/>
+              <a:ea typeface="FiraCode Nerd Font" panose="020B0809050000020004" pitchFamily="49" charset="0"/>
+            </a:endParaRPr>
+          </a:p>
+          <a:p>
+            <a:pPr eaLnBrk="1" hangingPunct="1"/>
+            <a:r>
+              <a:rPr lang="en-AU" altLang="nb-NO" sz="1200" noProof="0" dirty="0">
+                <a:latin typeface="FiraCode Nerd Font" panose="020B0809050000020004" pitchFamily="49" charset="0"/>
+                <a:ea typeface="FiraCode Nerd Font" panose="020B0809050000020004" pitchFamily="49" charset="0"/>
+              </a:rPr>
+              <a:t>My dataset contains 60,618 observations and 17 columns consisting of 12 teacher-assigned grades, 3 written- and 2 oral-exam grades.</a:t>
             </a:r>
           </a:p>
           <a:p>
@@ -1768,7 +1852,7 @@
                 <a:latin typeface="FiraCode Nerd Font" panose="020B0809050000020004" pitchFamily="49" charset="0"/>
                 <a:ea typeface="FiraCode Nerd Font" panose="020B0809050000020004" pitchFamily="49" charset="0"/>
               </a:rPr>
-              <a:t>I employed partial credit models (PCMs) for my analyses. PCMs are the polytomous analogous of Rasch models.</a:t>
+              <a:t>I employed partial credit models (PCMs) for my analyses.</a:t>
             </a:r>
           </a:p>
           <a:p>
@@ -2206,7 +2290,7 @@
                 <a:latin typeface="FiraCode Nerd Font" panose="020B0809050000020004" pitchFamily="49" charset="0"/>
                 <a:ea typeface="FiraCode Nerd Font" panose="020B0809050000020004" pitchFamily="49" charset="0"/>
               </a:rPr>
-              <a:t>This following two slides present visual summaries of the “b” parameters derived from PCMs.</a:t>
+              <a:t>This following two slides present visual summaries of the difficulty parameters derived from PCM.</a:t>
             </a:r>
           </a:p>
           <a:p>
@@ -2223,21 +2307,7 @@
                 <a:latin typeface="FiraCode Nerd Font" panose="020B0809050000020004" pitchFamily="49" charset="0"/>
                 <a:ea typeface="FiraCode Nerd Font" panose="020B0809050000020004" pitchFamily="49" charset="0"/>
               </a:rPr>
-              <a:t>Difficulty parameters of the 12 compulsory subjects (</a:t>
-            </a:r>
-            <a:r>
-              <a:rPr lang="en-AU" altLang="nb-NO" sz="1200" noProof="0" dirty="0" err="1">
-                <a:latin typeface="FiraCode Nerd Font" panose="020B0809050000020004" pitchFamily="49" charset="0"/>
-                <a:ea typeface="FiraCode Nerd Font" panose="020B0809050000020004" pitchFamily="49" charset="0"/>
-              </a:rPr>
-              <a:t>ie</a:t>
-            </a:r>
-            <a:r>
-              <a:rPr lang="en-AU" altLang="nb-NO" sz="1200" noProof="0" dirty="0">
-                <a:latin typeface="FiraCode Nerd Font" panose="020B0809050000020004" pitchFamily="49" charset="0"/>
-                <a:ea typeface="FiraCode Nerd Font" panose="020B0809050000020004" pitchFamily="49" charset="0"/>
-              </a:rPr>
-              <a:t>, teacher-assigned grades) are presented first.</a:t>
+              <a:t>Results related to the teacher-assigned grades are presented first.</a:t>
             </a:r>
           </a:p>
           <a:p>
@@ -2254,7 +2324,7 @@
                 <a:latin typeface="FiraCode Nerd Font" panose="020B0809050000020004" pitchFamily="49" charset="0"/>
                 <a:ea typeface="FiraCode Nerd Font" panose="020B0809050000020004" pitchFamily="49" charset="0"/>
               </a:rPr>
-              <a:t>With the exception of Written Norwegian, the b_5 line on the top is relative flat, while the b_4, b_3, down to b_1 lines are increasingly downward-sloping.</a:t>
+              <a:t>With the exception of Written Norwegian, the b_5 line on the top is relative flat, while the b_4, b_3, down to b_1 lines are increasingly downward-sloping, where students are spread apart more along the grading scale than for the higher grades.</a:t>
             </a:r>
           </a:p>
           <a:p>
@@ -2298,7 +2368,7 @@
                 <a:latin typeface="FiraCode Nerd Font" panose="020B0809050000020004" pitchFamily="49" charset="0"/>
                 <a:ea typeface="FiraCode Nerd Font" panose="020B0809050000020004" pitchFamily="49" charset="0"/>
               </a:rPr>
-              <a:t>In fact, a Grade 2 in the easiest subject (Food and Health) shared similar “b” parameter with a Grade 1 in the hardest subject (Mathematics).</a:t>
+              <a:t>In fact, a Grade 2 in the easiest subject (Food and Health) shared a similar difficulty parameter with a Grade 1 in the hardest subject (Mathematics).</a:t>
             </a:r>
           </a:p>
           <a:p>
@@ -2638,7 +2708,7 @@
                 <a:latin typeface="FiraCode Nerd Font" panose="020B0809050000020004" pitchFamily="49" charset="0"/>
                 <a:ea typeface="FiraCode Nerd Font" panose="020B0809050000020004" pitchFamily="49" charset="0"/>
               </a:rPr>
-              <a:t>All three written exams (mathematics, English, and Norwegian) were included in this study.</a:t>
+              <a:t>All three written exams (Mathematics, English, and Norwegian) were included in this study.</a:t>
             </a:r>
           </a:p>
           <a:p>
@@ -2664,7 +2734,7 @@
                 <a:latin typeface="FiraCode Nerd Font" panose="020B0809050000020004" pitchFamily="49" charset="0"/>
                 <a:ea typeface="FiraCode Nerd Font" panose="020B0809050000020004" pitchFamily="49" charset="0"/>
               </a:rPr>
-              <a:t>In order to match teacher-assigned grades, oral English and oral Norwegian were also included in this analysis.</a:t>
+              <a:t>In order to match teacher-assigned grades, only oral English and oral Norwegian were included in this analysis.</a:t>
             </a:r>
           </a:p>
           <a:p>
@@ -2766,7 +2836,7 @@
                 <a:latin typeface="FiraCode Nerd Font" panose="020B0809050000020004" pitchFamily="49" charset="0"/>
                 <a:ea typeface="FiraCode Nerd Font" panose="020B0809050000020004" pitchFamily="49" charset="0"/>
               </a:rPr>
-              <a:t>On the surface, this pattern suggests that examiners were stricter than teachers in marking written tests, but more lenient in oral exams.</a:t>
+              <a:t>On the surface, this pattern suggests that examiners were stricter than teachers in marking written tests, but more lenient in marking oral exams.</a:t>
             </a:r>
           </a:p>
           <a:p>
@@ -2783,7 +2853,7 @@
                 <a:latin typeface="FiraCode Nerd Font" panose="020B0809050000020004" pitchFamily="49" charset="0"/>
                 <a:ea typeface="FiraCode Nerd Font" panose="020B0809050000020004" pitchFamily="49" charset="0"/>
               </a:rPr>
-              <a:t>The second strand of the answer to the research question therefore can be:</a:t>
+              <a:t>The second strand of the answer to the research question is</a:t>
             </a:r>
           </a:p>
           <a:p>
@@ -2793,7 +2863,7 @@
                 <a:latin typeface="FiraCode Nerd Font" panose="020B0809050000020004" pitchFamily="49" charset="0"/>
                 <a:ea typeface="FiraCode Nerd Font" panose="020B0809050000020004" pitchFamily="49" charset="0"/>
               </a:rPr>
-              <a:t>	“Yes, exam grades differ from teacher-assigned grades, depending on the form of examination.”</a:t>
+              <a:t>	“Yes, exam grades differ from teacher-assigned grades, depending on the written vs oral forms of examination.”</a:t>
             </a:r>
           </a:p>
           <a:p>
@@ -2803,7 +2873,7 @@
                 <a:latin typeface="FiraCode Nerd Font" panose="020B0809050000020004" pitchFamily="49" charset="0"/>
                 <a:ea typeface="FiraCode Nerd Font" panose="020B0809050000020004" pitchFamily="49" charset="0"/>
               </a:rPr>
-              <a:t>Contrary to the previous observation form the left panel, slopes in the right panel were the steepest on the top end, suggesting larger disagreement between teachers and examiners for awarding grade 5s and 6s while disagreement remained minimum for lower grades.</a:t>
+              <a:t>Contrary to teacher-assigned grades, larger disagreement between teachers and examiners for awarding grade 5s and 6s while disagreement remained low for lower grades.</a:t>
             </a:r>
           </a:p>
           <a:p>
@@ -2905,7 +2975,7 @@
                 <a:latin typeface="FiraCode Nerd Font" panose="020B0809050000020004" pitchFamily="49" charset="0"/>
                 <a:ea typeface="FiraCode Nerd Font" panose="020B0809050000020004" pitchFamily="49" charset="0"/>
               </a:rPr>
-              <a:t>If divergence in grade difficulties signals potential unfairness or threats to measurement validity, it is the lower end in teacher-assigned grades, and higher end in exam grades, that are highlighted by this study for consideration.</a:t>
+              <a:t>If divergence in grade difficulties signals potential unfairness or threats to measurement validity, it is the lower end in teacher-assigned grades, and higher end in exam grades, where we see the greatest differences.</a:t>
             </a:r>
           </a:p>
           <a:p>
@@ -2969,8 +3039,15 @@
                 <a:latin typeface="FiraCode Nerd Font" panose="020B0809050000020004" pitchFamily="49" charset="0"/>
                 <a:ea typeface="FiraCode Nerd Font" panose="020B0809050000020004" pitchFamily="49" charset="0"/>
               </a:rPr>
-              <a:t>It would be fruitful to dissect these results to see whether grade difficulties diverge more severely for, say rural schools, females and the left tails of the SES distribution.</a:t>
-            </a:r>
+              <a:t>It would be fruitful to see whether grade difficulties diverge more severely for, say rural schools, females and the left tails of the SES distribution.</a:t>
+            </a:r>
+          </a:p>
+          <a:p>
+            <a:pPr eaLnBrk="1" hangingPunct="1"/>
+            <a:endParaRPr lang="en-AU" altLang="nb-NO" sz="1000" noProof="0" dirty="0">
+              <a:latin typeface="FiraCode Nerd Font" panose="020B0809050000020004" pitchFamily="49" charset="0"/>
+              <a:ea typeface="FiraCode Nerd Font" panose="020B0809050000020004" pitchFamily="49" charset="0"/>
+            </a:endParaRPr>
           </a:p>
         </p:txBody>
       </p:sp>
@@ -3245,7 +3322,7 @@
               <a:pPr>
                 <a:defRPr/>
               </a:pPr>
-              <a:t>29.05.2022</a:t>
+              <a:t>30.05.2022</a:t>
             </a:fld>
             <a:endParaRPr lang="nb-NO" altLang="nb-NO"/>
           </a:p>
@@ -3430,7 +3507,7 @@
               <a:pPr>
                 <a:defRPr/>
               </a:pPr>
-              <a:t>29.05.2022</a:t>
+              <a:t>30.05.2022</a:t>
             </a:fld>
             <a:endParaRPr lang="nb-NO" altLang="nb-NO"/>
           </a:p>
@@ -3605,7 +3682,7 @@
               <a:pPr>
                 <a:defRPr/>
               </a:pPr>
-              <a:t>29.05.2022</a:t>
+              <a:t>30.05.2022</a:t>
             </a:fld>
             <a:endParaRPr lang="nb-NO" altLang="nb-NO"/>
           </a:p>
@@ -3802,7 +3879,7 @@
               <a:pPr>
                 <a:defRPr/>
               </a:pPr>
-              <a:t>29.05.2022</a:t>
+              <a:t>30.05.2022</a:t>
             </a:fld>
             <a:endParaRPr lang="nb-NO" altLang="nb-NO"/>
           </a:p>
@@ -4095,7 +4172,7 @@
               <a:pPr>
                 <a:defRPr/>
               </a:pPr>
-              <a:t>29.05.2022</a:t>
+              <a:t>30.05.2022</a:t>
             </a:fld>
             <a:endParaRPr lang="nb-NO" altLang="nb-NO"/>
           </a:p>
@@ -4527,7 +4604,7 @@
               <a:pPr>
                 <a:defRPr/>
               </a:pPr>
-              <a:t>29.05.2022</a:t>
+              <a:t>30.05.2022</a:t>
             </a:fld>
             <a:endParaRPr lang="nb-NO" altLang="nb-NO"/>
           </a:p>
@@ -4650,7 +4727,7 @@
               <a:pPr>
                 <a:defRPr/>
               </a:pPr>
-              <a:t>29.05.2022</a:t>
+              <a:t>30.05.2022</a:t>
             </a:fld>
             <a:endParaRPr lang="nb-NO" altLang="nb-NO"/>
           </a:p>
@@ -4750,7 +4827,7 @@
               <a:pPr>
                 <a:defRPr/>
               </a:pPr>
-              <a:t>29.05.2022</a:t>
+              <a:t>30.05.2022</a:t>
             </a:fld>
             <a:endParaRPr lang="nb-NO" altLang="nb-NO"/>
           </a:p>
@@ -5032,7 +5109,7 @@
               <a:pPr>
                 <a:defRPr/>
               </a:pPr>
-              <a:t>29.05.2022</a:t>
+              <a:t>30.05.2022</a:t>
             </a:fld>
             <a:endParaRPr lang="nb-NO" altLang="nb-NO"/>
           </a:p>
@@ -5295,7 +5372,7 @@
               <a:pPr>
                 <a:defRPr/>
               </a:pPr>
-              <a:t>29.05.2022</a:t>
+              <a:t>30.05.2022</a:t>
             </a:fld>
             <a:endParaRPr lang="nb-NO" altLang="nb-NO"/>
           </a:p>
@@ -5568,7 +5645,7 @@
               <a:pPr>
                 <a:defRPr/>
               </a:pPr>
-              <a:t>29.05.2022</a:t>
+              <a:t>30.05.2022</a:t>
             </a:fld>
             <a:endParaRPr lang="nb-NO" altLang="nb-NO"/>
           </a:p>
@@ -6441,8 +6518,8 @@
           </a:p>
         </p:txBody>
       </p:sp>
-      <mc:AlternateContent xmlns:mc="http://schemas.openxmlformats.org/markup-compatibility/2006">
-        <mc:Choice xmlns:a14="http://schemas.microsoft.com/office/drawing/2010/main" Requires="a14">
+      <mc:AlternateContent xmlns:mc="http://schemas.openxmlformats.org/markup-compatibility/2006" xmlns:a14="http://schemas.microsoft.com/office/drawing/2010/main">
+        <mc:Choice Requires="a14">
           <p:sp>
             <p:nvSpPr>
               <p:cNvPr id="3" name="Content Placeholder 2">
@@ -6695,7 +6772,7 @@
             </p:txBody>
           </p:sp>
         </mc:Choice>
-        <mc:Fallback>
+        <mc:Fallback xmlns="">
           <p:sp>
             <p:nvSpPr>
               <p:cNvPr id="3" name="Content Placeholder 2">
@@ -6794,8 +6871,8 @@
           </a:prstGeom>
         </p:spPr>
       </p:pic>
-      <mc:AlternateContent xmlns:mc="http://schemas.openxmlformats.org/markup-compatibility/2006">
-        <mc:Choice xmlns:a14="http://schemas.microsoft.com/office/drawing/2010/main" Requires="a14">
+      <mc:AlternateContent xmlns:mc="http://schemas.openxmlformats.org/markup-compatibility/2006" xmlns:a14="http://schemas.microsoft.com/office/drawing/2010/main">
+        <mc:Choice Requires="a14">
           <p:sp>
             <p:nvSpPr>
               <p:cNvPr id="4" name="Content Placeholder 3">
@@ -6998,7 +7075,7 @@
             </p:txBody>
           </p:sp>
         </mc:Choice>
-        <mc:Fallback>
+        <mc:Fallback xmlns="">
           <p:sp>
             <p:nvSpPr>
               <p:cNvPr id="4" name="Content Placeholder 3">
@@ -7175,14 +7252,14 @@
           <a:p>
             <a:r>
               <a:rPr lang="en-AU" dirty="0"/>
-              <a:t>Visual Patten</a:t>
+              <a:t>Visual Pattern</a:t>
             </a:r>
           </a:p>
           <a:p>
             <a:pPr lvl="1"/>
             <a:r>
               <a:rPr lang="en-AU" dirty="0"/>
-              <a:t>Top grade: relatively flat</a:t>
+              <a:t>Top grade: relatively flat </a:t>
             </a:r>
             <a:r>
               <a:rPr lang="en-AU" dirty="0">
@@ -7260,6 +7337,14 @@
 <file path=ppt/slides/slide6.xml><?xml version="1.0" encoding="utf-8"?>
 <p:sld xmlns:a="http://schemas.openxmlformats.org/drawingml/2006/main" xmlns:r="http://schemas.openxmlformats.org/officeDocument/2006/relationships" xmlns:p="http://schemas.openxmlformats.org/presentationml/2006/main">
   <p:cSld>
+    <p:bg>
+      <p:bgPr>
+        <a:solidFill>
+          <a:srgbClr val="FFFFFF"/>
+        </a:solidFill>
+        <a:effectLst/>
+      </p:bgPr>
+    </p:bg>
     <p:spTree>
       <p:nvGrpSpPr>
         <p:cNvPr id="1" name=""/>
@@ -7274,6 +7359,34 @@
           <a:chExt cx="0" cy="0"/>
         </a:xfrm>
       </p:grpSpPr>
+      <p:pic>
+        <p:nvPicPr>
+          <p:cNvPr id="13" name="Content Placeholder 12">
+            <a:extLst>
+              <a:ext uri="{FF2B5EF4-FFF2-40B4-BE49-F238E27FC236}">
+                <a16:creationId xmlns:a16="http://schemas.microsoft.com/office/drawing/2014/main" id="{6ED86689-E400-A73C-AA17-17E92F6F1C9C}"/>
+              </a:ext>
+            </a:extLst>
+          </p:cNvPr>
+          <p:cNvPicPr>
+            <a:picLocks noGrp="1" noChangeAspect="1"/>
+          </p:cNvPicPr>
+          <p:nvPr>
+            <p:ph sz="half" idx="2"/>
+          </p:nvPr>
+        </p:nvPicPr>
+        <p:blipFill>
+          <a:blip r:embed="rId4"/>
+          <a:srcRect/>
+          <a:stretch/>
+        </p:blipFill>
+        <p:spPr>
+          <a:xfrm>
+            <a:off x="4572000" y="1345332"/>
+            <a:ext cx="4258385" cy="4258385"/>
+          </a:xfrm>
+        </p:spPr>
+      </p:pic>
       <p:sp>
         <p:nvSpPr>
           <p:cNvPr id="7" name="Title 6">
@@ -7302,34 +7415,6 @@
           </a:p>
         </p:txBody>
       </p:sp>
-      <p:pic>
-        <p:nvPicPr>
-          <p:cNvPr id="13" name="Content Placeholder 12">
-            <a:extLst>
-              <a:ext uri="{FF2B5EF4-FFF2-40B4-BE49-F238E27FC236}">
-                <a16:creationId xmlns:a16="http://schemas.microsoft.com/office/drawing/2014/main" id="{6ED86689-E400-A73C-AA17-17E92F6F1C9C}"/>
-              </a:ext>
-            </a:extLst>
-          </p:cNvPr>
-          <p:cNvPicPr>
-            <a:picLocks noGrp="1" noChangeAspect="1"/>
-          </p:cNvPicPr>
-          <p:nvPr>
-            <p:ph sz="half" idx="2"/>
-          </p:nvPr>
-        </p:nvPicPr>
-        <p:blipFill>
-          <a:blip r:embed="rId3"/>
-          <a:srcRect/>
-          <a:stretch/>
-        </p:blipFill>
-        <p:spPr>
-          <a:xfrm>
-            <a:off x="4572000" y="1345332"/>
-            <a:ext cx="4258385" cy="4258385"/>
-          </a:xfrm>
-        </p:spPr>
-      </p:pic>
       <p:sp>
         <p:nvSpPr>
           <p:cNvPr id="14" name="Content Placeholder 13">
@@ -7380,33 +7465,42 @@
             <a:pPr lvl="1"/>
             <a:r>
               <a:rPr lang="en-AU" dirty="0"/>
-              <a:t>Written: upward-sloping</a:t>
+              <a:t>Written: upward-sloping (strict) </a:t>
+            </a:r>
+            <a:r>
+              <a:rPr lang="en-AU" dirty="0">
+                <a:solidFill>
+                  <a:schemeClr val="bg1">
+                    <a:lumMod val="65000"/>
+                  </a:schemeClr>
+                </a:solidFill>
+              </a:rPr>
+              <a:t>*</a:t>
             </a:r>
           </a:p>
           <a:p>
             <a:pPr lvl="1"/>
             <a:r>
               <a:rPr lang="en-AU" dirty="0"/>
-              <a:t>Oral: downward-sloping</a:t>
-            </a:r>
-          </a:p>
-          <a:p>
-            <a:r>
-              <a:rPr lang="en-AU" dirty="0"/>
-              <a:t>Strict vs lenient</a:t>
-            </a:r>
-          </a:p>
-          <a:p>
-            <a:r>
-              <a:rPr lang="en-AU" dirty="0"/>
-              <a:t>Written Norwegian</a:t>
-            </a:r>
-          </a:p>
-          <a:p>
-            <a:pPr lvl="1"/>
-            <a:r>
-              <a:rPr lang="en-AU" dirty="0"/>
-              <a:t>Largest teacher-examiner disagreement</a:t>
+              <a:t>Oral: downward-sloping (lenient)</a:t>
+            </a:r>
+          </a:p>
+          <a:p>
+            <a:endParaRPr lang="en-AU" dirty="0"/>
+          </a:p>
+          <a:p>
+            <a:pPr marL="176213" indent="-176213">
+              <a:buNone/>
+            </a:pPr>
+            <a:r>
+              <a:rPr lang="en-AU" sz="1900" dirty="0">
+                <a:solidFill>
+                  <a:schemeClr val="bg1">
+                    <a:lumMod val="65000"/>
+                  </a:schemeClr>
+                </a:solidFill>
+              </a:rPr>
+              <a:t>* Written Norwegian largest teacher-examiner disagreement</a:t>
             </a:r>
           </a:p>
         </p:txBody>
@@ -7419,7 +7513,7 @@
     </p:extLst>
   </p:cSld>
   <p:clrMapOvr>
-    <a:masterClrMapping/>
+    <a:overrideClrMapping bg1="lt1" tx1="dk1" bg2="lt2" tx2="dk2" accent1="accent1" accent2="accent2" accent3="accent3" accent4="accent4" accent5="accent5" accent6="accent6" hlink="hlink" folHlink="folHlink"/>
   </p:clrMapOvr>
 </p:sld>
 </file>
@@ -7517,42 +7611,79 @@
           </a:p>
           <a:p>
             <a:r>
-              <a:rPr lang="en-GB" dirty="0"/>
+              <a:rPr lang="en-GB" dirty="0">
+                <a:solidFill>
+                  <a:schemeClr val="bg1">
+                    <a:lumMod val="50000"/>
+                  </a:schemeClr>
+                </a:solidFill>
+              </a:rPr>
               <a:t>Possible extensions:</a:t>
             </a:r>
           </a:p>
           <a:p>
             <a:pPr lvl="1"/>
             <a:r>
-              <a:rPr lang="en-GB" dirty="0"/>
+              <a:rPr lang="en-GB" dirty="0">
+                <a:solidFill>
+                  <a:schemeClr val="bg1">
+                    <a:lumMod val="50000"/>
+                  </a:schemeClr>
+                </a:solidFill>
+              </a:rPr>
               <a:t>Do these patterns remain consistent across</a:t>
             </a:r>
           </a:p>
           <a:p>
             <a:pPr lvl="2"/>
             <a:r>
-              <a:rPr lang="en-GB" dirty="0"/>
+              <a:rPr lang="en-GB" dirty="0">
+                <a:solidFill>
+                  <a:schemeClr val="bg1">
+                    <a:lumMod val="50000"/>
+                  </a:schemeClr>
+                </a:solidFill>
+              </a:rPr>
               <a:t>School locations (urban vs rural)</a:t>
             </a:r>
           </a:p>
           <a:p>
             <a:pPr lvl="2"/>
             <a:r>
-              <a:rPr lang="en-GB" dirty="0"/>
-              <a:t>Students’ sexes</a:t>
+              <a:rPr lang="en-GB" dirty="0">
+                <a:solidFill>
+                  <a:schemeClr val="bg1">
+                    <a:lumMod val="50000"/>
+                  </a:schemeClr>
+                </a:solidFill>
+              </a:rPr>
+              <a:t>Students’ gender</a:t>
             </a:r>
           </a:p>
           <a:p>
             <a:pPr lvl="2"/>
             <a:r>
-              <a:rPr lang="en-GB" dirty="0"/>
-              <a:t>Parental socio-economic status</a:t>
-            </a:r>
-          </a:p>
-          <a:p>
-            <a:r>
-              <a:rPr lang="en-GB" dirty="0"/>
-              <a:t>“Who carry the heaviest burden of grade difficulty differentials?”</a:t>
+              <a:rPr lang="en-GB" dirty="0">
+                <a:solidFill>
+                  <a:schemeClr val="bg1">
+                    <a:lumMod val="50000"/>
+                  </a:schemeClr>
+                </a:solidFill>
+              </a:rPr>
+              <a:t>Parental social-economic status</a:t>
+            </a:r>
+          </a:p>
+          <a:p>
+            <a:pPr lvl="1"/>
+            <a:r>
+              <a:rPr lang="en-GB" dirty="0">
+                <a:solidFill>
+                  <a:schemeClr val="bg1">
+                    <a:lumMod val="50000"/>
+                  </a:schemeClr>
+                </a:solidFill>
+              </a:rPr>
+              <a:t>Replication using Year 13</a:t>
             </a:r>
           </a:p>
         </p:txBody>
@@ -9052,4 +9183,47 @@
   </a:objectDefaults>
   <a:extraClrSchemeLst/>
 </a:theme>
+</file>
+
+<file path=ppt/theme/themeOverride1.xml><?xml version="1.0" encoding="utf-8"?>
+<a:themeOverride xmlns:a="http://schemas.openxmlformats.org/drawingml/2006/main">
+  <a:clrScheme name="Blank Presentation 1">
+    <a:dk1>
+      <a:srgbClr val="000000"/>
+    </a:dk1>
+    <a:lt1>
+      <a:srgbClr val="FFFFFF"/>
+    </a:lt1>
+    <a:dk2>
+      <a:srgbClr val="000000"/>
+    </a:dk2>
+    <a:lt2>
+      <a:srgbClr val="808080"/>
+    </a:lt2>
+    <a:accent1>
+      <a:srgbClr val="BBE0E3"/>
+    </a:accent1>
+    <a:accent2>
+      <a:srgbClr val="333399"/>
+    </a:accent2>
+    <a:accent3>
+      <a:srgbClr val="FFFFFF"/>
+    </a:accent3>
+    <a:accent4>
+      <a:srgbClr val="000000"/>
+    </a:accent4>
+    <a:accent5>
+      <a:srgbClr val="DAEDEF"/>
+    </a:accent5>
+    <a:accent6>
+      <a:srgbClr val="2D2D8A"/>
+    </a:accent6>
+    <a:hlink>
+      <a:srgbClr val="009999"/>
+    </a:hlink>
+    <a:folHlink>
+      <a:srgbClr val="99CC00"/>
+    </a:folHlink>
+  </a:clrScheme>
+</a:themeOverride>
 </file>
</xml_diff>